<commit_message>
[DOC] rework according to comments on issue #27
</commit_message>
<xml_diff>
--- a/zigbee/Zigbee Sleepy End device.pptx
+++ b/zigbee/Zigbee Sleepy End device.pptx
@@ -5,7 +5,7 @@
     <p:sldMasterId id="2147484033" r:id="rId4"/>
   </p:sldMasterIdLst>
   <p:notesMasterIdLst>
-    <p:notesMasterId r:id="rId28"/>
+    <p:notesMasterId r:id="rId27"/>
   </p:notesMasterIdLst>
   <p:sldIdLst>
     <p:sldId id="257" r:id="rId5"/>
@@ -21,16 +21,15 @@
     <p:sldId id="402" r:id="rId15"/>
     <p:sldId id="403" r:id="rId16"/>
     <p:sldId id="404" r:id="rId17"/>
-    <p:sldId id="405" r:id="rId18"/>
-    <p:sldId id="316" r:id="rId19"/>
-    <p:sldId id="317" r:id="rId20"/>
-    <p:sldId id="318" r:id="rId21"/>
-    <p:sldId id="319" r:id="rId22"/>
-    <p:sldId id="325" r:id="rId23"/>
-    <p:sldId id="321" r:id="rId24"/>
-    <p:sldId id="406" r:id="rId25"/>
-    <p:sldId id="394" r:id="rId26"/>
-    <p:sldId id="284" r:id="rId27"/>
+    <p:sldId id="316" r:id="rId18"/>
+    <p:sldId id="317" r:id="rId19"/>
+    <p:sldId id="318" r:id="rId20"/>
+    <p:sldId id="319" r:id="rId21"/>
+    <p:sldId id="325" r:id="rId22"/>
+    <p:sldId id="321" r:id="rId23"/>
+    <p:sldId id="406" r:id="rId24"/>
+    <p:sldId id="394" r:id="rId25"/>
+    <p:sldId id="284" r:id="rId26"/>
   </p:sldIdLst>
   <p:sldSz cx="12192000" cy="6858000"/>
   <p:notesSz cx="7010400" cy="9296400"/>
@@ -233,7 +232,7 @@
           <a:p>
             <a:fld id="{3CAB3C29-341D-6743-A203-2F7086D57830}" type="datetimeFigureOut">
               <a:rPr lang="en-US" smtClean="0"/>
-              <a:t>2019-11-20</a:t>
+              <a:t>2019-11-23</a:t>
             </a:fld>
             <a:endParaRPr lang="en-US"/>
           </a:p>
@@ -2280,37 +2279,6 @@
           <a:bodyPr/>
           <a:lstStyle/>
           <a:p>
-            <a:r>
-              <a:rPr lang="en-US" dirty="0"/>
-              <a:t>It is easy to set up the testing for finding &amp; binding with Z3LightSoc and Z3SwitchSoc samples.</a:t>
-            </a:r>
-          </a:p>
-          <a:p>
-            <a:r>
-              <a:rPr lang="en-US" dirty="0"/>
-              <a:t>First you can build the two samples directly, download the firmware to the kits separately, and then join to the same Z3.0 network formed by a Z3Gateway.</a:t>
-            </a:r>
-          </a:p>
-          <a:p>
-            <a:r>
-              <a:rPr lang="en-US" dirty="0"/>
-              <a:t>On the Z3LightSoc side, launch the console and type CLI command “</a:t>
-            </a:r>
-            <a:r>
-              <a:rPr lang="en-US" sz="1200" dirty="0">
-                <a:solidFill>
-                  <a:prstClr val="black"/>
-                </a:solidFill>
-                <a:latin typeface="Lucida Console" panose="020B0609040504020204" pitchFamily="49" charset="0"/>
-              </a:rPr>
-              <a:t>plugin find-and-bind target 1</a:t>
-            </a:r>
-            <a:r>
-              <a:rPr lang="en-US" dirty="0"/>
-              <a:t>”.</a:t>
-            </a:r>
-          </a:p>
-          <a:p>
             <a:pPr marL="0" marR="0" lvl="0" indent="0" algn="l" defTabSz="914400" rtl="0" eaLnBrk="1" fontAlgn="auto" latinLnBrk="0" hangingPunct="1">
               <a:lnSpc>
                 <a:spcPct val="100000"/>
@@ -2330,20 +2298,7 @@
             </a:pPr>
             <a:r>
               <a:rPr lang="en-US" dirty="0"/>
-              <a:t>On the Z3SwitchSoc side, launch the console and type CLI command  “</a:t>
-            </a:r>
-            <a:r>
-              <a:rPr lang="en-US" sz="1200" dirty="0">
-                <a:solidFill>
-                  <a:prstClr val="black"/>
-                </a:solidFill>
-                <a:latin typeface="Lucida Console" panose="020B0609040504020204" pitchFamily="49" charset="0"/>
-              </a:rPr>
-              <a:t>plugin find-and-bind initiator 1</a:t>
-            </a:r>
-            <a:r>
-              <a:rPr lang="en-US" dirty="0"/>
-              <a:t>”. </a:t>
+              <a:t>As we know, a switch always binds to a light in Smart Home user case. Is there any easy way to implement it? The answer is yes, finding &amp; binding can be used here. </a:t>
             </a:r>
           </a:p>
           <a:p>
@@ -2386,15 +2341,7 @@
             </a:pPr>
             <a:r>
               <a:rPr lang="en-US" dirty="0"/>
-              <a:t>You will see the log “Find and bind initiator complete: 0x00” is printed on console after the finding &amp; binding procedure finish. When you print the binding table on </a:t>
-            </a:r>
-            <a:r>
-              <a:rPr lang="en-US" altLang="zh-CN" dirty="0"/>
-              <a:t>Z3SwitchSoc side(initiator), you will see the entries are created in binding table. All the matched clusters between initiator and target are bound.</a:t>
-            </a:r>
-            <a:r>
-              <a:rPr lang="en-US" dirty="0"/>
-              <a:t> The finding &amp; binding transactions can be found in packet trace, which proves the finding &amp; binding working flow works as expected.</a:t>
+              <a:t>Let’s look at the overview of Finding &amp; Binding, first, it is a cluster commissioning method to establish application connection automatically, which can be invoked by user interaction on two or more endpoints on two or more nodes. This method identifies and discovers endpoints using the Identify cluster. For each match between corresponding application clusters on the endpoints, binding is created at the initiator of the application transaction.</a:t>
             </a:r>
           </a:p>
           <a:p>
@@ -2437,7 +2384,7 @@
             </a:pPr>
             <a:r>
               <a:rPr lang="en-US" dirty="0"/>
-              <a:t>Let’s summarize how the finding and binding procedure works.</a:t>
+              <a:t>For example, both the switch and light have on-off cluster, the binding for on-off cluster will be created after the finding &amp; binding operations on both sides.</a:t>
             </a:r>
           </a:p>
           <a:p>
@@ -2480,15 +2427,51 @@
             </a:pPr>
             <a:r>
               <a:rPr lang="en-US" dirty="0"/>
-              <a:t>On the target side, it will write the identify time attribute for </a:t>
-            </a:r>
-            <a:r>
-              <a:rPr lang="en-US" sz="1200" dirty="0"/>
-              <a:t>EMBER_AF_PLUGIN_FIND_AND_BIND_TARGET_COMMISSIONING_TIME. During the duration, the initiator broadcasts identify query and the target responds identify query response. Then the initiator sends IEEE address request to target to get the EUI64 of target, which will be used in creating binding table. The simple descriptor request will be sent to target to get the clusters info on target side. Once the clusters matched, the entries will be created in binding table of initiator.</a:t>
-            </a:r>
-          </a:p>
-          <a:p>
+              <a:t>Next, we will talk about how the finding &amp; binding works and introduce the detailed procedures on target and initiator.</a:t>
+            </a:r>
+          </a:p>
+          <a:p>
+            <a:pPr marL="0" marR="0" lvl="0" indent="0" algn="l" defTabSz="914400" rtl="0" eaLnBrk="1" fontAlgn="auto" latinLnBrk="0" hangingPunct="1">
+              <a:lnSpc>
+                <a:spcPct val="100000"/>
+              </a:lnSpc>
+              <a:spcBef>
+                <a:spcPts val="0"/>
+              </a:spcBef>
+              <a:spcAft>
+                <a:spcPts val="0"/>
+              </a:spcAft>
+              <a:buClrTx/>
+              <a:buSzTx/>
+              <a:buFontTx/>
+              <a:buNone/>
+              <a:tabLst/>
+              <a:defRPr/>
+            </a:pPr>
             <a:endParaRPr lang="en-US" dirty="0"/>
+          </a:p>
+          <a:p>
+            <a:pPr marL="0" marR="0" lvl="0" indent="0" algn="l" defTabSz="914400" rtl="0" eaLnBrk="1" fontAlgn="auto" latinLnBrk="0" hangingPunct="1">
+              <a:lnSpc>
+                <a:spcPct val="100000"/>
+              </a:lnSpc>
+              <a:spcBef>
+                <a:spcPts val="0"/>
+              </a:spcBef>
+              <a:spcAft>
+                <a:spcPts val="0"/>
+              </a:spcAft>
+              <a:buClrTx/>
+              <a:buSzTx/>
+              <a:buFontTx/>
+              <a:buNone/>
+              <a:tabLst/>
+              <a:defRPr/>
+            </a:pPr>
+            <a:r>
+              <a:rPr lang="en-US" dirty="0"/>
+              <a:t>At last, we will introduce how to test the finding and binding with Z3LighstSoc and Z3SwitchSoc sample code.</a:t>
+            </a:r>
           </a:p>
           <a:p>
             <a:endParaRPr lang="en-US" dirty="0"/>
@@ -2521,7 +2504,7 @@
     </p:spTree>
     <p:extLst>
       <p:ext uri="{BB962C8B-B14F-4D97-AF65-F5344CB8AC3E}">
-        <p14:creationId xmlns:p14="http://schemas.microsoft.com/office/powerpoint/2010/main" val="82328493"/>
+        <p14:creationId xmlns:p14="http://schemas.microsoft.com/office/powerpoint/2010/main" val="3069282055"/>
       </p:ext>
     </p:extLst>
   </p:cSld>
@@ -2575,198 +2558,45 @@
           <a:bodyPr/>
           <a:lstStyle/>
           <a:p>
-            <a:pPr marL="0" marR="0" lvl="0" indent="0" algn="l" defTabSz="914400" rtl="0" eaLnBrk="1" fontAlgn="auto" latinLnBrk="0" hangingPunct="1">
-              <a:lnSpc>
-                <a:spcPct val="100000"/>
-              </a:lnSpc>
-              <a:spcBef>
-                <a:spcPts val="0"/>
-              </a:spcBef>
-              <a:spcAft>
-                <a:spcPts val="0"/>
-              </a:spcAft>
-              <a:buClrTx/>
-              <a:buSzTx/>
-              <a:buFontTx/>
-              <a:buNone/>
-              <a:tabLst/>
-              <a:defRPr/>
-            </a:pPr>
             <a:r>
               <a:rPr lang="en-US" dirty="0"/>
-              <a:t>As we know, a switch always binds to a light in Smart Home user case. Is there any easy way to implement it? The answer is yes, finding &amp; binding can be used here. </a:t>
-            </a:r>
-          </a:p>
-          <a:p>
-            <a:pPr marL="0" marR="0" lvl="0" indent="0" algn="l" defTabSz="914400" rtl="0" eaLnBrk="1" fontAlgn="auto" latinLnBrk="0" hangingPunct="1">
-              <a:lnSpc>
-                <a:spcPct val="100000"/>
-              </a:lnSpc>
-              <a:spcBef>
-                <a:spcPts val="0"/>
-              </a:spcBef>
-              <a:spcAft>
-                <a:spcPts val="0"/>
-              </a:spcAft>
-              <a:buClrTx/>
-              <a:buSzTx/>
-              <a:buFontTx/>
-              <a:buNone/>
-              <a:tabLst/>
-              <a:defRPr/>
-            </a:pPr>
+              <a:t>As we know, there are two kinds of clusters: Type 1 and Type 2. </a:t>
+            </a:r>
+          </a:p>
+          <a:p>
+            <a:r>
+              <a:rPr lang="en-US" dirty="0"/>
+              <a:t>A application cluster is either a Type 1 or Type 2 cluster, depends on its primary functional transactions. A transaction has an initiator and a target. </a:t>
+            </a:r>
+          </a:p>
+          <a:p>
             <a:endParaRPr lang="en-US" dirty="0"/>
           </a:p>
           <a:p>
-            <a:pPr marL="0" marR="0" lvl="0" indent="0" algn="l" defTabSz="914400" rtl="0" eaLnBrk="1" fontAlgn="auto" latinLnBrk="0" hangingPunct="1">
-              <a:lnSpc>
-                <a:spcPct val="100000"/>
-              </a:lnSpc>
-              <a:spcBef>
-                <a:spcPts val="0"/>
-              </a:spcBef>
-              <a:spcAft>
-                <a:spcPts val="0"/>
-              </a:spcAft>
-              <a:buClrTx/>
-              <a:buSzTx/>
-              <a:buFontTx/>
-              <a:buNone/>
-              <a:tabLst/>
-              <a:defRPr/>
-            </a:pPr>
             <a:r>
               <a:rPr lang="en-US" dirty="0"/>
-              <a:t>Let’s look at the overview of Finding &amp; Binding, first, it is a cluster commissioning method to establish application connection automatically, which can be invoked by user interaction on two or more endpoints on two or more nodes. This method identifies and discovers endpoints using the Identify cluster. For each match between corresponding application clusters on the endpoints, binding is created at the initiator of the application transaction.</a:t>
-            </a:r>
-          </a:p>
-          <a:p>
-            <a:pPr marL="0" marR="0" lvl="0" indent="0" algn="l" defTabSz="914400" rtl="0" eaLnBrk="1" fontAlgn="auto" latinLnBrk="0" hangingPunct="1">
-              <a:lnSpc>
-                <a:spcPct val="100000"/>
-              </a:lnSpc>
-              <a:spcBef>
-                <a:spcPts val="0"/>
-              </a:spcBef>
-              <a:spcAft>
-                <a:spcPts val="0"/>
-              </a:spcAft>
-              <a:buClrTx/>
-              <a:buSzTx/>
-              <a:buFontTx/>
-              <a:buNone/>
-              <a:tabLst/>
-              <a:defRPr/>
-            </a:pPr>
+              <a:t>A type 1 cluster’s primary function is to initiate transactions from the client to the server. For example: An On/Off client sends commands (data) to the On/Off server. </a:t>
+            </a:r>
+          </a:p>
+          <a:p>
+            <a:r>
+              <a:rPr lang="en-US" dirty="0"/>
+              <a:t>A type 2 cluster’s primary function is to initiate transactions from the server to the client. For example: An Temperature Measurement server reports to the Temperature Measurement client.</a:t>
+            </a:r>
+          </a:p>
+          <a:p>
             <a:endParaRPr lang="en-US" dirty="0"/>
           </a:p>
           <a:p>
-            <a:pPr marL="0" marR="0" lvl="0" indent="0" algn="l" defTabSz="914400" rtl="0" eaLnBrk="1" fontAlgn="auto" latinLnBrk="0" hangingPunct="1">
-              <a:lnSpc>
-                <a:spcPct val="100000"/>
-              </a:lnSpc>
-              <a:spcBef>
-                <a:spcPts val="0"/>
-              </a:spcBef>
-              <a:spcAft>
-                <a:spcPts val="0"/>
-              </a:spcAft>
-              <a:buClrTx/>
-              <a:buSzTx/>
-              <a:buFontTx/>
-              <a:buNone/>
-              <a:tabLst/>
-              <a:defRPr/>
-            </a:pPr>
             <a:r>
               <a:rPr lang="en-US" dirty="0"/>
-              <a:t>For example, both the switch and light have on-off cluster, the binding for on-off cluster will be created after the finding &amp; binding operations on both sides.</a:t>
-            </a:r>
-          </a:p>
-          <a:p>
-            <a:pPr marL="0" marR="0" lvl="0" indent="0" algn="l" defTabSz="914400" rtl="0" eaLnBrk="1" fontAlgn="auto" latinLnBrk="0" hangingPunct="1">
-              <a:lnSpc>
-                <a:spcPct val="100000"/>
-              </a:lnSpc>
-              <a:spcBef>
-                <a:spcPts val="0"/>
-              </a:spcBef>
-              <a:spcAft>
-                <a:spcPts val="0"/>
-              </a:spcAft>
-              <a:buClrTx/>
-              <a:buSzTx/>
-              <a:buFontTx/>
-              <a:buNone/>
-              <a:tabLst/>
-              <a:defRPr/>
-            </a:pPr>
-            <a:endParaRPr lang="en-US" dirty="0"/>
-          </a:p>
-          <a:p>
-            <a:pPr marL="0" marR="0" lvl="0" indent="0" algn="l" defTabSz="914400" rtl="0" eaLnBrk="1" fontAlgn="auto" latinLnBrk="0" hangingPunct="1">
-              <a:lnSpc>
-                <a:spcPct val="100000"/>
-              </a:lnSpc>
-              <a:spcBef>
-                <a:spcPts val="0"/>
-              </a:spcBef>
-              <a:spcAft>
-                <a:spcPts val="0"/>
-              </a:spcAft>
-              <a:buClrTx/>
-              <a:buSzTx/>
-              <a:buFontTx/>
-              <a:buNone/>
-              <a:tabLst/>
-              <a:defRPr/>
-            </a:pPr>
+              <a:t>For a type 1 client or a type 2 server cluster, the application shall perform finding &amp; binding as an initiator endpoint.</a:t>
+            </a:r>
+          </a:p>
+          <a:p>
             <a:r>
               <a:rPr lang="en-US" dirty="0"/>
-              <a:t>Next, we will talk about how the finding &amp; binding works and introduce the detailed procedures on target and initiator.</a:t>
-            </a:r>
-          </a:p>
-          <a:p>
-            <a:pPr marL="0" marR="0" lvl="0" indent="0" algn="l" defTabSz="914400" rtl="0" eaLnBrk="1" fontAlgn="auto" latinLnBrk="0" hangingPunct="1">
-              <a:lnSpc>
-                <a:spcPct val="100000"/>
-              </a:lnSpc>
-              <a:spcBef>
-                <a:spcPts val="0"/>
-              </a:spcBef>
-              <a:spcAft>
-                <a:spcPts val="0"/>
-              </a:spcAft>
-              <a:buClrTx/>
-              <a:buSzTx/>
-              <a:buFontTx/>
-              <a:buNone/>
-              <a:tabLst/>
-              <a:defRPr/>
-            </a:pPr>
-            <a:endParaRPr lang="en-US" dirty="0"/>
-          </a:p>
-          <a:p>
-            <a:pPr marL="0" marR="0" lvl="0" indent="0" algn="l" defTabSz="914400" rtl="0" eaLnBrk="1" fontAlgn="auto" latinLnBrk="0" hangingPunct="1">
-              <a:lnSpc>
-                <a:spcPct val="100000"/>
-              </a:lnSpc>
-              <a:spcBef>
-                <a:spcPts val="0"/>
-              </a:spcBef>
-              <a:spcAft>
-                <a:spcPts val="0"/>
-              </a:spcAft>
-              <a:buClrTx/>
-              <a:buSzTx/>
-              <a:buFontTx/>
-              <a:buNone/>
-              <a:tabLst/>
-              <a:defRPr/>
-            </a:pPr>
-            <a:r>
-              <a:rPr lang="en-US" dirty="0"/>
-              <a:t>At last, we will introduce how to test the finding and binding with Z3LighstSoc and Z3SwitchSoc sample code.</a:t>
+              <a:t>For a type 1 server or type 2 client cluster, the application shall perform finding &amp; binding as a target endpoint.</a:t>
             </a:r>
           </a:p>
           <a:p>
@@ -2800,7 +2630,7 @@
     </p:spTree>
     <p:extLst>
       <p:ext uri="{BB962C8B-B14F-4D97-AF65-F5344CB8AC3E}">
-        <p14:creationId xmlns:p14="http://schemas.microsoft.com/office/powerpoint/2010/main" val="3069282055"/>
+        <p14:creationId xmlns:p14="http://schemas.microsoft.com/office/powerpoint/2010/main" val="3135783383"/>
       </p:ext>
     </p:extLst>
   </p:cSld>
@@ -2854,48 +2684,66 @@
           <a:bodyPr/>
           <a:lstStyle/>
           <a:p>
+            <a:pPr marL="0" marR="0" lvl="0" indent="0" algn="l" defTabSz="914400" rtl="0" eaLnBrk="1" fontAlgn="auto" latinLnBrk="0" hangingPunct="1">
+              <a:lnSpc>
+                <a:spcPct val="100000"/>
+              </a:lnSpc>
+              <a:spcBef>
+                <a:spcPts val="0"/>
+              </a:spcBef>
+              <a:spcAft>
+                <a:spcPts val="0"/>
+              </a:spcAft>
+              <a:buClrTx/>
+              <a:buSzTx/>
+              <a:buFontTx/>
+              <a:buNone/>
+              <a:tabLst/>
+              <a:defRPr/>
+            </a:pPr>
             <a:r>
               <a:rPr lang="en-US" dirty="0"/>
-              <a:t>As we know, there are two kinds of clusters: Type 1 and Type 2. </a:t>
-            </a:r>
-          </a:p>
-          <a:p>
+              <a:t>Please look at the right graph, which shows the working flow of the finding &amp; binding procedure. We will talk about the target side firstly.</a:t>
+            </a:r>
+            <a:endParaRPr lang="en-US" altLang="zh-CN" dirty="0"/>
+          </a:p>
+          <a:p>
+            <a:endParaRPr lang="en-US" altLang="zh-CN" dirty="0"/>
+          </a:p>
+          <a:p>
+            <a:r>
+              <a:rPr lang="en-US" altLang="zh-CN" dirty="0"/>
+              <a:t>On the finding &amp; binding target endpoint, once the finding &amp; binding target start, it will write the identify time attribute firstly to make sure the target can be identified.  In </a:t>
+            </a:r>
+            <a:r>
+              <a:rPr lang="en-US" altLang="zh-CN" dirty="0" err="1"/>
+              <a:t>Appbuilder</a:t>
+            </a:r>
+            <a:r>
+              <a:rPr lang="en-US" altLang="zh-CN" dirty="0"/>
+              <a:t>, the identify time can be configurated in “Find and Bind Target” plugin and the default value is 180 seconds. During the identify time, the target should respond to the identify query from initiator. </a:t>
+            </a:r>
             <a:r>
               <a:rPr lang="en-US" dirty="0"/>
-              <a:t>A application cluster is either a Type 1 or Type 2 cluster, depends on its primary functional transactions. A transaction has an initiator and a target. </a:t>
-            </a:r>
-          </a:p>
-          <a:p>
-            <a:endParaRPr lang="en-US" dirty="0"/>
-          </a:p>
-          <a:p>
+              <a:t>Once the decrementing identify time </a:t>
+            </a:r>
+            <a:r>
+              <a:rPr lang="en-US" altLang="zh-CN" dirty="0"/>
+              <a:t>attribute</a:t>
+            </a:r>
             <a:r>
               <a:rPr lang="en-US" dirty="0"/>
-              <a:t>A type 1 cluster’s primary function is to initiate transactions from the client to the server. For example: An On/Off client sends commands (data) to the On/Off server. </a:t>
-            </a:r>
-          </a:p>
-          <a:p>
-            <a:r>
-              <a:rPr lang="en-US" dirty="0"/>
-              <a:t>A type 2 cluster’s primary function is to initiate transactions from the server to the client. For example: An Temperature Measurement server reports to the Temperature Measurement client.</a:t>
-            </a:r>
-          </a:p>
-          <a:p>
-            <a:endParaRPr lang="en-US" dirty="0"/>
-          </a:p>
-          <a:p>
-            <a:r>
-              <a:rPr lang="en-US" dirty="0"/>
-              <a:t>For a type 1 client or a type 2 server cluster, the application shall perform finding &amp; binding as an initiator endpoint.</a:t>
-            </a:r>
-          </a:p>
-          <a:p>
-            <a:r>
-              <a:rPr lang="en-US" dirty="0"/>
-              <a:t>For a type 1 server or type 2 client cluster, the application shall perform finding &amp; binding as a target endpoint.</a:t>
-            </a:r>
-          </a:p>
-          <a:p>
+              <a:t> reaches zero, the target shall terminate the finding &amp; binding procedure.</a:t>
+            </a:r>
+          </a:p>
+          <a:p>
+            <a:endParaRPr lang="en-US" altLang="zh-CN" dirty="0"/>
+          </a:p>
+          <a:p>
+            <a:r>
+              <a:rPr lang="en-US" altLang="zh-CN" dirty="0"/>
+              <a:t>It means that the finding &amp; binding target should write identify time attribute to make sure it can be identified during the finding &amp; binding procedure.</a:t>
+            </a:r>
             <a:endParaRPr lang="en-US" dirty="0"/>
           </a:p>
         </p:txBody>
@@ -2926,7 +2774,7 @@
     </p:spTree>
     <p:extLst>
       <p:ext uri="{BB962C8B-B14F-4D97-AF65-F5344CB8AC3E}">
-        <p14:creationId xmlns:p14="http://schemas.microsoft.com/office/powerpoint/2010/main" val="3135783383"/>
+        <p14:creationId xmlns:p14="http://schemas.microsoft.com/office/powerpoint/2010/main" val="1971553287"/>
       </p:ext>
     </p:extLst>
   </p:cSld>
@@ -2980,36 +2828,27 @@
           <a:bodyPr/>
           <a:lstStyle/>
           <a:p>
-            <a:pPr marL="0" marR="0" lvl="0" indent="0" algn="l" defTabSz="914400" rtl="0" eaLnBrk="1" fontAlgn="auto" latinLnBrk="0" hangingPunct="1">
-              <a:lnSpc>
-                <a:spcPct val="100000"/>
-              </a:lnSpc>
-              <a:spcBef>
-                <a:spcPts val="0"/>
-              </a:spcBef>
-              <a:spcAft>
-                <a:spcPts val="0"/>
-              </a:spcAft>
-              <a:buClrTx/>
-              <a:buSzTx/>
-              <a:buFontTx/>
-              <a:buNone/>
-              <a:tabLst/>
-              <a:defRPr/>
-            </a:pPr>
+            <a:r>
+              <a:rPr lang="en-US" altLang="zh-CN" dirty="0"/>
+              <a:t>On the finding &amp; binding Initiator endpoint, it broadcasts identify query to all nodes which include sleepy end device(using the broadcast address 0xffff). If no identify query response commands received, the initiator sets status to NO_IDENTIFY_QUERY_RESPONSE and terminates the finding &amp; binding procedure.</a:t>
+            </a:r>
+          </a:p>
+          <a:p>
+            <a:endParaRPr lang="en-US" dirty="0"/>
+          </a:p>
+          <a:p>
             <a:r>
               <a:rPr lang="en-US" dirty="0"/>
-              <a:t>Please look at the right graph, which shows the working flow of the finding &amp; binding procedure. We will talk about the target side firstly.</a:t>
-            </a:r>
-            <a:endParaRPr lang="en-US" altLang="zh-CN" dirty="0"/>
-          </a:p>
-          <a:p>
-            <a:endParaRPr lang="en-US" altLang="zh-CN" dirty="0"/>
+              <a:t>If at least one identify query response is received, the initiator sends IEEE address request to get the EUI64 of the target, which will be used for binding table entry later. And then the initiator sends simple descriptor request to get the clusters info on target. Once some clusters matched between initiator and target endpoints, then the binding is created for every matched clusters on initiator. If a group binding is requested, the initiator endpoint configures group membership of the target endpoint, which means that the initiator unicasts “add group” command to the target.</a:t>
+            </a:r>
+          </a:p>
+          <a:p>
+            <a:endParaRPr lang="en-US" dirty="0"/>
           </a:p>
           <a:p>
             <a:r>
               <a:rPr lang="en-US" altLang="zh-CN" dirty="0"/>
-              <a:t>On the finding &amp; binding target endpoint, once the finding &amp; binding target start, it will write the identify time attribute firstly to make sure the target can be identified.  In </a:t>
+              <a:t>In </a:t>
             </a:r>
             <a:r>
               <a:rPr lang="en-US" altLang="zh-CN" dirty="0" err="1"/>
@@ -3017,29 +2856,16 @@
             </a:r>
             <a:r>
               <a:rPr lang="en-US" altLang="zh-CN" dirty="0"/>
-              <a:t>, the identify time can be configurated in “Find and Bind Target” plugin and the default value is 180 seconds. During the identify time, the target should respond to the identify query from initiator. </a:t>
-            </a:r>
-            <a:r>
-              <a:rPr lang="en-US" dirty="0"/>
-              <a:t>Once the decrementing identify time </a:t>
-            </a:r>
-            <a:r>
-              <a:rPr lang="en-US" altLang="zh-CN" dirty="0"/>
-              <a:t>attribute</a:t>
-            </a:r>
-            <a:r>
-              <a:rPr lang="en-US" dirty="0"/>
-              <a:t> reaches zero, the target shall terminate the finding &amp; binding procedure.</a:t>
-            </a:r>
-          </a:p>
-          <a:p>
-            <a:endParaRPr lang="en-US" altLang="zh-CN" dirty="0"/>
-          </a:p>
-          <a:p>
-            <a:r>
-              <a:rPr lang="en-US" altLang="zh-CN" dirty="0"/>
-              <a:t>It means that the finding &amp; binding target should write identify time attribute to make sure it can be identified during the finding &amp; binding procedure.</a:t>
-            </a:r>
+              <a:t>, there are two options can be configured in “Find and Bind Initiator” plugin. The “Target Responses Count” means the number of the target responses that the initiator will accept. The “Target Responses Delay” means how long the initiator will listen for target responses. You can feel free to configure these options to fit your user case.</a:t>
+            </a:r>
+          </a:p>
+          <a:p>
+            <a:endParaRPr lang="en-US" dirty="0"/>
+          </a:p>
+          <a:p>
+            <a:endParaRPr lang="en-US" dirty="0"/>
+          </a:p>
+          <a:p>
             <a:endParaRPr lang="en-US" dirty="0"/>
           </a:p>
         </p:txBody>
@@ -3070,7 +2896,7 @@
     </p:spTree>
     <p:extLst>
       <p:ext uri="{BB962C8B-B14F-4D97-AF65-F5344CB8AC3E}">
-        <p14:creationId xmlns:p14="http://schemas.microsoft.com/office/powerpoint/2010/main" val="1971553287"/>
+        <p14:creationId xmlns:p14="http://schemas.microsoft.com/office/powerpoint/2010/main" val="303838822"/>
       </p:ext>
     </p:extLst>
   </p:cSld>
@@ -3124,42 +2950,151 @@
           <a:bodyPr/>
           <a:lstStyle/>
           <a:p>
-            <a:r>
-              <a:rPr lang="en-US" altLang="zh-CN" dirty="0"/>
-              <a:t>On the finding &amp; binding Initiator endpoint, it broadcasts identify query to all nodes which include sleepy end device(using the broadcast address 0xffff). If no identify query response commands received, the initiator sets status to NO_IDENTIFY_QUERY_RESPONSE and terminates the finding &amp; binding procedure.</a:t>
-            </a:r>
-          </a:p>
-          <a:p>
-            <a:endParaRPr lang="en-US" dirty="0"/>
-          </a:p>
-          <a:p>
+            <a:pPr marL="0" marR="0" lvl="0" indent="0" algn="l" defTabSz="914400" rtl="0" eaLnBrk="1" fontAlgn="auto" latinLnBrk="0" hangingPunct="1">
+              <a:lnSpc>
+                <a:spcPct val="100000"/>
+              </a:lnSpc>
+              <a:spcBef>
+                <a:spcPts val="0"/>
+              </a:spcBef>
+              <a:spcAft>
+                <a:spcPts val="0"/>
+              </a:spcAft>
+              <a:buClrTx/>
+              <a:buSzTx/>
+              <a:buFontTx/>
+              <a:buNone/>
+              <a:tabLst/>
+              <a:defRPr/>
+            </a:pPr>
+            <a:r>
+              <a:rPr lang="en-US" altLang="zh-CN" sz="1200" dirty="0"/>
+              <a:t>You may want to know what are the APIs to start finding &amp; binding operations.</a:t>
+            </a:r>
+          </a:p>
+          <a:p>
+            <a:pPr marL="0" marR="0" lvl="0" indent="0" algn="l" defTabSz="914400" rtl="0" eaLnBrk="1" fontAlgn="auto" latinLnBrk="0" hangingPunct="1">
+              <a:lnSpc>
+                <a:spcPct val="100000"/>
+              </a:lnSpc>
+              <a:spcBef>
+                <a:spcPts val="0"/>
+              </a:spcBef>
+              <a:spcAft>
+                <a:spcPts val="0"/>
+              </a:spcAft>
+              <a:buClrTx/>
+              <a:buSzTx/>
+              <a:buFontTx/>
+              <a:buNone/>
+              <a:tabLst/>
+              <a:defRPr/>
+            </a:pPr>
+            <a:endParaRPr lang="en-US" altLang="zh-CN" sz="1200" dirty="0"/>
+          </a:p>
+          <a:p>
+            <a:pPr marL="0" marR="0" lvl="0" indent="0" algn="l" defTabSz="914400" rtl="0" eaLnBrk="1" fontAlgn="auto" latinLnBrk="0" hangingPunct="1">
+              <a:lnSpc>
+                <a:spcPct val="100000"/>
+              </a:lnSpc>
+              <a:spcBef>
+                <a:spcPts val="0"/>
+              </a:spcBef>
+              <a:spcAft>
+                <a:spcPts val="0"/>
+              </a:spcAft>
+              <a:buClrTx/>
+              <a:buSzTx/>
+              <a:buFontTx/>
+              <a:buNone/>
+              <a:tabLst/>
+              <a:defRPr/>
+            </a:pPr>
+            <a:r>
+              <a:rPr lang="en-US" altLang="zh-CN" sz="1200" dirty="0"/>
+              <a:t>The API to s</a:t>
+            </a:r>
             <a:r>
               <a:rPr lang="en-US" dirty="0"/>
-              <a:t>If at least one identify query response is received, the initiator sends IEEE address request to get the EUI64 of the target, which will be used for binding table entry later. And then the initiator sends simple descriptor request to get the clusters info on target. Once some clusters matched between initiator and target endpoints, then the binding is created for every matched clusters on initiator. If a group binding is requested, the initiator endpoint configures group membership of the target endpoint, which means that the initiator unicasts “add group” command to the target.</a:t>
-            </a:r>
-          </a:p>
-          <a:p>
-            <a:endParaRPr lang="en-US" dirty="0"/>
-          </a:p>
-          <a:p>
-            <a:r>
-              <a:rPr lang="en-US" altLang="zh-CN" dirty="0"/>
-              <a:t>In </a:t>
-            </a:r>
-            <a:r>
-              <a:rPr lang="en-US" altLang="zh-CN" dirty="0" err="1"/>
-              <a:t>Appbuilder</a:t>
-            </a:r>
-            <a:r>
-              <a:rPr lang="en-US" altLang="zh-CN" dirty="0"/>
-              <a:t>, there are two options can be configured in “Find and Bind Initiator” plugin. The “Target Responses Count” means the number of the target responses that the initiator will accept. The “Target Responses Delay” means how long the initiator will listen for target responses. You can feel free to configure these options to fit your user case.</a:t>
-            </a:r>
-          </a:p>
-          <a:p>
-            <a:endParaRPr lang="en-US" dirty="0"/>
-          </a:p>
-          <a:p>
-            <a:endParaRPr lang="en-US" dirty="0"/>
+              <a:t>tart target finding and binding operations is </a:t>
+            </a:r>
+            <a:r>
+              <a:rPr lang="en-US" dirty="0" err="1"/>
+              <a:t>emberAfPluginFindAndBindTargetStart</a:t>
+            </a:r>
+            <a:r>
+              <a:rPr lang="en-US" dirty="0"/>
+              <a:t>(), which can be found in find-and-bind-</a:t>
+            </a:r>
+            <a:r>
+              <a:rPr lang="en-US" dirty="0" err="1"/>
+              <a:t>target.h</a:t>
+            </a:r>
+            <a:r>
+              <a:rPr lang="en-US" dirty="0"/>
+              <a:t>. It is a </a:t>
+            </a:r>
+            <a:r>
+              <a:rPr lang="en-US" sz="1200" dirty="0"/>
+              <a:t>call to this function will commence the target finding and binding operations. Specifically, the target will attempt to start identifying on the endpoint that is passed as a parameter. The </a:t>
+            </a:r>
+            <a:r>
+              <a:rPr lang="en-US" sz="1200" dirty="0" err="1"/>
+              <a:t>EmberAfStatus</a:t>
+            </a:r>
+            <a:r>
+              <a:rPr lang="en-US" sz="1200" dirty="0"/>
+              <a:t> value describing the success of the commencement of the target operations.</a:t>
+            </a:r>
+          </a:p>
+          <a:p>
+            <a:endParaRPr lang="en-US" sz="1200" dirty="0"/>
+          </a:p>
+          <a:p>
+            <a:r>
+              <a:rPr lang="en-US" sz="1200" dirty="0"/>
+              <a:t>As the similar, the API to start initiator finding and binding operations is </a:t>
+            </a:r>
+            <a:r>
+              <a:rPr lang="en-US" dirty="0" err="1"/>
+              <a:t>emberAfPluginFindAndBindInitiatorStart</a:t>
+            </a:r>
+            <a:r>
+              <a:rPr lang="en-US" dirty="0"/>
+              <a:t>(), which can be found in find-and-bind-</a:t>
+            </a:r>
+            <a:r>
+              <a:rPr lang="en-US" dirty="0" err="1"/>
+              <a:t>initiator.h</a:t>
+            </a:r>
+            <a:r>
+              <a:rPr lang="en-US" dirty="0"/>
+              <a:t>. It is a </a:t>
+            </a:r>
+            <a:r>
+              <a:rPr lang="en-US" sz="1200" dirty="0"/>
+              <a:t>call to this function will commence the initiator finding and binding operations. Specifically, the initiator will attempt to start searching for potential bindings that can be made with identifying targets. The </a:t>
+            </a:r>
+            <a:r>
+              <a:rPr lang="en-US" sz="1200" dirty="0" err="1"/>
+              <a:t>EmberStatus</a:t>
+            </a:r>
+            <a:r>
+              <a:rPr lang="en-US" sz="1200" dirty="0"/>
+              <a:t> value describing the success of the commencement of the initiator operations.</a:t>
+            </a:r>
+          </a:p>
+          <a:p>
+            <a:endParaRPr lang="en-US" sz="1200" dirty="0"/>
+          </a:p>
+          <a:p>
+            <a:r>
+              <a:rPr lang="en-US" sz="1200" dirty="0"/>
+              <a:t>Please note that, the target should be started first during the finding &amp; binding procedure. </a:t>
+            </a:r>
+          </a:p>
+          <a:p>
+            <a:endParaRPr lang="en-US" sz="1200" dirty="0"/>
           </a:p>
           <a:p>
             <a:endParaRPr lang="en-US" dirty="0"/>
@@ -3192,7 +3127,7 @@
     </p:spTree>
     <p:extLst>
       <p:ext uri="{BB962C8B-B14F-4D97-AF65-F5344CB8AC3E}">
-        <p14:creationId xmlns:p14="http://schemas.microsoft.com/office/powerpoint/2010/main" val="303838822"/>
+        <p14:creationId xmlns:p14="http://schemas.microsoft.com/office/powerpoint/2010/main" val="375352853"/>
       </p:ext>
     </p:extLst>
   </p:cSld>
@@ -3246,6 +3181,37 @@
           <a:bodyPr/>
           <a:lstStyle/>
           <a:p>
+            <a:r>
+              <a:rPr lang="en-US" dirty="0"/>
+              <a:t>It is easy to set up the testing for finding &amp; binding with Z3LightSoc and Z3SwitchSoc samples.</a:t>
+            </a:r>
+          </a:p>
+          <a:p>
+            <a:r>
+              <a:rPr lang="en-US" dirty="0"/>
+              <a:t>First you can build the two samples directly, download the firmware to the kits separately, and then join to the same Z3.0 network formed by a Z3Gateway.</a:t>
+            </a:r>
+          </a:p>
+          <a:p>
+            <a:r>
+              <a:rPr lang="en-US" dirty="0"/>
+              <a:t>On the Z3LightSoc side, launch the console and type CLI command “</a:t>
+            </a:r>
+            <a:r>
+              <a:rPr lang="en-US" sz="1200" dirty="0">
+                <a:solidFill>
+                  <a:prstClr val="black"/>
+                </a:solidFill>
+                <a:latin typeface="Lucida Console" panose="020B0609040504020204" pitchFamily="49" charset="0"/>
+              </a:rPr>
+              <a:t>plugin find-and-bind target 1</a:t>
+            </a:r>
+            <a:r>
+              <a:rPr lang="en-US" dirty="0"/>
+              <a:t>”.</a:t>
+            </a:r>
+          </a:p>
+          <a:p>
             <a:pPr marL="0" marR="0" lvl="0" indent="0" algn="l" defTabSz="914400" rtl="0" eaLnBrk="1" fontAlgn="auto" latinLnBrk="0" hangingPunct="1">
               <a:lnSpc>
                 <a:spcPct val="100000"/>
@@ -3264,8 +3230,21 @@
               <a:defRPr/>
             </a:pPr>
             <a:r>
-              <a:rPr lang="en-US" altLang="zh-CN" sz="1200" dirty="0"/>
-              <a:t>You may want to know what are the APIs to start finding &amp; binding operations.</a:t>
+              <a:rPr lang="en-US" dirty="0"/>
+              <a:t>On the Z3SwitchSoc side, launch the console and type CLI command  “</a:t>
+            </a:r>
+            <a:r>
+              <a:rPr lang="en-US" sz="1200" dirty="0">
+                <a:solidFill>
+                  <a:prstClr val="black"/>
+                </a:solidFill>
+                <a:latin typeface="Lucida Console" panose="020B0609040504020204" pitchFamily="49" charset="0"/>
+              </a:rPr>
+              <a:t>plugin find-and-bind initiator 1</a:t>
+            </a:r>
+            <a:r>
+              <a:rPr lang="en-US" dirty="0"/>
+              <a:t>”. </a:t>
             </a:r>
           </a:p>
           <a:p>
@@ -3286,7 +3265,7 @@
               <a:tabLst/>
               <a:defRPr/>
             </a:pPr>
-            <a:endParaRPr lang="en-US" altLang="zh-CN" sz="1200" dirty="0"/>
+            <a:endParaRPr lang="en-US" dirty="0"/>
           </a:p>
           <a:p>
             <a:pPr marL="0" marR="0" lvl="0" indent="0" algn="l" defTabSz="914400" rtl="0" eaLnBrk="1" fontAlgn="auto" latinLnBrk="0" hangingPunct="1">
@@ -3307,90 +3286,110 @@
               <a:defRPr/>
             </a:pPr>
             <a:r>
-              <a:rPr lang="en-US" altLang="zh-CN" sz="1200" dirty="0"/>
-              <a:t>The API to s</a:t>
-            </a:r>
-            <a:r>
               <a:rPr lang="en-US" dirty="0"/>
-              <a:t>tart target finding and binding operations is </a:t>
-            </a:r>
-            <a:r>
-              <a:rPr lang="en-US" dirty="0" err="1"/>
-              <a:t>emberAfPluginFindAndBindTargetStart</a:t>
+              <a:t>You will see the log “Find and bind initiator complete: 0x00” is printed on console after the finding &amp; binding procedure finish. When you print the binding table on </a:t>
+            </a:r>
+            <a:r>
+              <a:rPr lang="en-US" altLang="zh-CN" dirty="0"/>
+              <a:t>Z3SwitchSoc side(initiator), you will see the entries are created in binding table. All the matched clusters between initiator and target are bound.</a:t>
             </a:r>
             <a:r>
               <a:rPr lang="en-US" dirty="0"/>
-              <a:t>(), which can be found in find-and-bind-</a:t>
-            </a:r>
-            <a:r>
-              <a:rPr lang="en-US" dirty="0" err="1"/>
-              <a:t>target.h</a:t>
-            </a:r>
+              <a:t> The finding &amp; binding transactions can be found in packet trace, which proves the finding &amp; binding working flow works as expected.</a:t>
+            </a:r>
+          </a:p>
+          <a:p>
+            <a:pPr marL="0" marR="0" lvl="0" indent="0" algn="l" defTabSz="914400" rtl="0" eaLnBrk="1" fontAlgn="auto" latinLnBrk="0" hangingPunct="1">
+              <a:lnSpc>
+                <a:spcPct val="100000"/>
+              </a:lnSpc>
+              <a:spcBef>
+                <a:spcPts val="0"/>
+              </a:spcBef>
+              <a:spcAft>
+                <a:spcPts val="0"/>
+              </a:spcAft>
+              <a:buClrTx/>
+              <a:buSzTx/>
+              <a:buFontTx/>
+              <a:buNone/>
+              <a:tabLst/>
+              <a:defRPr/>
+            </a:pPr>
+            <a:endParaRPr lang="en-US" dirty="0"/>
+          </a:p>
+          <a:p>
+            <a:pPr marL="0" marR="0" lvl="0" indent="0" algn="l" defTabSz="914400" rtl="0" eaLnBrk="1" fontAlgn="auto" latinLnBrk="0" hangingPunct="1">
+              <a:lnSpc>
+                <a:spcPct val="100000"/>
+              </a:lnSpc>
+              <a:spcBef>
+                <a:spcPts val="0"/>
+              </a:spcBef>
+              <a:spcAft>
+                <a:spcPts val="0"/>
+              </a:spcAft>
+              <a:buClrTx/>
+              <a:buSzTx/>
+              <a:buFontTx/>
+              <a:buNone/>
+              <a:tabLst/>
+              <a:defRPr/>
+            </a:pPr>
             <a:r>
               <a:rPr lang="en-US" dirty="0"/>
-              <a:t>. It is a </a:t>
+              <a:t>Let’s summarize how the finding and binding procedure works.</a:t>
+            </a:r>
+          </a:p>
+          <a:p>
+            <a:pPr marL="0" marR="0" lvl="0" indent="0" algn="l" defTabSz="914400" rtl="0" eaLnBrk="1" fontAlgn="auto" latinLnBrk="0" hangingPunct="1">
+              <a:lnSpc>
+                <a:spcPct val="100000"/>
+              </a:lnSpc>
+              <a:spcBef>
+                <a:spcPts val="0"/>
+              </a:spcBef>
+              <a:spcAft>
+                <a:spcPts val="0"/>
+              </a:spcAft>
+              <a:buClrTx/>
+              <a:buSzTx/>
+              <a:buFontTx/>
+              <a:buNone/>
+              <a:tabLst/>
+              <a:defRPr/>
+            </a:pPr>
+            <a:endParaRPr lang="en-US" dirty="0"/>
+          </a:p>
+          <a:p>
+            <a:pPr marL="0" marR="0" lvl="0" indent="0" algn="l" defTabSz="914400" rtl="0" eaLnBrk="1" fontAlgn="auto" latinLnBrk="0" hangingPunct="1">
+              <a:lnSpc>
+                <a:spcPct val="100000"/>
+              </a:lnSpc>
+              <a:spcBef>
+                <a:spcPts val="0"/>
+              </a:spcBef>
+              <a:spcAft>
+                <a:spcPts val="0"/>
+              </a:spcAft>
+              <a:buClrTx/>
+              <a:buSzTx/>
+              <a:buFontTx/>
+              <a:buNone/>
+              <a:tabLst/>
+              <a:defRPr/>
+            </a:pPr>
+            <a:r>
+              <a:rPr lang="en-US" dirty="0"/>
+              <a:t>On the target side, it will write the identify time attribute for </a:t>
             </a:r>
             <a:r>
               <a:rPr lang="en-US" sz="1200" dirty="0"/>
-              <a:t>call to this function will commence the target finding and binding operations. Specifically, the target will attempt to start identifying on the endpoint that is passed as a parameter. The </a:t>
-            </a:r>
-            <a:r>
-              <a:rPr lang="en-US" sz="1200" dirty="0" err="1"/>
-              <a:t>EmberAfStatus</a:t>
-            </a:r>
-            <a:r>
-              <a:rPr lang="en-US" sz="1200" dirty="0"/>
-              <a:t> value describing the success of the commencement of the target operations.</a:t>
-            </a:r>
-          </a:p>
-          <a:p>
-            <a:endParaRPr lang="en-US" sz="1200" dirty="0"/>
-          </a:p>
-          <a:p>
-            <a:r>
-              <a:rPr lang="en-US" sz="1200" dirty="0"/>
-              <a:t>As the similar, the API to start initiator finding and binding operations is </a:t>
-            </a:r>
-            <a:r>
-              <a:rPr lang="en-US" dirty="0" err="1"/>
-              <a:t>emberAfPluginFindAndBindInitiatorStart</a:t>
-            </a:r>
-            <a:r>
-              <a:rPr lang="en-US" dirty="0"/>
-              <a:t>(), which can be found in find-and-bind-</a:t>
-            </a:r>
-            <a:r>
-              <a:rPr lang="en-US" dirty="0" err="1"/>
-              <a:t>initiator.h</a:t>
-            </a:r>
-            <a:r>
-              <a:rPr lang="en-US" dirty="0"/>
-              <a:t>. It is a </a:t>
-            </a:r>
-            <a:r>
-              <a:rPr lang="en-US" sz="1200" dirty="0"/>
-              <a:t>call to this function will commence the initiator finding and binding operations. Specifically, the initiator will attempt to start searching for potential bindings that can be made with identifying targets. The </a:t>
-            </a:r>
-            <a:r>
-              <a:rPr lang="en-US" sz="1200" dirty="0" err="1"/>
-              <a:t>EmberStatus</a:t>
-            </a:r>
-            <a:r>
-              <a:rPr lang="en-US" sz="1200" dirty="0"/>
-              <a:t> value describing the success of the commencement of the initiator operations.</a:t>
-            </a:r>
-          </a:p>
-          <a:p>
-            <a:endParaRPr lang="en-US" sz="1200" dirty="0"/>
-          </a:p>
-          <a:p>
-            <a:r>
-              <a:rPr lang="en-US" sz="1200" dirty="0"/>
-              <a:t>Please note that, the target should be started first during the finding &amp; binding procedure. </a:t>
-            </a:r>
-          </a:p>
-          <a:p>
-            <a:endParaRPr lang="en-US" sz="1200" dirty="0"/>
+              <a:t>EMBER_AF_PLUGIN_FIND_AND_BIND_TARGET_COMMISSIONING_TIME. During the duration, the initiator broadcasts identify query and the target responds identify query response. Then the initiator sends IEEE address request to target to get the EUI64 of target, which will be used in creating binding table. The simple descriptor request will be sent to target to get the clusters info on target side. Once the clusters matched, the entries will be created in binding table of initiator.</a:t>
+            </a:r>
+          </a:p>
+          <a:p>
+            <a:endParaRPr lang="en-US" dirty="0"/>
           </a:p>
           <a:p>
             <a:endParaRPr lang="en-US" dirty="0"/>
@@ -3423,7 +3422,7 @@
     </p:spTree>
     <p:extLst>
       <p:ext uri="{BB962C8B-B14F-4D97-AF65-F5344CB8AC3E}">
-        <p14:creationId xmlns:p14="http://schemas.microsoft.com/office/powerpoint/2010/main" val="375352853"/>
+        <p14:creationId xmlns:p14="http://schemas.microsoft.com/office/powerpoint/2010/main" val="3054970404"/>
       </p:ext>
     </p:extLst>
   </p:cSld>
@@ -3561,37 +3560,6 @@
           <a:bodyPr/>
           <a:lstStyle/>
           <a:p>
-            <a:r>
-              <a:rPr lang="en-US" dirty="0"/>
-              <a:t>It is easy to set up the testing for finding &amp; binding with Z3LightSoc and Z3SwitchSoc samples.</a:t>
-            </a:r>
-          </a:p>
-          <a:p>
-            <a:r>
-              <a:rPr lang="en-US" dirty="0"/>
-              <a:t>First you can build the two samples directly, download the firmware to the kits separately, and then join to the same Z3.0 network formed by a Z3Gateway.</a:t>
-            </a:r>
-          </a:p>
-          <a:p>
-            <a:r>
-              <a:rPr lang="en-US" dirty="0"/>
-              <a:t>On the Z3LightSoc side, launch the console and type CLI command “</a:t>
-            </a:r>
-            <a:r>
-              <a:rPr lang="en-US" sz="1200" dirty="0">
-                <a:solidFill>
-                  <a:prstClr val="black"/>
-                </a:solidFill>
-                <a:latin typeface="Lucida Console" panose="020B0609040504020204" pitchFamily="49" charset="0"/>
-              </a:rPr>
-              <a:t>plugin find-and-bind target 1</a:t>
-            </a:r>
-            <a:r>
-              <a:rPr lang="en-US" dirty="0"/>
-              <a:t>”.</a:t>
-            </a:r>
-          </a:p>
-          <a:p>
             <a:pPr marL="0" marR="0" lvl="0" indent="0" algn="l" defTabSz="914400" rtl="0" eaLnBrk="1" fontAlgn="auto" latinLnBrk="0" hangingPunct="1">
               <a:lnSpc>
                 <a:spcPct val="100000"/>
@@ -3610,21 +3578,8 @@
               <a:defRPr/>
             </a:pPr>
             <a:r>
-              <a:rPr lang="en-US" dirty="0"/>
-              <a:t>On the Z3SwitchSoc side, launch the console and type CLI command  “</a:t>
-            </a:r>
-            <a:r>
-              <a:rPr lang="en-US" sz="1200" dirty="0">
-                <a:solidFill>
-                  <a:prstClr val="black"/>
-                </a:solidFill>
-                <a:latin typeface="Lucida Console" panose="020B0609040504020204" pitchFamily="49" charset="0"/>
-              </a:rPr>
-              <a:t>plugin find-and-bind initiator 1</a:t>
-            </a:r>
-            <a:r>
-              <a:rPr lang="en-US" dirty="0"/>
-              <a:t>”. </a:t>
+              <a:rPr lang="en-US" altLang="zh-CN" sz="1200" dirty="0"/>
+              <a:t>You may want to know what are the APIs to start finding &amp; binding operations.</a:t>
             </a:r>
           </a:p>
           <a:p>
@@ -3645,7 +3600,7 @@
               <a:tabLst/>
               <a:defRPr/>
             </a:pPr>
-            <a:endParaRPr lang="en-US" dirty="0"/>
+            <a:endParaRPr lang="en-US" altLang="zh-CN" sz="1200" dirty="0"/>
           </a:p>
           <a:p>
             <a:pPr marL="0" marR="0" lvl="0" indent="0" algn="l" defTabSz="914400" rtl="0" eaLnBrk="1" fontAlgn="auto" latinLnBrk="0" hangingPunct="1">
@@ -3666,110 +3621,90 @@
               <a:defRPr/>
             </a:pPr>
             <a:r>
+              <a:rPr lang="en-US" altLang="zh-CN" sz="1200" dirty="0"/>
+              <a:t>The API to s</a:t>
+            </a:r>
+            <a:r>
               <a:rPr lang="en-US" dirty="0"/>
-              <a:t>You will see the log “Find and bind initiator complete: 0x00” is printed on console after the finding &amp; binding procedure finish. When you print the binding table on </a:t>
-            </a:r>
-            <a:r>
-              <a:rPr lang="en-US" altLang="zh-CN" dirty="0"/>
-              <a:t>Z3SwitchSoc side(initiator), you will see the entries are created in binding table. All the matched clusters between initiator and target are bound.</a:t>
+              <a:t>tart target finding and binding operations is </a:t>
+            </a:r>
+            <a:r>
+              <a:rPr lang="en-US" dirty="0" err="1"/>
+              <a:t>emberAfPluginFindAndBindTargetStart</a:t>
             </a:r>
             <a:r>
               <a:rPr lang="en-US" dirty="0"/>
-              <a:t> The finding &amp; binding transactions can be found in packet trace, which proves the finding &amp; binding working flow works as expected.</a:t>
-            </a:r>
-          </a:p>
-          <a:p>
-            <a:pPr marL="0" marR="0" lvl="0" indent="0" algn="l" defTabSz="914400" rtl="0" eaLnBrk="1" fontAlgn="auto" latinLnBrk="0" hangingPunct="1">
-              <a:lnSpc>
-                <a:spcPct val="100000"/>
-              </a:lnSpc>
-              <a:spcBef>
-                <a:spcPts val="0"/>
-              </a:spcBef>
-              <a:spcAft>
-                <a:spcPts val="0"/>
-              </a:spcAft>
-              <a:buClrTx/>
-              <a:buSzTx/>
-              <a:buFontTx/>
-              <a:buNone/>
-              <a:tabLst/>
-              <a:defRPr/>
-            </a:pPr>
-            <a:endParaRPr lang="en-US" dirty="0"/>
-          </a:p>
-          <a:p>
-            <a:pPr marL="0" marR="0" lvl="0" indent="0" algn="l" defTabSz="914400" rtl="0" eaLnBrk="1" fontAlgn="auto" latinLnBrk="0" hangingPunct="1">
-              <a:lnSpc>
-                <a:spcPct val="100000"/>
-              </a:lnSpc>
-              <a:spcBef>
-                <a:spcPts val="0"/>
-              </a:spcBef>
-              <a:spcAft>
-                <a:spcPts val="0"/>
-              </a:spcAft>
-              <a:buClrTx/>
-              <a:buSzTx/>
-              <a:buFontTx/>
-              <a:buNone/>
-              <a:tabLst/>
-              <a:defRPr/>
-            </a:pPr>
+              <a:t>(), which can be found in find-and-bind-</a:t>
+            </a:r>
+            <a:r>
+              <a:rPr lang="en-US" dirty="0" err="1"/>
+              <a:t>target.h</a:t>
+            </a:r>
             <a:r>
               <a:rPr lang="en-US" dirty="0"/>
-              <a:t>Let’s summarize how the finding and binding procedure works.</a:t>
-            </a:r>
-          </a:p>
-          <a:p>
-            <a:pPr marL="0" marR="0" lvl="0" indent="0" algn="l" defTabSz="914400" rtl="0" eaLnBrk="1" fontAlgn="auto" latinLnBrk="0" hangingPunct="1">
-              <a:lnSpc>
-                <a:spcPct val="100000"/>
-              </a:lnSpc>
-              <a:spcBef>
-                <a:spcPts val="0"/>
-              </a:spcBef>
-              <a:spcAft>
-                <a:spcPts val="0"/>
-              </a:spcAft>
-              <a:buClrTx/>
-              <a:buSzTx/>
-              <a:buFontTx/>
-              <a:buNone/>
-              <a:tabLst/>
-              <a:defRPr/>
-            </a:pPr>
-            <a:endParaRPr lang="en-US" dirty="0"/>
-          </a:p>
-          <a:p>
-            <a:pPr marL="0" marR="0" lvl="0" indent="0" algn="l" defTabSz="914400" rtl="0" eaLnBrk="1" fontAlgn="auto" latinLnBrk="0" hangingPunct="1">
-              <a:lnSpc>
-                <a:spcPct val="100000"/>
-              </a:lnSpc>
-              <a:spcBef>
-                <a:spcPts val="0"/>
-              </a:spcBef>
-              <a:spcAft>
-                <a:spcPts val="0"/>
-              </a:spcAft>
-              <a:buClrTx/>
-              <a:buSzTx/>
-              <a:buFontTx/>
-              <a:buNone/>
-              <a:tabLst/>
-              <a:defRPr/>
-            </a:pPr>
+              <a:t>. It is a </a:t>
+            </a:r>
+            <a:r>
+              <a:rPr lang="en-US" sz="1200" dirty="0"/>
+              <a:t>call to this function will commence the target finding and binding operations. Specifically, the target will attempt to start identifying on the endpoint that is passed as a parameter. The </a:t>
+            </a:r>
+            <a:r>
+              <a:rPr lang="en-US" sz="1200" dirty="0" err="1"/>
+              <a:t>EmberAfStatus</a:t>
+            </a:r>
+            <a:r>
+              <a:rPr lang="en-US" sz="1200" dirty="0"/>
+              <a:t> value describing the success of the commencement of the target operations.</a:t>
+            </a:r>
+          </a:p>
+          <a:p>
+            <a:endParaRPr lang="en-US" sz="1200" dirty="0"/>
+          </a:p>
+          <a:p>
+            <a:r>
+              <a:rPr lang="en-US" sz="1200" dirty="0"/>
+              <a:t>As the similar, the API to start initiator finding and binding operations is </a:t>
+            </a:r>
+            <a:r>
+              <a:rPr lang="en-US" dirty="0" err="1"/>
+              <a:t>emberAfPluginFindAndBindInitiatorStart</a:t>
+            </a:r>
             <a:r>
               <a:rPr lang="en-US" dirty="0"/>
-              <a:t>On the target side, it will write the identify time attribute for </a:t>
+              <a:t>(), which can be found in find-and-bind-</a:t>
+            </a:r>
+            <a:r>
+              <a:rPr lang="en-US" dirty="0" err="1"/>
+              <a:t>initiator.h</a:t>
+            </a:r>
+            <a:r>
+              <a:rPr lang="en-US" dirty="0"/>
+              <a:t>. It is a </a:t>
             </a:r>
             <a:r>
               <a:rPr lang="en-US" sz="1200" dirty="0"/>
-              <a:t>EMBER_AF_PLUGIN_FIND_AND_BIND_TARGET_COMMISSIONING_TIME. During the duration, the initiator broadcasts identify query and the target responds identify query response. Then the initiator sends IEEE address request to target to get the EUI64 of target, which will be used in creating binding table. The simple descriptor request will be sent to target to get the clusters info on target side. Once the clusters matched, the entries will be created in binding table of initiator.</a:t>
-            </a:r>
-          </a:p>
-          <a:p>
-            <a:endParaRPr lang="en-US" dirty="0"/>
+              <a:t>call to this function will commence the initiator finding and binding operations. Specifically, the initiator will attempt to start searching for potential bindings that can be made with identifying targets. The </a:t>
+            </a:r>
+            <a:r>
+              <a:rPr lang="en-US" sz="1200" dirty="0" err="1"/>
+              <a:t>EmberStatus</a:t>
+            </a:r>
+            <a:r>
+              <a:rPr lang="en-US" sz="1200" dirty="0"/>
+              <a:t> value describing the success of the commencement of the initiator operations.</a:t>
+            </a:r>
+          </a:p>
+          <a:p>
+            <a:endParaRPr lang="en-US" sz="1200" dirty="0"/>
+          </a:p>
+          <a:p>
+            <a:r>
+              <a:rPr lang="en-US" sz="1200" dirty="0"/>
+              <a:t>Please note that, the target should be started first during the finding &amp; binding procedure. </a:t>
+            </a:r>
+          </a:p>
+          <a:p>
+            <a:endParaRPr lang="en-US" sz="1200" dirty="0"/>
           </a:p>
           <a:p>
             <a:endParaRPr lang="en-US" dirty="0"/>
@@ -3802,7 +3737,7 @@
     </p:spTree>
     <p:extLst>
       <p:ext uri="{BB962C8B-B14F-4D97-AF65-F5344CB8AC3E}">
-        <p14:creationId xmlns:p14="http://schemas.microsoft.com/office/powerpoint/2010/main" val="3054970404"/>
+        <p14:creationId xmlns:p14="http://schemas.microsoft.com/office/powerpoint/2010/main" val="72358110"/>
       </p:ext>
     </p:extLst>
   </p:cSld>
@@ -3856,153 +3791,6 @@
           <a:bodyPr/>
           <a:lstStyle/>
           <a:p>
-            <a:pPr marL="0" marR="0" lvl="0" indent="0" algn="l" defTabSz="914400" rtl="0" eaLnBrk="1" fontAlgn="auto" latinLnBrk="0" hangingPunct="1">
-              <a:lnSpc>
-                <a:spcPct val="100000"/>
-              </a:lnSpc>
-              <a:spcBef>
-                <a:spcPts val="0"/>
-              </a:spcBef>
-              <a:spcAft>
-                <a:spcPts val="0"/>
-              </a:spcAft>
-              <a:buClrTx/>
-              <a:buSzTx/>
-              <a:buFontTx/>
-              <a:buNone/>
-              <a:tabLst/>
-              <a:defRPr/>
-            </a:pPr>
-            <a:r>
-              <a:rPr lang="en-US" altLang="zh-CN" sz="1200" dirty="0"/>
-              <a:t>You may want to know what are the APIs to start finding &amp; binding operations.</a:t>
-            </a:r>
-          </a:p>
-          <a:p>
-            <a:pPr marL="0" marR="0" lvl="0" indent="0" algn="l" defTabSz="914400" rtl="0" eaLnBrk="1" fontAlgn="auto" latinLnBrk="0" hangingPunct="1">
-              <a:lnSpc>
-                <a:spcPct val="100000"/>
-              </a:lnSpc>
-              <a:spcBef>
-                <a:spcPts val="0"/>
-              </a:spcBef>
-              <a:spcAft>
-                <a:spcPts val="0"/>
-              </a:spcAft>
-              <a:buClrTx/>
-              <a:buSzTx/>
-              <a:buFontTx/>
-              <a:buNone/>
-              <a:tabLst/>
-              <a:defRPr/>
-            </a:pPr>
-            <a:endParaRPr lang="en-US" altLang="zh-CN" sz="1200" dirty="0"/>
-          </a:p>
-          <a:p>
-            <a:pPr marL="0" marR="0" lvl="0" indent="0" algn="l" defTabSz="914400" rtl="0" eaLnBrk="1" fontAlgn="auto" latinLnBrk="0" hangingPunct="1">
-              <a:lnSpc>
-                <a:spcPct val="100000"/>
-              </a:lnSpc>
-              <a:spcBef>
-                <a:spcPts val="0"/>
-              </a:spcBef>
-              <a:spcAft>
-                <a:spcPts val="0"/>
-              </a:spcAft>
-              <a:buClrTx/>
-              <a:buSzTx/>
-              <a:buFontTx/>
-              <a:buNone/>
-              <a:tabLst/>
-              <a:defRPr/>
-            </a:pPr>
-            <a:r>
-              <a:rPr lang="en-US" altLang="zh-CN" sz="1200" dirty="0"/>
-              <a:t>The API to s</a:t>
-            </a:r>
-            <a:r>
-              <a:rPr lang="en-US" dirty="0"/>
-              <a:t>tart target finding and binding operations is </a:t>
-            </a:r>
-            <a:r>
-              <a:rPr lang="en-US" dirty="0" err="1"/>
-              <a:t>emberAfPluginFindAndBindTargetStart</a:t>
-            </a:r>
-            <a:r>
-              <a:rPr lang="en-US" dirty="0"/>
-              <a:t>(), which can be found in find-and-bind-</a:t>
-            </a:r>
-            <a:r>
-              <a:rPr lang="en-US" dirty="0" err="1"/>
-              <a:t>target.h</a:t>
-            </a:r>
-            <a:r>
-              <a:rPr lang="en-US" dirty="0"/>
-              <a:t>. It is a </a:t>
-            </a:r>
-            <a:r>
-              <a:rPr lang="en-US" sz="1200" dirty="0"/>
-              <a:t>call to this function will commence the target finding and binding operations. Specifically, the target will attempt to start identifying on the endpoint that is passed as a parameter. The </a:t>
-            </a:r>
-            <a:r>
-              <a:rPr lang="en-US" sz="1200" dirty="0" err="1"/>
-              <a:t>EmberAfStatus</a:t>
-            </a:r>
-            <a:r>
-              <a:rPr lang="en-US" sz="1200" dirty="0"/>
-              <a:t> value describing the success of the commencement of the target operations.</a:t>
-            </a:r>
-          </a:p>
-          <a:p>
-            <a:endParaRPr lang="en-US" sz="1200" dirty="0"/>
-          </a:p>
-          <a:p>
-            <a:r>
-              <a:rPr lang="en-US" sz="1200" dirty="0"/>
-              <a:t>As the similar, the API to start initiator finding and binding operations is </a:t>
-            </a:r>
-            <a:r>
-              <a:rPr lang="en-US" dirty="0" err="1"/>
-              <a:t>emberAfPluginFindAndBindInitiatorStart</a:t>
-            </a:r>
-            <a:r>
-              <a:rPr lang="en-US" dirty="0"/>
-              <a:t>(), which can be found in find-and-bind-</a:t>
-            </a:r>
-            <a:r>
-              <a:rPr lang="en-US" dirty="0" err="1"/>
-              <a:t>initiator.h</a:t>
-            </a:r>
-            <a:r>
-              <a:rPr lang="en-US" dirty="0"/>
-              <a:t>. It is a </a:t>
-            </a:r>
-            <a:r>
-              <a:rPr lang="en-US" sz="1200" dirty="0"/>
-              <a:t>call to this function will commence the initiator finding and binding operations. Specifically, the initiator will attempt to start searching for potential bindings that can be made with identifying targets. The </a:t>
-            </a:r>
-            <a:r>
-              <a:rPr lang="en-US" sz="1200" dirty="0" err="1"/>
-              <a:t>EmberStatus</a:t>
-            </a:r>
-            <a:r>
-              <a:rPr lang="en-US" sz="1200" dirty="0"/>
-              <a:t> value describing the success of the commencement of the initiator operations.</a:t>
-            </a:r>
-          </a:p>
-          <a:p>
-            <a:endParaRPr lang="en-US" sz="1200" dirty="0"/>
-          </a:p>
-          <a:p>
-            <a:r>
-              <a:rPr lang="en-US" sz="1200" dirty="0"/>
-              <a:t>Please note that, the target should be started first during the finding &amp; binding procedure. </a:t>
-            </a:r>
-          </a:p>
-          <a:p>
-            <a:endParaRPr lang="en-US" sz="1200" dirty="0"/>
-          </a:p>
-          <a:p>
             <a:endParaRPr lang="en-US" dirty="0"/>
           </a:p>
         </p:txBody>
@@ -4022,7 +3810,7 @@
           <a:bodyPr/>
           <a:lstStyle/>
           <a:p>
-            <a:fld id="{C75FF4B0-9BED-1F44-B7FA-2C35D3BE17CF}" type="slidenum">
+            <a:fld id="{5D787E92-135F-034D-9DC8-7FF1198D5B11}" type="slidenum">
               <a:rPr lang="en-US" smtClean="0"/>
               <a:t>21</a:t>
             </a:fld>
@@ -4033,7 +3821,7 @@
     </p:spTree>
     <p:extLst>
       <p:ext uri="{BB962C8B-B14F-4D97-AF65-F5344CB8AC3E}">
-        <p14:creationId xmlns:p14="http://schemas.microsoft.com/office/powerpoint/2010/main" val="72358110"/>
+        <p14:creationId xmlns:p14="http://schemas.microsoft.com/office/powerpoint/2010/main" val="1090473428"/>
       </p:ext>
     </p:extLst>
   </p:cSld>
@@ -4087,90 +3875,6 @@
           <a:bodyPr/>
           <a:lstStyle/>
           <a:p>
-            <a:endParaRPr lang="en-US" dirty="0"/>
-          </a:p>
-        </p:txBody>
-      </p:sp>
-      <p:sp>
-        <p:nvSpPr>
-          <p:cNvPr id="4" name="Slide Number Placeholder 3"/>
-          <p:cNvSpPr>
-            <a:spLocks noGrp="1"/>
-          </p:cNvSpPr>
-          <p:nvPr>
-            <p:ph type="sldNum" sz="quarter" idx="5"/>
-          </p:nvPr>
-        </p:nvSpPr>
-        <p:spPr/>
-        <p:txBody>
-          <a:bodyPr/>
-          <a:lstStyle/>
-          <a:p>
-            <a:fld id="{5D787E92-135F-034D-9DC8-7FF1198D5B11}" type="slidenum">
-              <a:rPr lang="en-US" smtClean="0"/>
-              <a:t>22</a:t>
-            </a:fld>
-            <a:endParaRPr lang="en-US"/>
-          </a:p>
-        </p:txBody>
-      </p:sp>
-    </p:spTree>
-    <p:extLst>
-      <p:ext uri="{BB962C8B-B14F-4D97-AF65-F5344CB8AC3E}">
-        <p14:creationId xmlns:p14="http://schemas.microsoft.com/office/powerpoint/2010/main" val="1090473428"/>
-      </p:ext>
-    </p:extLst>
-  </p:cSld>
-  <p:clrMapOvr>
-    <a:masterClrMapping/>
-  </p:clrMapOvr>
-</p:notes>
-</file>
-
-<file path=ppt/notesSlides/notesSlide23.xml><?xml version="1.0" encoding="utf-8"?>
-<p:notes xmlns:a="http://schemas.openxmlformats.org/drawingml/2006/main" xmlns:r="http://schemas.openxmlformats.org/officeDocument/2006/relationships" xmlns:p="http://schemas.openxmlformats.org/presentationml/2006/main">
-  <p:cSld>
-    <p:spTree>
-      <p:nvGrpSpPr>
-        <p:cNvPr id="1" name=""/>
-        <p:cNvGrpSpPr/>
-        <p:nvPr/>
-      </p:nvGrpSpPr>
-      <p:grpSpPr>
-        <a:xfrm>
-          <a:off x="0" y="0"/>
-          <a:ext cx="0" cy="0"/>
-          <a:chOff x="0" y="0"/>
-          <a:chExt cx="0" cy="0"/>
-        </a:xfrm>
-      </p:grpSpPr>
-      <p:sp>
-        <p:nvSpPr>
-          <p:cNvPr id="2" name="Slide Image Placeholder 1"/>
-          <p:cNvSpPr>
-            <a:spLocks noGrp="1" noRot="1" noChangeAspect="1"/>
-          </p:cNvSpPr>
-          <p:nvPr>
-            <p:ph type="sldImg"/>
-          </p:nvPr>
-        </p:nvSpPr>
-        <p:spPr/>
-      </p:sp>
-      <p:sp>
-        <p:nvSpPr>
-          <p:cNvPr id="3" name="Notes Placeholder 2"/>
-          <p:cNvSpPr>
-            <a:spLocks noGrp="1"/>
-          </p:cNvSpPr>
-          <p:nvPr>
-            <p:ph type="body" idx="1"/>
-          </p:nvPr>
-        </p:nvSpPr>
-        <p:spPr/>
-        <p:txBody>
-          <a:bodyPr/>
-          <a:lstStyle/>
-          <a:p>
             <a:r>
               <a:rPr lang="en-US" dirty="0"/>
               <a:t>Thanks</a:t>
@@ -4195,7 +3899,7 @@
           <a:p>
             <a:fld id="{D81990A0-AC65-4980-BF02-6ACC1434AAED}" type="slidenum">
               <a:rPr lang="en-US" smtClean="0"/>
-              <a:t>23</a:t>
+              <a:t>22</a:t>
             </a:fld>
             <a:endParaRPr lang="en-US"/>
           </a:p>
@@ -21682,35 +21386,6 @@
       </p:sp>
       <p:sp>
         <p:nvSpPr>
-          <p:cNvPr id="4" name="页脚占位符 3">
-            <a:extLst>
-              <a:ext uri="{FF2B5EF4-FFF2-40B4-BE49-F238E27FC236}">
-                <a16:creationId xmlns:a16="http://schemas.microsoft.com/office/drawing/2014/main" id="{202AC9C5-8519-48CC-BC1A-C8A87A2A5679}"/>
-              </a:ext>
-            </a:extLst>
-          </p:cNvPr>
-          <p:cNvSpPr>
-            <a:spLocks noGrp="1"/>
-          </p:cNvSpPr>
-          <p:nvPr>
-            <p:ph type="ftr" sz="quarter" idx="11"/>
-          </p:nvPr>
-        </p:nvSpPr>
-        <p:spPr/>
-        <p:txBody>
-          <a:bodyPr/>
-          <a:lstStyle/>
-          <a:p>
-            <a:r>
-              <a:rPr lang="en-US"/>
-              <a:t>Silicon Labs Confidential</a:t>
-            </a:r>
-            <a:endParaRPr lang="en-US" dirty="0"/>
-          </a:p>
-        </p:txBody>
-      </p:sp>
-      <p:sp>
-        <p:nvSpPr>
           <p:cNvPr id="5" name="灯片编号占位符 4">
             <a:extLst>
               <a:ext uri="{FF2B5EF4-FFF2-40B4-BE49-F238E27FC236}">
@@ -22119,35 +21794,6 @@
       </p:sp>
       <p:sp>
         <p:nvSpPr>
-          <p:cNvPr id="4" name="页脚占位符 3">
-            <a:extLst>
-              <a:ext uri="{FF2B5EF4-FFF2-40B4-BE49-F238E27FC236}">
-                <a16:creationId xmlns:a16="http://schemas.microsoft.com/office/drawing/2014/main" id="{202AC9C5-8519-48CC-BC1A-C8A87A2A5679}"/>
-              </a:ext>
-            </a:extLst>
-          </p:cNvPr>
-          <p:cNvSpPr>
-            <a:spLocks noGrp="1"/>
-          </p:cNvSpPr>
-          <p:nvPr>
-            <p:ph type="ftr" sz="quarter" idx="11"/>
-          </p:nvPr>
-        </p:nvSpPr>
-        <p:spPr/>
-        <p:txBody>
-          <a:bodyPr/>
-          <a:lstStyle/>
-          <a:p>
-            <a:r>
-              <a:rPr lang="en-US"/>
-              <a:t>Silicon Labs Confidential</a:t>
-            </a:r>
-            <a:endParaRPr lang="en-US" dirty="0"/>
-          </a:p>
-        </p:txBody>
-      </p:sp>
-      <p:sp>
-        <p:nvSpPr>
           <p:cNvPr id="5" name="灯片编号占位符 4">
             <a:extLst>
               <a:ext uri="{FF2B5EF4-FFF2-40B4-BE49-F238E27FC236}">
@@ -22269,35 +21915,6 @@
               <a:rPr lang="en-US" b="1" dirty="0"/>
               <a:t>Hands-on: Reporting</a:t>
             </a:r>
-          </a:p>
-        </p:txBody>
-      </p:sp>
-      <p:sp>
-        <p:nvSpPr>
-          <p:cNvPr id="4" name="页脚占位符 3">
-            <a:extLst>
-              <a:ext uri="{FF2B5EF4-FFF2-40B4-BE49-F238E27FC236}">
-                <a16:creationId xmlns:a16="http://schemas.microsoft.com/office/drawing/2014/main" id="{202AC9C5-8519-48CC-BC1A-C8A87A2A5679}"/>
-              </a:ext>
-            </a:extLst>
-          </p:cNvPr>
-          <p:cNvSpPr>
-            <a:spLocks noGrp="1"/>
-          </p:cNvSpPr>
-          <p:nvPr>
-            <p:ph type="ftr" sz="quarter" idx="11"/>
-          </p:nvPr>
-        </p:nvSpPr>
-        <p:spPr/>
-        <p:txBody>
-          <a:bodyPr/>
-          <a:lstStyle/>
-          <a:p>
-            <a:r>
-              <a:rPr lang="en-US"/>
-              <a:t>Silicon Labs Confidential</a:t>
-            </a:r>
-            <a:endParaRPr lang="en-US" dirty="0"/>
           </a:p>
         </p:txBody>
       </p:sp>
@@ -22459,35 +22076,6 @@
       </p:sp>
       <p:sp>
         <p:nvSpPr>
-          <p:cNvPr id="4" name="页脚占位符 3">
-            <a:extLst>
-              <a:ext uri="{FF2B5EF4-FFF2-40B4-BE49-F238E27FC236}">
-                <a16:creationId xmlns:a16="http://schemas.microsoft.com/office/drawing/2014/main" id="{202AC9C5-8519-48CC-BC1A-C8A87A2A5679}"/>
-              </a:ext>
-            </a:extLst>
-          </p:cNvPr>
-          <p:cNvSpPr>
-            <a:spLocks noGrp="1"/>
-          </p:cNvSpPr>
-          <p:nvPr>
-            <p:ph type="ftr" sz="quarter" idx="11"/>
-          </p:nvPr>
-        </p:nvSpPr>
-        <p:spPr/>
-        <p:txBody>
-          <a:bodyPr/>
-          <a:lstStyle/>
-          <a:p>
-            <a:r>
-              <a:rPr lang="en-US"/>
-              <a:t>Silicon Labs Confidential</a:t>
-            </a:r>
-            <a:endParaRPr lang="en-US" dirty="0"/>
-          </a:p>
-        </p:txBody>
-      </p:sp>
-      <p:sp>
-        <p:nvSpPr>
           <p:cNvPr id="5" name="灯片编号占位符 4">
             <a:extLst>
               <a:ext uri="{FF2B5EF4-FFF2-40B4-BE49-F238E27FC236}">
@@ -22581,10 +22169,93 @@
       </p:grpSpPr>
       <p:sp>
         <p:nvSpPr>
-          <p:cNvPr id="3" name="Title 2">
+          <p:cNvPr id="5" name="Content Placeholder 4">
             <a:extLst>
               <a:ext uri="{FF2B5EF4-FFF2-40B4-BE49-F238E27FC236}">
-                <a16:creationId xmlns:a16="http://schemas.microsoft.com/office/drawing/2014/main" id="{9D315753-473F-497C-BCE9-35D947E6485D}"/>
+                <a16:creationId xmlns:a16="http://schemas.microsoft.com/office/drawing/2014/main" id="{7272080E-57D8-3C4A-8BB7-15D432D53049}"/>
+              </a:ext>
+            </a:extLst>
+          </p:cNvPr>
+          <p:cNvSpPr>
+            <a:spLocks noGrp="1"/>
+          </p:cNvSpPr>
+          <p:nvPr>
+            <p:ph idx="10"/>
+          </p:nvPr>
+        </p:nvSpPr>
+        <p:spPr>
+          <a:xfrm>
+            <a:off x="679450" y="1143000"/>
+            <a:ext cx="10820400" cy="5029200"/>
+          </a:xfrm>
+        </p:spPr>
+        <p:txBody>
+          <a:bodyPr/>
+          <a:lstStyle/>
+          <a:p>
+            <a:r>
+              <a:rPr lang="en-US" dirty="0"/>
+              <a:t>Finding &amp; Binding</a:t>
+            </a:r>
+          </a:p>
+          <a:p>
+            <a:pPr lvl="1"/>
+            <a:r>
+              <a:rPr lang="en-US" altLang="zh-CN" dirty="0"/>
+              <a:t>Is a</a:t>
+            </a:r>
+            <a:r>
+              <a:rPr lang="en-US" dirty="0"/>
+              <a:t> cluster commissioning method to establish application connection automatically</a:t>
+            </a:r>
+          </a:p>
+          <a:p>
+            <a:r>
+              <a:rPr lang="en-US" dirty="0"/>
+              <a:t>How to start</a:t>
+            </a:r>
+          </a:p>
+          <a:p>
+            <a:pPr lvl="1"/>
+            <a:r>
+              <a:rPr lang="en-US" dirty="0"/>
+              <a:t>Invoked by user interaction on two or more devices</a:t>
+            </a:r>
+          </a:p>
+          <a:p>
+            <a:r>
+              <a:rPr lang="en-US" dirty="0"/>
+              <a:t>How to implement</a:t>
+            </a:r>
+          </a:p>
+          <a:p>
+            <a:pPr lvl="1"/>
+            <a:r>
+              <a:rPr lang="en-US" dirty="0"/>
+              <a:t>Identifies and discovers end points using the Identify cluster</a:t>
+            </a:r>
+          </a:p>
+          <a:p>
+            <a:r>
+              <a:rPr lang="en-US" dirty="0"/>
+              <a:t>What’s the result</a:t>
+            </a:r>
+          </a:p>
+          <a:p>
+            <a:pPr lvl="1"/>
+            <a:r>
+              <a:rPr lang="en-US" dirty="0"/>
+              <a:t>Binding is created at the initiator</a:t>
+            </a:r>
+          </a:p>
+        </p:txBody>
+      </p:sp>
+      <p:sp>
+        <p:nvSpPr>
+          <p:cNvPr id="4" name="Title 3">
+            <a:extLst>
+              <a:ext uri="{FF2B5EF4-FFF2-40B4-BE49-F238E27FC236}">
+                <a16:creationId xmlns:a16="http://schemas.microsoft.com/office/drawing/2014/main" id="{25A35DB3-AF50-9F4F-BCA4-9190C64B0320}"/>
               </a:ext>
             </a:extLst>
           </p:cNvPr>
@@ -22602,1194 +22273,15 @@
           <a:p>
             <a:r>
               <a:rPr lang="en-US" b="1" dirty="0"/>
-              <a:t>Debug Commands</a:t>
-            </a:r>
-          </a:p>
-        </p:txBody>
-      </p:sp>
-      <p:sp>
-        <p:nvSpPr>
-          <p:cNvPr id="4" name="Footer Placeholder 3">
-            <a:extLst>
-              <a:ext uri="{FF2B5EF4-FFF2-40B4-BE49-F238E27FC236}">
-                <a16:creationId xmlns:a16="http://schemas.microsoft.com/office/drawing/2014/main" id="{53109B6A-DF91-44A9-AA55-C3D4E189447A}"/>
-              </a:ext>
-            </a:extLst>
-          </p:cNvPr>
-          <p:cNvSpPr>
-            <a:spLocks noGrp="1"/>
-          </p:cNvSpPr>
-          <p:nvPr>
-            <p:ph type="ftr" sz="quarter" idx="11"/>
-          </p:nvPr>
-        </p:nvSpPr>
-        <p:spPr/>
-        <p:txBody>
-          <a:bodyPr/>
-          <a:lstStyle/>
-          <a:p>
-            <a:r>
-              <a:rPr lang="en-US" dirty="0"/>
-              <a:t>Silicon Labs Confidential</a:t>
-            </a:r>
-          </a:p>
-        </p:txBody>
-      </p:sp>
-      <p:sp>
-        <p:nvSpPr>
-          <p:cNvPr id="5" name="Slide Number Placeholder 4">
-            <a:extLst>
-              <a:ext uri="{FF2B5EF4-FFF2-40B4-BE49-F238E27FC236}">
-                <a16:creationId xmlns:a16="http://schemas.microsoft.com/office/drawing/2014/main" id="{BE33F475-C8A6-4F19-A63A-97094CC3FEE6}"/>
-              </a:ext>
-            </a:extLst>
-          </p:cNvPr>
-          <p:cNvSpPr>
-            <a:spLocks noGrp="1"/>
-          </p:cNvSpPr>
-          <p:nvPr>
-            <p:ph type="sldNum" sz="quarter" idx="12"/>
-          </p:nvPr>
-        </p:nvSpPr>
-        <p:spPr/>
-        <p:txBody>
-          <a:bodyPr/>
-          <a:lstStyle/>
-          <a:p>
-            <a:fld id="{29A7BD92-6AE5-CF43-B276-274952F2BFB4}" type="slidenum">
-              <a:rPr lang="en-US" smtClean="0"/>
-              <a:pPr/>
-              <a:t>14</a:t>
-            </a:fld>
-            <a:endParaRPr lang="en-US" dirty="0"/>
-          </a:p>
-        </p:txBody>
-      </p:sp>
-      <p:sp>
-        <p:nvSpPr>
-          <p:cNvPr id="12" name="Content Placeholder 1">
-            <a:extLst>
-              <a:ext uri="{FF2B5EF4-FFF2-40B4-BE49-F238E27FC236}">
-                <a16:creationId xmlns:a16="http://schemas.microsoft.com/office/drawing/2014/main" id="{D69AAB68-20EE-4F38-B825-DD1C0AA22809}"/>
-              </a:ext>
-            </a:extLst>
-          </p:cNvPr>
-          <p:cNvSpPr txBox="1">
-            <a:spLocks/>
-          </p:cNvSpPr>
-          <p:nvPr/>
-        </p:nvSpPr>
-        <p:spPr>
-          <a:xfrm>
-            <a:off x="679450" y="1143000"/>
-            <a:ext cx="6085144" cy="4866834"/>
-          </a:xfrm>
-          <a:prstGeom prst="rect">
-            <a:avLst/>
-          </a:prstGeom>
-        </p:spPr>
-        <p:txBody>
-          <a:bodyPr vert="horz" lIns="91440" tIns="45720" rIns="91440" bIns="45720" rtlCol="0" anchor="t">
-            <a:normAutofit/>
-          </a:bodyPr>
-          <a:lstStyle>
-            <a:lvl1pPr marL="182880" indent="-182880" algn="l" defTabSz="914377" rtl="0" eaLnBrk="1" fontAlgn="base" latinLnBrk="0" hangingPunct="1">
-              <a:lnSpc>
-                <a:spcPct val="95000"/>
-              </a:lnSpc>
-              <a:spcBef>
-                <a:spcPts val="1200"/>
-              </a:spcBef>
-              <a:spcAft>
-                <a:spcPts val="0"/>
-              </a:spcAft>
-              <a:buClr>
-                <a:schemeClr val="tx2"/>
-              </a:buClr>
-              <a:buFont typeface="Wingdings" charset="2"/>
-              <a:buChar char="§"/>
-              <a:defRPr lang="en-US" sz="2000" b="0" i="0" kern="1200">
-                <a:solidFill>
-                  <a:schemeClr val="tx1"/>
-                </a:solidFill>
-                <a:latin typeface="+mn-lt"/>
-                <a:ea typeface="Calibri" panose="020F0502020204030204" pitchFamily="34" charset="0"/>
-                <a:cs typeface="Calibri" panose="020F0502020204030204" pitchFamily="34" charset="0"/>
-              </a:defRPr>
-            </a:lvl1pPr>
-            <a:lvl2pPr marL="365760" indent="-182880" algn="l" defTabSz="914377" rtl="0" eaLnBrk="1" fontAlgn="base" latinLnBrk="0" hangingPunct="1">
-              <a:lnSpc>
-                <a:spcPct val="95000"/>
-              </a:lnSpc>
-              <a:spcBef>
-                <a:spcPts val="600"/>
-              </a:spcBef>
-              <a:spcAft>
-                <a:spcPts val="0"/>
-              </a:spcAft>
-              <a:buClr>
-                <a:schemeClr val="tx2"/>
-              </a:buClr>
-              <a:buFont typeface="Wingdings" panose="05000000000000000000" pitchFamily="2" charset="2"/>
-              <a:buChar char="§"/>
-              <a:defRPr lang="en-US" sz="1800" b="0" i="0" kern="1200">
-                <a:solidFill>
-                  <a:schemeClr val="tx1"/>
-                </a:solidFill>
-                <a:latin typeface="+mn-lt"/>
-                <a:ea typeface="Calibri" panose="020F0502020204030204" pitchFamily="34" charset="0"/>
-                <a:cs typeface="Calibri" panose="020F0502020204030204" pitchFamily="34" charset="0"/>
-              </a:defRPr>
-            </a:lvl2pPr>
-            <a:lvl3pPr marL="548640" indent="-182880" algn="l" defTabSz="914377" rtl="0" eaLnBrk="1" fontAlgn="base" latinLnBrk="0" hangingPunct="1">
-              <a:lnSpc>
-                <a:spcPct val="95000"/>
-              </a:lnSpc>
-              <a:spcBef>
-                <a:spcPts val="600"/>
-              </a:spcBef>
-              <a:spcAft>
-                <a:spcPts val="0"/>
-              </a:spcAft>
-              <a:buClr>
-                <a:schemeClr val="tx2"/>
-              </a:buClr>
-              <a:buFont typeface="Wingdings" panose="05000000000000000000" pitchFamily="2" charset="2"/>
-              <a:buChar char="§"/>
-              <a:defRPr lang="en-US" sz="1600" b="0" i="0" kern="1200">
-                <a:solidFill>
-                  <a:schemeClr val="tx1"/>
-                </a:solidFill>
-                <a:latin typeface="+mn-lt"/>
-                <a:ea typeface="Calibri" panose="020F0502020204030204" pitchFamily="34" charset="0"/>
-                <a:cs typeface="Calibri" panose="020F0502020204030204" pitchFamily="34" charset="0"/>
-              </a:defRPr>
-            </a:lvl3pPr>
-            <a:lvl4pPr marL="731520" marR="0" indent="-182880" algn="l" defTabSz="914377" rtl="0" eaLnBrk="1" fontAlgn="base" latinLnBrk="0" hangingPunct="1">
-              <a:lnSpc>
-                <a:spcPct val="95000"/>
-              </a:lnSpc>
-              <a:spcBef>
-                <a:spcPts val="600"/>
-              </a:spcBef>
-              <a:spcAft>
-                <a:spcPts val="0"/>
-              </a:spcAft>
-              <a:buClr>
-                <a:schemeClr val="tx2"/>
-              </a:buClr>
-              <a:buSzTx/>
-              <a:buFont typeface="Wingdings" panose="05000000000000000000" pitchFamily="2" charset="2"/>
-              <a:buChar char="§"/>
-              <a:tabLst/>
-              <a:defRPr lang="en-US" sz="1400" b="0" i="0" kern="1200">
-                <a:solidFill>
-                  <a:schemeClr val="tx1"/>
-                </a:solidFill>
-                <a:latin typeface="+mn-lt"/>
-                <a:ea typeface="Calibri" panose="020F0502020204030204" pitchFamily="34" charset="0"/>
-                <a:cs typeface="Calibri" panose="020F0502020204030204" pitchFamily="34" charset="0"/>
-              </a:defRPr>
-            </a:lvl4pPr>
-            <a:lvl5pPr marL="914400" indent="-182880" algn="l" defTabSz="914377" rtl="0" eaLnBrk="1" fontAlgn="base" latinLnBrk="0" hangingPunct="1">
-              <a:lnSpc>
-                <a:spcPct val="100000"/>
-              </a:lnSpc>
-              <a:spcBef>
-                <a:spcPts val="900"/>
-              </a:spcBef>
-              <a:spcAft>
-                <a:spcPct val="0"/>
-              </a:spcAft>
-              <a:buClr>
-                <a:schemeClr val="tx2"/>
-              </a:buClr>
-              <a:buFont typeface="Wingdings" panose="05000000000000000000" pitchFamily="2" charset="2"/>
-              <a:buChar char="§"/>
-              <a:defRPr lang="en-US" sz="1400" b="0" kern="1200">
-                <a:solidFill>
-                  <a:schemeClr val="tx1"/>
-                </a:solidFill>
-                <a:latin typeface="+mn-lt"/>
-                <a:ea typeface="Segoe UI" panose="020B0502040204020203" pitchFamily="34" charset="0"/>
-                <a:cs typeface="Segoe UI" panose="020B0502040204020203" pitchFamily="34" charset="0"/>
-              </a:defRPr>
-            </a:lvl5pPr>
-            <a:lvl6pPr marL="2514537" indent="-228594" algn="l" defTabSz="914377" rtl="0" eaLnBrk="1" latinLnBrk="0" hangingPunct="1">
-              <a:lnSpc>
-                <a:spcPct val="90000"/>
-              </a:lnSpc>
-              <a:spcBef>
-                <a:spcPts val="500"/>
-              </a:spcBef>
-              <a:buFont typeface="Arial" panose="020B0604020202020204" pitchFamily="34" charset="0"/>
-              <a:buChar char="•"/>
-              <a:defRPr sz="1800" kern="1200">
-                <a:solidFill>
-                  <a:schemeClr val="tx1"/>
-                </a:solidFill>
-                <a:latin typeface="+mn-lt"/>
-                <a:ea typeface="+mn-ea"/>
-                <a:cs typeface="+mn-cs"/>
-              </a:defRPr>
-            </a:lvl6pPr>
-            <a:lvl7pPr marL="2971726" indent="-228594" algn="l" defTabSz="914377" rtl="0" eaLnBrk="1" latinLnBrk="0" hangingPunct="1">
-              <a:lnSpc>
-                <a:spcPct val="90000"/>
-              </a:lnSpc>
-              <a:spcBef>
-                <a:spcPts val="500"/>
-              </a:spcBef>
-              <a:buFont typeface="Arial" panose="020B0604020202020204" pitchFamily="34" charset="0"/>
-              <a:buChar char="•"/>
-              <a:defRPr sz="1800" kern="1200">
-                <a:solidFill>
-                  <a:schemeClr val="tx1"/>
-                </a:solidFill>
-                <a:latin typeface="+mn-lt"/>
-                <a:ea typeface="+mn-ea"/>
-                <a:cs typeface="+mn-cs"/>
-              </a:defRPr>
-            </a:lvl7pPr>
-            <a:lvl8pPr marL="3428914" indent="-228594" algn="l" defTabSz="914377" rtl="0" eaLnBrk="1" latinLnBrk="0" hangingPunct="1">
-              <a:lnSpc>
-                <a:spcPct val="90000"/>
-              </a:lnSpc>
-              <a:spcBef>
-                <a:spcPts val="500"/>
-              </a:spcBef>
-              <a:buFont typeface="Arial" panose="020B0604020202020204" pitchFamily="34" charset="0"/>
-              <a:buChar char="•"/>
-              <a:defRPr sz="1800" kern="1200">
-                <a:solidFill>
-                  <a:schemeClr val="tx1"/>
-                </a:solidFill>
-                <a:latin typeface="+mn-lt"/>
-                <a:ea typeface="+mn-ea"/>
-                <a:cs typeface="+mn-cs"/>
-              </a:defRPr>
-            </a:lvl8pPr>
-            <a:lvl9pPr marL="3886103" indent="-228594" algn="l" defTabSz="914377" rtl="0" eaLnBrk="1" latinLnBrk="0" hangingPunct="1">
-              <a:lnSpc>
-                <a:spcPct val="90000"/>
-              </a:lnSpc>
-              <a:spcBef>
-                <a:spcPts val="500"/>
-              </a:spcBef>
-              <a:buFont typeface="Arial" panose="020B0604020202020204" pitchFamily="34" charset="0"/>
-              <a:buChar char="•"/>
-              <a:defRPr sz="1800" kern="1200">
-                <a:solidFill>
-                  <a:schemeClr val="tx1"/>
-                </a:solidFill>
-                <a:latin typeface="+mn-lt"/>
-                <a:ea typeface="+mn-ea"/>
-                <a:cs typeface="+mn-cs"/>
-              </a:defRPr>
-            </a:lvl9pPr>
-          </a:lstStyle>
-          <a:p>
-            <a:r>
-              <a:rPr lang="en-US" altLang="zh-CN" dirty="0"/>
-              <a:t>Finding &amp; Binding</a:t>
-            </a:r>
-            <a:r>
-              <a:rPr lang="en-US" dirty="0"/>
-              <a:t> target</a:t>
-            </a:r>
-          </a:p>
-          <a:p>
-            <a:pPr lvl="1"/>
-            <a:endParaRPr lang="en-US" dirty="0"/>
-          </a:p>
-          <a:p>
-            <a:endParaRPr lang="en-US" dirty="0"/>
-          </a:p>
-          <a:p>
-            <a:r>
-              <a:rPr lang="en-US" dirty="0"/>
-              <a:t>Finding &amp; Binding initiator</a:t>
-            </a:r>
-          </a:p>
-          <a:p>
-            <a:endParaRPr lang="en-US" sz="900" dirty="0"/>
-          </a:p>
-          <a:p>
-            <a:endParaRPr lang="en-US" sz="900" dirty="0"/>
-          </a:p>
-          <a:p>
-            <a:endParaRPr lang="en-US" sz="900" dirty="0"/>
-          </a:p>
-          <a:p>
-            <a:endParaRPr lang="en-US" sz="900" dirty="0"/>
-          </a:p>
-          <a:p>
-            <a:pPr marL="0" indent="0">
-              <a:buNone/>
-            </a:pPr>
-            <a:endParaRPr lang="en-US" dirty="0"/>
-          </a:p>
-          <a:p>
-            <a:r>
-              <a:rPr lang="en-US" dirty="0"/>
-              <a:t>Binding Table </a:t>
-            </a:r>
-            <a:r>
-              <a:rPr lang="en-US" altLang="zh-CN" dirty="0"/>
-              <a:t>info</a:t>
-            </a:r>
-            <a:endParaRPr lang="en-US" dirty="0"/>
-          </a:p>
-          <a:p>
-            <a:endParaRPr lang="en-US" dirty="0"/>
-          </a:p>
-          <a:p>
-            <a:endParaRPr lang="en-US" dirty="0"/>
-          </a:p>
-        </p:txBody>
-      </p:sp>
-      <p:sp>
-        <p:nvSpPr>
-          <p:cNvPr id="13" name="Rectangle 12">
-            <a:extLst>
-              <a:ext uri="{FF2B5EF4-FFF2-40B4-BE49-F238E27FC236}">
-                <a16:creationId xmlns:a16="http://schemas.microsoft.com/office/drawing/2014/main" id="{1A045F0B-72DA-4C77-8694-39FE3D400DC5}"/>
-              </a:ext>
-            </a:extLst>
-          </p:cNvPr>
-          <p:cNvSpPr/>
-          <p:nvPr/>
-        </p:nvSpPr>
-        <p:spPr>
-          <a:xfrm>
-            <a:off x="816161" y="2721114"/>
-            <a:ext cx="7914884" cy="1477328"/>
-          </a:xfrm>
-          <a:prstGeom prst="rect">
-            <a:avLst/>
-          </a:prstGeom>
-        </p:spPr>
-        <p:txBody>
-          <a:bodyPr wrap="square">
-            <a:spAutoFit/>
-          </a:bodyPr>
-          <a:lstStyle/>
-          <a:p>
-            <a:r>
-              <a:rPr lang="en-US" sz="1000" dirty="0">
-                <a:solidFill>
-                  <a:prstClr val="black"/>
-                </a:solidFill>
-                <a:latin typeface="Lucida Console" panose="020B0609040504020204" pitchFamily="49" charset="0"/>
-              </a:rPr>
-              <a:t>Z3SwitchSoc&gt;</a:t>
-            </a:r>
-            <a:r>
-              <a:rPr lang="en-US" sz="1000" b="1" dirty="0">
-                <a:solidFill>
-                  <a:prstClr val="black"/>
-                </a:solidFill>
-                <a:latin typeface="Lucida Console" panose="020B0609040504020204" pitchFamily="49" charset="0"/>
-              </a:rPr>
-              <a:t>plugin find-and-bind initiator 1</a:t>
-            </a:r>
-          </a:p>
-          <a:p>
-            <a:r>
-              <a:rPr lang="en-US" sz="1000" dirty="0">
-                <a:solidFill>
-                  <a:prstClr val="black"/>
-                </a:solidFill>
-                <a:latin typeface="Lucida Console" panose="020B0609040504020204" pitchFamily="49" charset="0"/>
-              </a:rPr>
-              <a:t>Processing message: </a:t>
-            </a:r>
-            <a:r>
-              <a:rPr lang="en-US" sz="1000" dirty="0" err="1">
-                <a:solidFill>
-                  <a:prstClr val="black"/>
-                </a:solidFill>
-                <a:latin typeface="Lucida Console" panose="020B0609040504020204" pitchFamily="49" charset="0"/>
-              </a:rPr>
-              <a:t>len</a:t>
-            </a:r>
-            <a:r>
-              <a:rPr lang="en-US" sz="1000" dirty="0">
-                <a:solidFill>
-                  <a:prstClr val="black"/>
-                </a:solidFill>
-                <a:latin typeface="Lucida Console" panose="020B0609040504020204" pitchFamily="49" charset="0"/>
-              </a:rPr>
-              <a:t>=3 profile=0104 cluster=0003</a:t>
-            </a:r>
-          </a:p>
-          <a:p>
-            <a:r>
-              <a:rPr lang="en-US" sz="1000" dirty="0">
-                <a:solidFill>
-                  <a:prstClr val="black"/>
-                </a:solidFill>
-                <a:latin typeface="Lucida Console" panose="020B0609040504020204" pitchFamily="49" charset="0"/>
-              </a:rPr>
-              <a:t>T00000000:RX </a:t>
-            </a:r>
-            <a:r>
-              <a:rPr lang="en-US" sz="1000" dirty="0" err="1">
-                <a:solidFill>
-                  <a:prstClr val="black"/>
-                </a:solidFill>
-                <a:latin typeface="Lucida Console" panose="020B0609040504020204" pitchFamily="49" charset="0"/>
-              </a:rPr>
-              <a:t>len</a:t>
-            </a:r>
-            <a:r>
-              <a:rPr lang="en-US" sz="1000" dirty="0">
-                <a:solidFill>
-                  <a:prstClr val="black"/>
-                </a:solidFill>
-                <a:latin typeface="Lucida Console" panose="020B0609040504020204" pitchFamily="49" charset="0"/>
-              </a:rPr>
-              <a:t> 3, ep FF, </a:t>
-            </a:r>
-            <a:r>
-              <a:rPr lang="en-US" sz="1000" dirty="0" err="1">
-                <a:solidFill>
-                  <a:prstClr val="black"/>
-                </a:solidFill>
-                <a:latin typeface="Lucida Console" panose="020B0609040504020204" pitchFamily="49" charset="0"/>
-              </a:rPr>
-              <a:t>clus</a:t>
-            </a:r>
-            <a:r>
-              <a:rPr lang="en-US" sz="1000" dirty="0">
-                <a:solidFill>
-                  <a:prstClr val="black"/>
-                </a:solidFill>
-                <a:latin typeface="Lucida Console" panose="020B0609040504020204" pitchFamily="49" charset="0"/>
-              </a:rPr>
-              <a:t> 0x0003 (Identify) FC 01 seq 00 </a:t>
-            </a:r>
-            <a:r>
-              <a:rPr lang="en-US" sz="1000" dirty="0" err="1">
-                <a:solidFill>
-                  <a:prstClr val="black"/>
-                </a:solidFill>
-                <a:latin typeface="Lucida Console" panose="020B0609040504020204" pitchFamily="49" charset="0"/>
-              </a:rPr>
-              <a:t>cmd</a:t>
-            </a:r>
-            <a:r>
-              <a:rPr lang="en-US" sz="1000" dirty="0">
-                <a:solidFill>
-                  <a:prstClr val="black"/>
-                </a:solidFill>
-                <a:latin typeface="Lucida Console" panose="020B0609040504020204" pitchFamily="49" charset="0"/>
-              </a:rPr>
-              <a:t> 01 payload[]</a:t>
-            </a:r>
-          </a:p>
-          <a:p>
-            <a:r>
-              <a:rPr lang="en-US" sz="1000" dirty="0">
-                <a:solidFill>
-                  <a:prstClr val="black"/>
-                </a:solidFill>
-                <a:latin typeface="Lucida Console" panose="020B0609040504020204" pitchFamily="49" charset="0"/>
-              </a:rPr>
-              <a:t>Processing message: </a:t>
-            </a:r>
-            <a:r>
-              <a:rPr lang="en-US" sz="1000" dirty="0" err="1">
-                <a:solidFill>
-                  <a:prstClr val="black"/>
-                </a:solidFill>
-                <a:latin typeface="Lucida Console" panose="020B0609040504020204" pitchFamily="49" charset="0"/>
-              </a:rPr>
-              <a:t>len</a:t>
-            </a:r>
-            <a:r>
-              <a:rPr lang="en-US" sz="1000" dirty="0">
-                <a:solidFill>
-                  <a:prstClr val="black"/>
-                </a:solidFill>
-                <a:latin typeface="Lucida Console" panose="020B0609040504020204" pitchFamily="49" charset="0"/>
-              </a:rPr>
-              <a:t>=5 profile=0104 cluster=0003</a:t>
-            </a:r>
-          </a:p>
-          <a:p>
-            <a:r>
-              <a:rPr lang="en-US" sz="1000" dirty="0">
-                <a:solidFill>
-                  <a:prstClr val="black"/>
-                </a:solidFill>
-                <a:latin typeface="Lucida Console" panose="020B0609040504020204" pitchFamily="49" charset="0"/>
-              </a:rPr>
-              <a:t>T00000000:RX </a:t>
-            </a:r>
-            <a:r>
-              <a:rPr lang="en-US" sz="1000" dirty="0" err="1">
-                <a:solidFill>
-                  <a:prstClr val="black"/>
-                </a:solidFill>
-                <a:latin typeface="Lucida Console" panose="020B0609040504020204" pitchFamily="49" charset="0"/>
-              </a:rPr>
-              <a:t>len</a:t>
-            </a:r>
-            <a:r>
-              <a:rPr lang="en-US" sz="1000" dirty="0">
-                <a:solidFill>
-                  <a:prstClr val="black"/>
-                </a:solidFill>
-                <a:latin typeface="Lucida Console" panose="020B0609040504020204" pitchFamily="49" charset="0"/>
-              </a:rPr>
-              <a:t> 5, ep 01, </a:t>
-            </a:r>
-            <a:r>
-              <a:rPr lang="en-US" sz="1000" dirty="0" err="1">
-                <a:solidFill>
-                  <a:prstClr val="black"/>
-                </a:solidFill>
-                <a:latin typeface="Lucida Console" panose="020B0609040504020204" pitchFamily="49" charset="0"/>
-              </a:rPr>
-              <a:t>clus</a:t>
-            </a:r>
-            <a:r>
-              <a:rPr lang="en-US" sz="1000" dirty="0">
-                <a:solidFill>
-                  <a:prstClr val="black"/>
-                </a:solidFill>
-                <a:latin typeface="Lucida Console" panose="020B0609040504020204" pitchFamily="49" charset="0"/>
-              </a:rPr>
-              <a:t> 0x0003 (Identify) FC 09 seq 00 </a:t>
-            </a:r>
-            <a:r>
-              <a:rPr lang="en-US" sz="1000" dirty="0" err="1">
-                <a:solidFill>
-                  <a:prstClr val="black"/>
-                </a:solidFill>
-                <a:latin typeface="Lucida Console" panose="020B0609040504020204" pitchFamily="49" charset="0"/>
-              </a:rPr>
-              <a:t>cmd</a:t>
-            </a:r>
-            <a:r>
-              <a:rPr lang="en-US" sz="1000" dirty="0">
-                <a:solidFill>
-                  <a:prstClr val="black"/>
-                </a:solidFill>
-                <a:latin typeface="Lucida Console" panose="020B0609040504020204" pitchFamily="49" charset="0"/>
-              </a:rPr>
-              <a:t> 00 payload[72 00 ]</a:t>
-            </a:r>
-          </a:p>
-          <a:p>
-            <a:r>
-              <a:rPr lang="en-US" sz="1000" dirty="0">
-                <a:solidFill>
-                  <a:prstClr val="black"/>
-                </a:solidFill>
-                <a:latin typeface="Lucida Console" panose="020B0609040504020204" pitchFamily="49" charset="0"/>
-              </a:rPr>
-              <a:t>T00000000:TX (resp) </a:t>
-            </a:r>
-            <a:r>
-              <a:rPr lang="en-US" sz="1000" dirty="0" err="1">
-                <a:solidFill>
-                  <a:prstClr val="black"/>
-                </a:solidFill>
-                <a:latin typeface="Lucida Console" panose="020B0609040504020204" pitchFamily="49" charset="0"/>
-              </a:rPr>
-              <a:t>Ucast</a:t>
-            </a:r>
-            <a:r>
-              <a:rPr lang="en-US" sz="1000" dirty="0">
-                <a:solidFill>
-                  <a:prstClr val="black"/>
-                </a:solidFill>
-                <a:latin typeface="Lucida Console" panose="020B0609040504020204" pitchFamily="49" charset="0"/>
-              </a:rPr>
-              <a:t> 0x00 TX buffer: [00 00 0B 00 00 ]</a:t>
-            </a:r>
-          </a:p>
-          <a:p>
-            <a:r>
-              <a:rPr lang="en-US" sz="1000" dirty="0">
-                <a:solidFill>
-                  <a:prstClr val="black"/>
-                </a:solidFill>
-                <a:latin typeface="Lucida Console" panose="020B0609040504020204" pitchFamily="49" charset="0"/>
-              </a:rPr>
-              <a:t>Processing message: </a:t>
-            </a:r>
-            <a:r>
-              <a:rPr lang="en-US" sz="1000" dirty="0" err="1">
-                <a:solidFill>
-                  <a:prstClr val="black"/>
-                </a:solidFill>
-                <a:latin typeface="Lucida Console" panose="020B0609040504020204" pitchFamily="49" charset="0"/>
-              </a:rPr>
-              <a:t>len</a:t>
-            </a:r>
-            <a:r>
-              <a:rPr lang="en-US" sz="1000" dirty="0">
-                <a:solidFill>
-                  <a:prstClr val="black"/>
-                </a:solidFill>
-                <a:latin typeface="Lucida Console" panose="020B0609040504020204" pitchFamily="49" charset="0"/>
-              </a:rPr>
-              <a:t>=12 profile=0000 cluster=8001</a:t>
-            </a:r>
-          </a:p>
-          <a:p>
-            <a:r>
-              <a:rPr lang="en-US" sz="1000" dirty="0">
-                <a:solidFill>
-                  <a:prstClr val="black"/>
-                </a:solidFill>
-                <a:latin typeface="Lucida Console" panose="020B0609040504020204" pitchFamily="49" charset="0"/>
-              </a:rPr>
-              <a:t>Processing message: </a:t>
-            </a:r>
-            <a:r>
-              <a:rPr lang="en-US" sz="1000" dirty="0" err="1">
-                <a:solidFill>
-                  <a:prstClr val="black"/>
-                </a:solidFill>
-                <a:latin typeface="Lucida Console" panose="020B0609040504020204" pitchFamily="49" charset="0"/>
-              </a:rPr>
-              <a:t>len</a:t>
-            </a:r>
-            <a:r>
-              <a:rPr lang="en-US" sz="1000" dirty="0">
-                <a:solidFill>
-                  <a:prstClr val="black"/>
-                </a:solidFill>
-                <a:latin typeface="Lucida Console" panose="020B0609040504020204" pitchFamily="49" charset="0"/>
-              </a:rPr>
-              <a:t>=25 profile=0000 cluster=8004</a:t>
-            </a:r>
-          </a:p>
-          <a:p>
-            <a:r>
-              <a:rPr lang="en-US" sz="1000" dirty="0">
-                <a:solidFill>
-                  <a:prstClr val="black"/>
-                </a:solidFill>
-                <a:latin typeface="Lucida Console" panose="020B0609040504020204" pitchFamily="49" charset="0"/>
-              </a:rPr>
-              <a:t>Find and bind initiator complete: 0x00</a:t>
-            </a:r>
-          </a:p>
-        </p:txBody>
-      </p:sp>
-      <p:sp>
-        <p:nvSpPr>
-          <p:cNvPr id="14" name="Rectangle 13">
-            <a:extLst>
-              <a:ext uri="{FF2B5EF4-FFF2-40B4-BE49-F238E27FC236}">
-                <a16:creationId xmlns:a16="http://schemas.microsoft.com/office/drawing/2014/main" id="{F0F88777-A75A-427E-88E4-DB9F9E807D64}"/>
-              </a:ext>
-            </a:extLst>
-          </p:cNvPr>
-          <p:cNvSpPr/>
-          <p:nvPr/>
-        </p:nvSpPr>
-        <p:spPr>
-          <a:xfrm>
-            <a:off x="816161" y="1463814"/>
-            <a:ext cx="6784260" cy="707886"/>
-          </a:xfrm>
-          <a:prstGeom prst="rect">
-            <a:avLst/>
-          </a:prstGeom>
-        </p:spPr>
-        <p:txBody>
-          <a:bodyPr wrap="square">
-            <a:spAutoFit/>
-          </a:bodyPr>
-          <a:lstStyle/>
-          <a:p>
-            <a:r>
-              <a:rPr lang="en-US" sz="1000" dirty="0">
-                <a:solidFill>
-                  <a:prstClr val="black"/>
-                </a:solidFill>
-                <a:latin typeface="Lucida Console" panose="020B0609040504020204" pitchFamily="49" charset="0"/>
-              </a:rPr>
-              <a:t>Z3LightSoc&gt;</a:t>
-            </a:r>
-            <a:r>
-              <a:rPr lang="en-US" sz="1000" b="1" dirty="0">
-                <a:solidFill>
-                  <a:prstClr val="black"/>
-                </a:solidFill>
-                <a:latin typeface="Lucida Console" panose="020B0609040504020204" pitchFamily="49" charset="0"/>
-              </a:rPr>
-              <a:t>plugin find-and-bind target 1</a:t>
-            </a:r>
-          </a:p>
-          <a:p>
-            <a:r>
-              <a:rPr lang="en-US" sz="1000" dirty="0">
-                <a:solidFill>
-                  <a:prstClr val="black"/>
-                </a:solidFill>
-                <a:latin typeface="Lucida Console" panose="020B0609040504020204" pitchFamily="49" charset="0"/>
-              </a:rPr>
-              <a:t>Find and Bind Target: Start target: 0x00</a:t>
-            </a:r>
-          </a:p>
-          <a:p>
-            <a:r>
-              <a:rPr lang="en-US" sz="1000" dirty="0">
-                <a:solidFill>
-                  <a:prstClr val="black"/>
-                </a:solidFill>
-                <a:latin typeface="Lucida Console" panose="020B0609040504020204" pitchFamily="49" charset="0"/>
-              </a:rPr>
-              <a:t>T00000000:RX </a:t>
-            </a:r>
-            <a:r>
-              <a:rPr lang="en-US" sz="1000" dirty="0" err="1">
-                <a:solidFill>
-                  <a:prstClr val="black"/>
-                </a:solidFill>
-                <a:latin typeface="Lucida Console" panose="020B0609040504020204" pitchFamily="49" charset="0"/>
-              </a:rPr>
-              <a:t>len</a:t>
-            </a:r>
-            <a:r>
-              <a:rPr lang="en-US" sz="1000" dirty="0">
-                <a:solidFill>
-                  <a:prstClr val="black"/>
-                </a:solidFill>
-                <a:latin typeface="Lucida Console" panose="020B0609040504020204" pitchFamily="49" charset="0"/>
-              </a:rPr>
-              <a:t> 3, ep FF, </a:t>
-            </a:r>
-            <a:r>
-              <a:rPr lang="en-US" sz="1000" dirty="0" err="1">
-                <a:solidFill>
-                  <a:prstClr val="black"/>
-                </a:solidFill>
-                <a:latin typeface="Lucida Console" panose="020B0609040504020204" pitchFamily="49" charset="0"/>
-              </a:rPr>
-              <a:t>clus</a:t>
-            </a:r>
-            <a:r>
-              <a:rPr lang="en-US" sz="1000" dirty="0">
-                <a:solidFill>
-                  <a:prstClr val="black"/>
-                </a:solidFill>
-                <a:latin typeface="Lucida Console" panose="020B0609040504020204" pitchFamily="49" charset="0"/>
-              </a:rPr>
-              <a:t> 0x0003 (Identify) FC 01 seq 00 </a:t>
-            </a:r>
-            <a:r>
-              <a:rPr lang="en-US" sz="1000" dirty="0" err="1">
-                <a:solidFill>
-                  <a:prstClr val="black"/>
-                </a:solidFill>
-                <a:latin typeface="Lucida Console" panose="020B0609040504020204" pitchFamily="49" charset="0"/>
-              </a:rPr>
-              <a:t>cmd</a:t>
-            </a:r>
-            <a:r>
-              <a:rPr lang="en-US" sz="1000" dirty="0">
-                <a:solidFill>
-                  <a:prstClr val="black"/>
-                </a:solidFill>
-                <a:latin typeface="Lucida Console" panose="020B0609040504020204" pitchFamily="49" charset="0"/>
-              </a:rPr>
-              <a:t> 01 payload[]</a:t>
-            </a:r>
-          </a:p>
-          <a:p>
-            <a:r>
-              <a:rPr lang="en-US" sz="1000" dirty="0">
-                <a:solidFill>
-                  <a:prstClr val="black"/>
-                </a:solidFill>
-                <a:latin typeface="Lucida Console" panose="020B0609040504020204" pitchFamily="49" charset="0"/>
-              </a:rPr>
-              <a:t>T00000000:RX </a:t>
-            </a:r>
-            <a:r>
-              <a:rPr lang="en-US" sz="1000" dirty="0" err="1">
-                <a:solidFill>
-                  <a:prstClr val="black"/>
-                </a:solidFill>
-                <a:latin typeface="Lucida Console" panose="020B0609040504020204" pitchFamily="49" charset="0"/>
-              </a:rPr>
-              <a:t>len</a:t>
-            </a:r>
-            <a:r>
-              <a:rPr lang="en-US" sz="1000" dirty="0">
-                <a:solidFill>
-                  <a:prstClr val="black"/>
-                </a:solidFill>
-                <a:latin typeface="Lucida Console" panose="020B0609040504020204" pitchFamily="49" charset="0"/>
-              </a:rPr>
-              <a:t> 5, ep 01, </a:t>
-            </a:r>
-            <a:r>
-              <a:rPr lang="en-US" sz="1000" dirty="0" err="1">
-                <a:solidFill>
-                  <a:prstClr val="black"/>
-                </a:solidFill>
-                <a:latin typeface="Lucida Console" panose="020B0609040504020204" pitchFamily="49" charset="0"/>
-              </a:rPr>
-              <a:t>clus</a:t>
-            </a:r>
-            <a:r>
-              <a:rPr lang="en-US" sz="1000" dirty="0">
-                <a:solidFill>
-                  <a:prstClr val="black"/>
-                </a:solidFill>
-                <a:latin typeface="Lucida Console" panose="020B0609040504020204" pitchFamily="49" charset="0"/>
-              </a:rPr>
-              <a:t> 0x0003 (Identify) FC 00 seq 00 </a:t>
-            </a:r>
-            <a:r>
-              <a:rPr lang="en-US" sz="1000" dirty="0" err="1">
-                <a:solidFill>
-                  <a:prstClr val="black"/>
-                </a:solidFill>
-                <a:latin typeface="Lucida Console" panose="020B0609040504020204" pitchFamily="49" charset="0"/>
-              </a:rPr>
-              <a:t>cmd</a:t>
-            </a:r>
-            <a:r>
-              <a:rPr lang="en-US" sz="1000" dirty="0">
-                <a:solidFill>
-                  <a:prstClr val="black"/>
-                </a:solidFill>
-                <a:latin typeface="Lucida Console" panose="020B0609040504020204" pitchFamily="49" charset="0"/>
-              </a:rPr>
-              <a:t> 0B payload[00 00]</a:t>
-            </a:r>
-          </a:p>
-        </p:txBody>
-      </p:sp>
-      <p:sp>
-        <p:nvSpPr>
-          <p:cNvPr id="15" name="TextBox 14">
-            <a:extLst>
-              <a:ext uri="{FF2B5EF4-FFF2-40B4-BE49-F238E27FC236}">
-                <a16:creationId xmlns:a16="http://schemas.microsoft.com/office/drawing/2014/main" id="{D5DAAF8A-4E85-4CFE-B95A-71ACDC16C88B}"/>
-              </a:ext>
-            </a:extLst>
-          </p:cNvPr>
-          <p:cNvSpPr txBox="1"/>
-          <p:nvPr/>
-        </p:nvSpPr>
-        <p:spPr>
-          <a:xfrm>
-            <a:off x="7814658" y="6012802"/>
-            <a:ext cx="3099063" cy="276999"/>
-          </a:xfrm>
-          <a:prstGeom prst="rect">
-            <a:avLst/>
-          </a:prstGeom>
-          <a:noFill/>
-          <a:ln>
-            <a:noFill/>
-          </a:ln>
-        </p:spPr>
-        <p:txBody>
-          <a:bodyPr wrap="square" rtlCol="0" anchor="ctr">
-            <a:spAutoFit/>
-          </a:bodyPr>
-          <a:lstStyle/>
-          <a:p>
-            <a:pPr algn="ctr"/>
-            <a:r>
-              <a:rPr lang="en-US" sz="1200" dirty="0">
-                <a:solidFill>
-                  <a:srgbClr val="0086D9"/>
-                </a:solidFill>
-              </a:rPr>
-              <a:t>Packet trace of Finding &amp; Binding procedure </a:t>
-            </a:r>
-          </a:p>
-        </p:txBody>
-      </p:sp>
-      <p:sp>
-        <p:nvSpPr>
-          <p:cNvPr id="21" name="Rectangle 20">
-            <a:extLst>
-              <a:ext uri="{FF2B5EF4-FFF2-40B4-BE49-F238E27FC236}">
-                <a16:creationId xmlns:a16="http://schemas.microsoft.com/office/drawing/2014/main" id="{A710E449-E9B4-458E-B7A9-19D5B7E416E0}"/>
-              </a:ext>
-            </a:extLst>
-          </p:cNvPr>
-          <p:cNvSpPr/>
-          <p:nvPr/>
-        </p:nvSpPr>
-        <p:spPr>
-          <a:xfrm>
-            <a:off x="816161" y="4747856"/>
-            <a:ext cx="4961334" cy="1015663"/>
-          </a:xfrm>
-          <a:prstGeom prst="rect">
-            <a:avLst/>
-          </a:prstGeom>
-        </p:spPr>
-        <p:txBody>
-          <a:bodyPr wrap="square">
-            <a:spAutoFit/>
-          </a:bodyPr>
-          <a:lstStyle/>
-          <a:p>
-            <a:r>
-              <a:rPr lang="en-US" sz="1000" dirty="0">
-                <a:solidFill>
-                  <a:prstClr val="black"/>
-                </a:solidFill>
-                <a:latin typeface="Lucida Console" panose="020B0609040504020204" pitchFamily="49" charset="0"/>
-              </a:rPr>
-              <a:t>Z3SwitchSoc&gt;</a:t>
-            </a:r>
-            <a:r>
-              <a:rPr lang="en-US" altLang="zh-CN" sz="1000" b="1" dirty="0">
-                <a:solidFill>
-                  <a:prstClr val="black"/>
-                </a:solidFill>
-                <a:latin typeface="Lucida Console" panose="020B0609040504020204" pitchFamily="49" charset="0"/>
-              </a:rPr>
-              <a:t>option binding-table print</a:t>
-            </a:r>
-            <a:endParaRPr lang="en-US" sz="1000" b="1" dirty="0">
-              <a:solidFill>
-                <a:prstClr val="black"/>
-              </a:solidFill>
-              <a:latin typeface="Lucida Console" panose="020B0609040504020204" pitchFamily="49" charset="0"/>
-            </a:endParaRPr>
-          </a:p>
-          <a:p>
-            <a:r>
-              <a:rPr lang="en-US" sz="1000" dirty="0">
-                <a:solidFill>
-                  <a:prstClr val="black"/>
-                </a:solidFill>
-                <a:latin typeface="Lucida Console" panose="020B0609040504020204" pitchFamily="49" charset="0"/>
-              </a:rPr>
-              <a:t>#  type   </a:t>
-            </a:r>
-            <a:r>
-              <a:rPr lang="en-US" sz="1000" dirty="0" err="1">
-                <a:solidFill>
-                  <a:prstClr val="black"/>
-                </a:solidFill>
-                <a:latin typeface="Lucida Console" panose="020B0609040504020204" pitchFamily="49" charset="0"/>
-              </a:rPr>
-              <a:t>nwk</a:t>
-            </a:r>
-            <a:r>
-              <a:rPr lang="en-US" sz="1000" dirty="0">
-                <a:solidFill>
-                  <a:prstClr val="black"/>
-                </a:solidFill>
-                <a:latin typeface="Lucida Console" panose="020B0609040504020204" pitchFamily="49" charset="0"/>
-              </a:rPr>
-              <a:t>  loc   rem   </a:t>
-            </a:r>
-            <a:r>
-              <a:rPr lang="en-US" sz="1000" dirty="0" err="1">
-                <a:solidFill>
-                  <a:prstClr val="black"/>
-                </a:solidFill>
-                <a:latin typeface="Lucida Console" panose="020B0609040504020204" pitchFamily="49" charset="0"/>
-              </a:rPr>
-              <a:t>clus</a:t>
-            </a:r>
-            <a:r>
-              <a:rPr lang="en-US" sz="1000" dirty="0">
-                <a:solidFill>
-                  <a:prstClr val="black"/>
-                </a:solidFill>
-                <a:latin typeface="Lucida Console" panose="020B0609040504020204" pitchFamily="49" charset="0"/>
-              </a:rPr>
-              <a:t>   node   </a:t>
-            </a:r>
-            <a:r>
-              <a:rPr lang="en-US" sz="1000" dirty="0" err="1">
-                <a:solidFill>
-                  <a:prstClr val="black"/>
-                </a:solidFill>
-                <a:latin typeface="Lucida Console" panose="020B0609040504020204" pitchFamily="49" charset="0"/>
-              </a:rPr>
-              <a:t>eui</a:t>
-            </a:r>
-            <a:endParaRPr lang="en-US" sz="1000" dirty="0">
-              <a:solidFill>
-                <a:prstClr val="black"/>
-              </a:solidFill>
-              <a:latin typeface="Lucida Console" panose="020B0609040504020204" pitchFamily="49" charset="0"/>
-            </a:endParaRPr>
-          </a:p>
-          <a:p>
-            <a:r>
-              <a:rPr lang="it-IT" sz="1000" dirty="0">
-                <a:solidFill>
-                  <a:prstClr val="black"/>
-                </a:solidFill>
-                <a:latin typeface="Lucida Console" panose="020B0609040504020204" pitchFamily="49" charset="0"/>
-              </a:rPr>
-              <a:t>0: UNICA  0    0x01  0x01  0x0003 0xD0E4 (&gt;)000B57FFFE648DA0</a:t>
-            </a:r>
-          </a:p>
-          <a:p>
-            <a:r>
-              <a:rPr lang="it-IT" sz="1000" dirty="0">
-                <a:solidFill>
-                  <a:prstClr val="black"/>
-                </a:solidFill>
-                <a:latin typeface="Lucida Console" panose="020B0609040504020204" pitchFamily="49" charset="0"/>
-              </a:rPr>
-              <a:t>1: UNICA  0    0x01  0x01  0x0006 0xD0E4 (&gt;)000B57FFFE648DA0</a:t>
-            </a:r>
-          </a:p>
-          <a:p>
-            <a:r>
-              <a:rPr lang="it-IT" sz="1000" dirty="0">
-                <a:solidFill>
-                  <a:prstClr val="black"/>
-                </a:solidFill>
-                <a:latin typeface="Lucida Console" panose="020B0609040504020204" pitchFamily="49" charset="0"/>
-              </a:rPr>
-              <a:t>2: UNICA  0    0x01  0x01  0x0008 0xD0E4 (&gt;)000B57FFFE648DA0</a:t>
-            </a:r>
-          </a:p>
-          <a:p>
-            <a:r>
-              <a:rPr lang="en-US" sz="1000" dirty="0">
-                <a:solidFill>
-                  <a:prstClr val="black"/>
-                </a:solidFill>
-                <a:latin typeface="Lucida Console" panose="020B0609040504020204" pitchFamily="49" charset="0"/>
-              </a:rPr>
-              <a:t>3 of 10 bindings used</a:t>
-            </a:r>
-          </a:p>
-        </p:txBody>
-      </p:sp>
-      <p:pic>
-        <p:nvPicPr>
-          <p:cNvPr id="22" name="Picture 21">
-            <a:extLst>
-              <a:ext uri="{FF2B5EF4-FFF2-40B4-BE49-F238E27FC236}">
-                <a16:creationId xmlns:a16="http://schemas.microsoft.com/office/drawing/2014/main" id="{2D1C3B3F-E668-42EC-8FB3-D9B0789EF256}"/>
-              </a:ext>
-            </a:extLst>
-          </p:cNvPr>
-          <p:cNvPicPr>
-            <a:picLocks noChangeAspect="1"/>
-          </p:cNvPicPr>
-          <p:nvPr/>
-        </p:nvPicPr>
-        <p:blipFill>
-          <a:blip r:embed="rId3"/>
-          <a:stretch>
-            <a:fillRect/>
-          </a:stretch>
-        </p:blipFill>
-        <p:spPr>
-          <a:xfrm>
-            <a:off x="6868753" y="4256938"/>
-            <a:ext cx="4643797" cy="1755864"/>
-          </a:xfrm>
-          <a:prstGeom prst="rect">
-            <a:avLst/>
-          </a:prstGeom>
-        </p:spPr>
-      </p:pic>
-      <p:sp>
-        <p:nvSpPr>
-          <p:cNvPr id="2" name="Rectangle 1">
-            <a:extLst>
-              <a:ext uri="{FF2B5EF4-FFF2-40B4-BE49-F238E27FC236}">
-                <a16:creationId xmlns:a16="http://schemas.microsoft.com/office/drawing/2014/main" id="{DB3ECB09-2E77-493B-A635-DCB3FB8F0831}"/>
-              </a:ext>
-            </a:extLst>
-          </p:cNvPr>
-          <p:cNvSpPr/>
-          <p:nvPr/>
-        </p:nvSpPr>
-        <p:spPr>
-          <a:xfrm>
-            <a:off x="7021286" y="4699337"/>
-            <a:ext cx="3592285" cy="1015663"/>
-          </a:xfrm>
-          <a:prstGeom prst="rect">
-            <a:avLst/>
-          </a:prstGeom>
-          <a:noFill/>
-          <a:ln w="19050">
-            <a:solidFill>
-              <a:srgbClr val="FF0000"/>
-            </a:solidFill>
-          </a:ln>
-        </p:spPr>
-        <p:style>
-          <a:lnRef idx="2">
-            <a:schemeClr val="accent1">
-              <a:shade val="50000"/>
-            </a:schemeClr>
-          </a:lnRef>
-          <a:fillRef idx="1">
-            <a:schemeClr val="accent1"/>
-          </a:fillRef>
-          <a:effectRef idx="0">
-            <a:schemeClr val="accent1"/>
-          </a:effectRef>
-          <a:fontRef idx="minor">
-            <a:schemeClr val="lt1"/>
-          </a:fontRef>
-        </p:style>
-        <p:txBody>
-          <a:bodyPr rtlCol="0" anchor="ctr"/>
-          <a:lstStyle/>
-          <a:p>
-            <a:pPr algn="ctr"/>
-            <a:endParaRPr lang="en-US"/>
-          </a:p>
-        </p:txBody>
-      </p:sp>
-      <p:pic>
-        <p:nvPicPr>
-          <p:cNvPr id="8" name="Picture 7">
-            <a:extLst>
-              <a:ext uri="{FF2B5EF4-FFF2-40B4-BE49-F238E27FC236}">
-                <a16:creationId xmlns:a16="http://schemas.microsoft.com/office/drawing/2014/main" id="{ADB88025-27C2-4E7E-9098-F7A8CDB73A48}"/>
-              </a:ext>
-            </a:extLst>
-          </p:cNvPr>
-          <p:cNvPicPr>
-            <a:picLocks noChangeAspect="1"/>
-          </p:cNvPicPr>
-          <p:nvPr/>
-        </p:nvPicPr>
-        <p:blipFill>
-          <a:blip r:embed="rId4"/>
-          <a:stretch>
-            <a:fillRect/>
-          </a:stretch>
-        </p:blipFill>
-        <p:spPr>
-          <a:xfrm>
-            <a:off x="8111565" y="1401941"/>
-            <a:ext cx="3160558" cy="1755865"/>
-          </a:xfrm>
-          <a:prstGeom prst="rect">
-            <a:avLst/>
-          </a:prstGeom>
-        </p:spPr>
-      </p:pic>
+              <a:t>Overview of Finding &amp; Binding </a:t>
+            </a:r>
+          </a:p>
+        </p:txBody>
+      </p:sp>
     </p:spTree>
     <p:extLst>
       <p:ext uri="{BB962C8B-B14F-4D97-AF65-F5344CB8AC3E}">
-        <p14:creationId xmlns:p14="http://schemas.microsoft.com/office/powerpoint/2010/main" val="2480031688"/>
+        <p14:creationId xmlns:p14="http://schemas.microsoft.com/office/powerpoint/2010/main" val="158434059"/>
       </p:ext>
     </p:extLst>
   </p:cSld>
@@ -23821,150 +22313,6 @@
       </p:grpSpPr>
       <p:sp>
         <p:nvSpPr>
-          <p:cNvPr id="5" name="Content Placeholder 4">
-            <a:extLst>
-              <a:ext uri="{FF2B5EF4-FFF2-40B4-BE49-F238E27FC236}">
-                <a16:creationId xmlns:a16="http://schemas.microsoft.com/office/drawing/2014/main" id="{7272080E-57D8-3C4A-8BB7-15D432D53049}"/>
-              </a:ext>
-            </a:extLst>
-          </p:cNvPr>
-          <p:cNvSpPr>
-            <a:spLocks noGrp="1"/>
-          </p:cNvSpPr>
-          <p:nvPr>
-            <p:ph idx="10"/>
-          </p:nvPr>
-        </p:nvSpPr>
-        <p:spPr>
-          <a:xfrm>
-            <a:off x="679450" y="1143000"/>
-            <a:ext cx="10820400" cy="5029200"/>
-          </a:xfrm>
-        </p:spPr>
-        <p:txBody>
-          <a:bodyPr/>
-          <a:lstStyle/>
-          <a:p>
-            <a:r>
-              <a:rPr lang="en-US" dirty="0"/>
-              <a:t>Finding &amp; Binding</a:t>
-            </a:r>
-          </a:p>
-          <a:p>
-            <a:pPr lvl="1"/>
-            <a:r>
-              <a:rPr lang="en-US" altLang="zh-CN" dirty="0"/>
-              <a:t>Is a</a:t>
-            </a:r>
-            <a:r>
-              <a:rPr lang="en-US" dirty="0"/>
-              <a:t> cluster commissioning method to establish application connection automatically</a:t>
-            </a:r>
-          </a:p>
-          <a:p>
-            <a:r>
-              <a:rPr lang="en-US" dirty="0"/>
-              <a:t>How to start</a:t>
-            </a:r>
-          </a:p>
-          <a:p>
-            <a:pPr lvl="1"/>
-            <a:r>
-              <a:rPr lang="en-US" dirty="0"/>
-              <a:t>Invoked by user interaction on two or more devices</a:t>
-            </a:r>
-          </a:p>
-          <a:p>
-            <a:r>
-              <a:rPr lang="en-US" dirty="0"/>
-              <a:t>How to implement</a:t>
-            </a:r>
-          </a:p>
-          <a:p>
-            <a:pPr lvl="1"/>
-            <a:r>
-              <a:rPr lang="en-US" dirty="0"/>
-              <a:t>Identifies and discovers end points using the Identify cluster</a:t>
-            </a:r>
-          </a:p>
-          <a:p>
-            <a:r>
-              <a:rPr lang="en-US" dirty="0"/>
-              <a:t>What’s the result</a:t>
-            </a:r>
-          </a:p>
-          <a:p>
-            <a:pPr lvl="1"/>
-            <a:r>
-              <a:rPr lang="en-US" dirty="0"/>
-              <a:t>Binding is created at the initiator</a:t>
-            </a:r>
-          </a:p>
-        </p:txBody>
-      </p:sp>
-      <p:sp>
-        <p:nvSpPr>
-          <p:cNvPr id="4" name="Title 3">
-            <a:extLst>
-              <a:ext uri="{FF2B5EF4-FFF2-40B4-BE49-F238E27FC236}">
-                <a16:creationId xmlns:a16="http://schemas.microsoft.com/office/drawing/2014/main" id="{25A35DB3-AF50-9F4F-BCA4-9190C64B0320}"/>
-              </a:ext>
-            </a:extLst>
-          </p:cNvPr>
-          <p:cNvSpPr>
-            <a:spLocks noGrp="1"/>
-          </p:cNvSpPr>
-          <p:nvPr>
-            <p:ph type="title"/>
-          </p:nvPr>
-        </p:nvSpPr>
-        <p:spPr/>
-        <p:txBody>
-          <a:bodyPr/>
-          <a:lstStyle/>
-          <a:p>
-            <a:r>
-              <a:rPr lang="en-US" b="1" dirty="0"/>
-              <a:t>Overview of Finding &amp; Binding </a:t>
-            </a:r>
-          </a:p>
-        </p:txBody>
-      </p:sp>
-    </p:spTree>
-    <p:extLst>
-      <p:ext uri="{BB962C8B-B14F-4D97-AF65-F5344CB8AC3E}">
-        <p14:creationId xmlns:p14="http://schemas.microsoft.com/office/powerpoint/2010/main" val="158434059"/>
-      </p:ext>
-    </p:extLst>
-  </p:cSld>
-  <p:clrMapOvr>
-    <a:masterClrMapping/>
-  </p:clrMapOvr>
-  <p:transition spd="med">
-    <p:wipe/>
-  </p:transition>
-</p:sld>
-</file>
-
-<file path=ppt/slides/slide16.xml><?xml version="1.0" encoding="utf-8"?>
-<p:sld xmlns:a="http://schemas.openxmlformats.org/drawingml/2006/main" xmlns:r="http://schemas.openxmlformats.org/officeDocument/2006/relationships" xmlns:p="http://schemas.openxmlformats.org/presentationml/2006/main">
-  <p:cSld>
-    <p:spTree>
-      <p:nvGrpSpPr>
-        <p:cNvPr id="1" name=""/>
-        <p:cNvGrpSpPr/>
-        <p:nvPr/>
-      </p:nvGrpSpPr>
-      <p:grpSpPr>
-        <a:xfrm>
-          <a:off x="0" y="0"/>
-          <a:ext cx="0" cy="0"/>
-          <a:chOff x="0" y="0"/>
-          <a:chExt cx="0" cy="0"/>
-        </a:xfrm>
-      </p:grpSpPr>
-      <p:sp>
-        <p:nvSpPr>
           <p:cNvPr id="2" name="Content Placeholder 1">
             <a:extLst>
               <a:ext uri="{FF2B5EF4-FFF2-40B4-BE49-F238E27FC236}">
@@ -24075,35 +22423,6 @@
       </p:sp>
       <p:sp>
         <p:nvSpPr>
-          <p:cNvPr id="4" name="Footer Placeholder 3">
-            <a:extLst>
-              <a:ext uri="{FF2B5EF4-FFF2-40B4-BE49-F238E27FC236}">
-                <a16:creationId xmlns:a16="http://schemas.microsoft.com/office/drawing/2014/main" id="{64E4AC38-366C-44C7-BF58-8A46EEF8D22E}"/>
-              </a:ext>
-            </a:extLst>
-          </p:cNvPr>
-          <p:cNvSpPr>
-            <a:spLocks noGrp="1"/>
-          </p:cNvSpPr>
-          <p:nvPr>
-            <p:ph type="ftr" sz="quarter" idx="11"/>
-          </p:nvPr>
-        </p:nvSpPr>
-        <p:spPr/>
-        <p:txBody>
-          <a:bodyPr/>
-          <a:lstStyle/>
-          <a:p>
-            <a:r>
-              <a:rPr lang="en-US"/>
-              <a:t>Silicon Labs Confidential</a:t>
-            </a:r>
-            <a:endParaRPr lang="en-US" dirty="0"/>
-          </a:p>
-        </p:txBody>
-      </p:sp>
-      <p:sp>
-        <p:nvSpPr>
           <p:cNvPr id="5" name="Slide Number Placeholder 4">
             <a:extLst>
               <a:ext uri="{FF2B5EF4-FFF2-40B4-BE49-F238E27FC236}">
@@ -24126,7 +22445,7 @@
             <a:fld id="{29A7BD92-6AE5-CF43-B276-274952F2BFB4}" type="slidenum">
               <a:rPr lang="en-US" smtClean="0"/>
               <a:pPr/>
-              <a:t>16</a:t>
+              <a:t>15</a:t>
             </a:fld>
             <a:endParaRPr lang="en-US" dirty="0"/>
           </a:p>
@@ -24462,7 +22781,7 @@
 </p:sld>
 </file>
 
-<file path=ppt/slides/slide17.xml><?xml version="1.0" encoding="utf-8"?>
+<file path=ppt/slides/slide16.xml><?xml version="1.0" encoding="utf-8"?>
 <p:sld xmlns:a="http://schemas.openxmlformats.org/drawingml/2006/main" xmlns:r="http://schemas.openxmlformats.org/officeDocument/2006/relationships" xmlns:p="http://schemas.openxmlformats.org/presentationml/2006/main">
   <p:cSld>
     <p:spTree>
@@ -24573,35 +22892,6 @@
       </p:sp>
       <p:sp>
         <p:nvSpPr>
-          <p:cNvPr id="4" name="Footer Placeholder 3">
-            <a:extLst>
-              <a:ext uri="{FF2B5EF4-FFF2-40B4-BE49-F238E27FC236}">
-                <a16:creationId xmlns:a16="http://schemas.microsoft.com/office/drawing/2014/main" id="{5BF6F8EA-880D-4819-A377-39E626F77199}"/>
-              </a:ext>
-            </a:extLst>
-          </p:cNvPr>
-          <p:cNvSpPr>
-            <a:spLocks noGrp="1"/>
-          </p:cNvSpPr>
-          <p:nvPr>
-            <p:ph type="ftr" sz="quarter" idx="11"/>
-          </p:nvPr>
-        </p:nvSpPr>
-        <p:spPr/>
-        <p:txBody>
-          <a:bodyPr/>
-          <a:lstStyle/>
-          <a:p>
-            <a:r>
-              <a:rPr lang="en-US"/>
-              <a:t>Silicon Labs Confidential</a:t>
-            </a:r>
-            <a:endParaRPr lang="en-US" dirty="0"/>
-          </a:p>
-        </p:txBody>
-      </p:sp>
-      <p:sp>
-        <p:nvSpPr>
           <p:cNvPr id="5" name="Slide Number Placeholder 4">
             <a:extLst>
               <a:ext uri="{FF2B5EF4-FFF2-40B4-BE49-F238E27FC236}">
@@ -24624,7 +22914,7 @@
             <a:fld id="{29A7BD92-6AE5-CF43-B276-274952F2BFB4}" type="slidenum">
               <a:rPr lang="en-US" smtClean="0"/>
               <a:pPr/>
-              <a:t>17</a:t>
+              <a:t>16</a:t>
             </a:fld>
             <a:endParaRPr lang="en-US" dirty="0"/>
           </a:p>
@@ -25997,7 +24287,7 @@
 </p:sld>
 </file>
 
-<file path=ppt/slides/slide18.xml><?xml version="1.0" encoding="utf-8"?>
+<file path=ppt/slides/slide17.xml><?xml version="1.0" encoding="utf-8"?>
 <p:sld xmlns:a="http://schemas.openxmlformats.org/drawingml/2006/main" xmlns:r="http://schemas.openxmlformats.org/officeDocument/2006/relationships" xmlns:p="http://schemas.openxmlformats.org/presentationml/2006/main">
   <p:cSld>
     <p:spTree>
@@ -26123,34 +24413,6 @@
       </p:sp>
       <p:sp>
         <p:nvSpPr>
-          <p:cNvPr id="4" name="Footer Placeholder 3">
-            <a:extLst>
-              <a:ext uri="{FF2B5EF4-FFF2-40B4-BE49-F238E27FC236}">
-                <a16:creationId xmlns:a16="http://schemas.microsoft.com/office/drawing/2014/main" id="{8B5B1386-BC59-4D76-BD99-A38C8F8161BA}"/>
-              </a:ext>
-            </a:extLst>
-          </p:cNvPr>
-          <p:cNvSpPr>
-            <a:spLocks noGrp="1"/>
-          </p:cNvSpPr>
-          <p:nvPr>
-            <p:ph type="ftr" sz="quarter" idx="11"/>
-          </p:nvPr>
-        </p:nvSpPr>
-        <p:spPr/>
-        <p:txBody>
-          <a:bodyPr/>
-          <a:lstStyle/>
-          <a:p>
-            <a:r>
-              <a:rPr lang="en-US" dirty="0"/>
-              <a:t>Silicon Labs Confidential</a:t>
-            </a:r>
-          </a:p>
-        </p:txBody>
-      </p:sp>
-      <p:sp>
-        <p:nvSpPr>
           <p:cNvPr id="5" name="Slide Number Placeholder 4">
             <a:extLst>
               <a:ext uri="{FF2B5EF4-FFF2-40B4-BE49-F238E27FC236}">
@@ -26173,7 +24435,7 @@
             <a:fld id="{29A7BD92-6AE5-CF43-B276-274952F2BFB4}" type="slidenum">
               <a:rPr lang="en-US" smtClean="0"/>
               <a:pPr/>
-              <a:t>18</a:t>
+              <a:t>17</a:t>
             </a:fld>
             <a:endParaRPr lang="en-US" dirty="0"/>
           </a:p>
@@ -27525,6 +25787,215 @@
 </p:sld>
 </file>
 
+<file path=ppt/slides/slide18.xml><?xml version="1.0" encoding="utf-8"?>
+<p:sld xmlns:a="http://schemas.openxmlformats.org/drawingml/2006/main" xmlns:r="http://schemas.openxmlformats.org/officeDocument/2006/relationships" xmlns:p="http://schemas.openxmlformats.org/presentationml/2006/main">
+  <p:cSld>
+    <p:spTree>
+      <p:nvGrpSpPr>
+        <p:cNvPr id="1" name=""/>
+        <p:cNvGrpSpPr/>
+        <p:nvPr/>
+      </p:nvGrpSpPr>
+      <p:grpSpPr>
+        <a:xfrm>
+          <a:off x="0" y="0"/>
+          <a:ext cx="0" cy="0"/>
+          <a:chOff x="0" y="0"/>
+          <a:chExt cx="0" cy="0"/>
+        </a:xfrm>
+      </p:grpSpPr>
+      <p:sp>
+        <p:nvSpPr>
+          <p:cNvPr id="2" name="Content Placeholder 1">
+            <a:extLst>
+              <a:ext uri="{FF2B5EF4-FFF2-40B4-BE49-F238E27FC236}">
+                <a16:creationId xmlns:a16="http://schemas.microsoft.com/office/drawing/2014/main" id="{AFE8930C-0491-4336-8A6F-50657588CEC4}"/>
+              </a:ext>
+            </a:extLst>
+          </p:cNvPr>
+          <p:cNvSpPr>
+            <a:spLocks noGrp="1"/>
+          </p:cNvSpPr>
+          <p:nvPr>
+            <p:ph idx="10"/>
+          </p:nvPr>
+        </p:nvSpPr>
+        <p:spPr/>
+        <p:txBody>
+          <a:bodyPr/>
+          <a:lstStyle/>
+          <a:p>
+            <a:r>
+              <a:rPr lang="en-US" dirty="0"/>
+              <a:t>Start target finding and binding operations</a:t>
+            </a:r>
+          </a:p>
+          <a:p>
+            <a:pPr lvl="1"/>
+            <a:r>
+              <a:rPr lang="en-US" dirty="0" err="1"/>
+              <a:t>EmberAfStatus</a:t>
+            </a:r>
+            <a:r>
+              <a:rPr lang="en-US" dirty="0"/>
+              <a:t> </a:t>
+            </a:r>
+            <a:r>
+              <a:rPr lang="en-US" dirty="0" err="1"/>
+              <a:t>emberAfPluginFindAndBindTargetStart</a:t>
+            </a:r>
+            <a:r>
+              <a:rPr lang="en-US" dirty="0"/>
+              <a:t>(uint8_t endpoint)</a:t>
+            </a:r>
+          </a:p>
+          <a:p>
+            <a:pPr lvl="2"/>
+            <a:r>
+              <a:rPr lang="en-US" dirty="0"/>
+              <a:t>In find-and-bind-</a:t>
+            </a:r>
+            <a:r>
+              <a:rPr lang="en-US" dirty="0" err="1"/>
+              <a:t>target.h</a:t>
+            </a:r>
+            <a:endParaRPr lang="en-US" dirty="0"/>
+          </a:p>
+          <a:p>
+            <a:pPr lvl="1"/>
+            <a:endParaRPr lang="en-US" dirty="0"/>
+          </a:p>
+          <a:p>
+            <a:r>
+              <a:rPr lang="en-US" dirty="0"/>
+              <a:t>Start initiator finding and binding operations</a:t>
+            </a:r>
+          </a:p>
+          <a:p>
+            <a:pPr lvl="1"/>
+            <a:r>
+              <a:rPr lang="en-US" dirty="0" err="1"/>
+              <a:t>EmberStatus</a:t>
+            </a:r>
+            <a:r>
+              <a:rPr lang="en-US" dirty="0"/>
+              <a:t> </a:t>
+            </a:r>
+            <a:r>
+              <a:rPr lang="en-US" dirty="0" err="1"/>
+              <a:t>emberAfPluginFindAndBindInitiatorStart</a:t>
+            </a:r>
+            <a:r>
+              <a:rPr lang="en-US" dirty="0"/>
+              <a:t>(uint8_t endpoint)</a:t>
+            </a:r>
+          </a:p>
+          <a:p>
+            <a:pPr lvl="2"/>
+            <a:r>
+              <a:rPr lang="en-US" dirty="0"/>
+              <a:t>In find-and-bind-</a:t>
+            </a:r>
+            <a:r>
+              <a:rPr lang="en-US" dirty="0" err="1"/>
+              <a:t>initiator.h</a:t>
+            </a:r>
+            <a:endParaRPr lang="en-US" dirty="0"/>
+          </a:p>
+          <a:p>
+            <a:pPr marL="182880" lvl="1" indent="0">
+              <a:buNone/>
+            </a:pPr>
+            <a:endParaRPr lang="en-US" dirty="0"/>
+          </a:p>
+        </p:txBody>
+      </p:sp>
+      <p:sp>
+        <p:nvSpPr>
+          <p:cNvPr id="3" name="Title 2">
+            <a:extLst>
+              <a:ext uri="{FF2B5EF4-FFF2-40B4-BE49-F238E27FC236}">
+                <a16:creationId xmlns:a16="http://schemas.microsoft.com/office/drawing/2014/main" id="{477121B8-4AF3-49BB-9F77-9091F6DC8935}"/>
+              </a:ext>
+            </a:extLst>
+          </p:cNvPr>
+          <p:cNvSpPr>
+            <a:spLocks noGrp="1"/>
+          </p:cNvSpPr>
+          <p:nvPr>
+            <p:ph type="title"/>
+          </p:nvPr>
+        </p:nvSpPr>
+        <p:spPr/>
+        <p:txBody>
+          <a:bodyPr/>
+          <a:lstStyle/>
+          <a:p>
+            <a:r>
+              <a:rPr lang="en-US" altLang="zh-CN" b="1" dirty="0"/>
+              <a:t>The APIs to start </a:t>
+            </a:r>
+            <a:r>
+              <a:rPr lang="en-US" b="1" dirty="0"/>
+              <a:t>finding </a:t>
+            </a:r>
+            <a:r>
+              <a:rPr lang="en-US" altLang="zh-CN" b="1" dirty="0"/>
+              <a:t>&amp;</a:t>
+            </a:r>
+            <a:r>
+              <a:rPr lang="en-US" b="1" dirty="0"/>
+              <a:t> binding operations</a:t>
+            </a:r>
+          </a:p>
+        </p:txBody>
+      </p:sp>
+      <p:sp>
+        <p:nvSpPr>
+          <p:cNvPr id="5" name="Slide Number Placeholder 4">
+            <a:extLst>
+              <a:ext uri="{FF2B5EF4-FFF2-40B4-BE49-F238E27FC236}">
+                <a16:creationId xmlns:a16="http://schemas.microsoft.com/office/drawing/2014/main" id="{DC996CB1-0E04-4795-BFD9-B18E90908025}"/>
+              </a:ext>
+            </a:extLst>
+          </p:cNvPr>
+          <p:cNvSpPr>
+            <a:spLocks noGrp="1"/>
+          </p:cNvSpPr>
+          <p:nvPr>
+            <p:ph type="sldNum" sz="quarter" idx="12"/>
+          </p:nvPr>
+        </p:nvSpPr>
+        <p:spPr/>
+        <p:txBody>
+          <a:bodyPr/>
+          <a:lstStyle/>
+          <a:p>
+            <a:fld id="{29A7BD92-6AE5-CF43-B276-274952F2BFB4}" type="slidenum">
+              <a:rPr lang="en-US" smtClean="0"/>
+              <a:pPr/>
+              <a:t>18</a:t>
+            </a:fld>
+            <a:endParaRPr lang="en-US" dirty="0"/>
+          </a:p>
+        </p:txBody>
+      </p:sp>
+    </p:spTree>
+    <p:extLst>
+      <p:ext uri="{BB962C8B-B14F-4D97-AF65-F5344CB8AC3E}">
+        <p14:creationId xmlns:p14="http://schemas.microsoft.com/office/powerpoint/2010/main" val="971049300"/>
+      </p:ext>
+    </p:extLst>
+  </p:cSld>
+  <p:clrMapOvr>
+    <a:masterClrMapping/>
+  </p:clrMapOvr>
+  <p:transition spd="med">
+    <p:wipe/>
+  </p:transition>
+</p:sld>
+</file>
+
 <file path=ppt/slides/slide19.xml><?xml version="1.0" encoding="utf-8"?>
 <p:sld xmlns:a="http://schemas.openxmlformats.org/drawingml/2006/main" xmlns:r="http://schemas.openxmlformats.org/officeDocument/2006/relationships" xmlns:p="http://schemas.openxmlformats.org/presentationml/2006/main">
   <p:cSld>
@@ -27544,480 +26015,6 @@
       </p:grpSpPr>
       <p:sp>
         <p:nvSpPr>
-          <p:cNvPr id="2" name="Content Placeholder 1">
-            <a:extLst>
-              <a:ext uri="{FF2B5EF4-FFF2-40B4-BE49-F238E27FC236}">
-                <a16:creationId xmlns:a16="http://schemas.microsoft.com/office/drawing/2014/main" id="{AFE8930C-0491-4336-8A6F-50657588CEC4}"/>
-              </a:ext>
-            </a:extLst>
-          </p:cNvPr>
-          <p:cNvSpPr>
-            <a:spLocks noGrp="1"/>
-          </p:cNvSpPr>
-          <p:nvPr>
-            <p:ph idx="10"/>
-          </p:nvPr>
-        </p:nvSpPr>
-        <p:spPr/>
-        <p:txBody>
-          <a:bodyPr/>
-          <a:lstStyle/>
-          <a:p>
-            <a:r>
-              <a:rPr lang="en-US" dirty="0"/>
-              <a:t>Start target finding and binding operations</a:t>
-            </a:r>
-          </a:p>
-          <a:p>
-            <a:pPr lvl="1"/>
-            <a:r>
-              <a:rPr lang="en-US" dirty="0" err="1"/>
-              <a:t>EmberAfStatus</a:t>
-            </a:r>
-            <a:r>
-              <a:rPr lang="en-US" dirty="0"/>
-              <a:t> </a:t>
-            </a:r>
-            <a:r>
-              <a:rPr lang="en-US" dirty="0" err="1"/>
-              <a:t>emberAfPluginFindAndBindTargetStart</a:t>
-            </a:r>
-            <a:r>
-              <a:rPr lang="en-US" dirty="0"/>
-              <a:t>(uint8_t endpoint)</a:t>
-            </a:r>
-          </a:p>
-          <a:p>
-            <a:pPr lvl="2"/>
-            <a:r>
-              <a:rPr lang="en-US" dirty="0"/>
-              <a:t>In find-and-bind-</a:t>
-            </a:r>
-            <a:r>
-              <a:rPr lang="en-US" dirty="0" err="1"/>
-              <a:t>target.h</a:t>
-            </a:r>
-            <a:endParaRPr lang="en-US" dirty="0"/>
-          </a:p>
-          <a:p>
-            <a:pPr lvl="1"/>
-            <a:endParaRPr lang="en-US" dirty="0"/>
-          </a:p>
-          <a:p>
-            <a:r>
-              <a:rPr lang="en-US" dirty="0"/>
-              <a:t>Start initiator finding and binding operations</a:t>
-            </a:r>
-          </a:p>
-          <a:p>
-            <a:pPr lvl="1"/>
-            <a:r>
-              <a:rPr lang="en-US" dirty="0" err="1"/>
-              <a:t>EmberStatus</a:t>
-            </a:r>
-            <a:r>
-              <a:rPr lang="en-US" dirty="0"/>
-              <a:t> </a:t>
-            </a:r>
-            <a:r>
-              <a:rPr lang="en-US" dirty="0" err="1"/>
-              <a:t>emberAfPluginFindAndBindInitiatorStart</a:t>
-            </a:r>
-            <a:r>
-              <a:rPr lang="en-US" dirty="0"/>
-              <a:t>(uint8_t endpoint)</a:t>
-            </a:r>
-          </a:p>
-          <a:p>
-            <a:pPr lvl="2"/>
-            <a:r>
-              <a:rPr lang="en-US" dirty="0"/>
-              <a:t>In find-and-bind-</a:t>
-            </a:r>
-            <a:r>
-              <a:rPr lang="en-US" dirty="0" err="1"/>
-              <a:t>initiator.h</a:t>
-            </a:r>
-            <a:endParaRPr lang="en-US" dirty="0"/>
-          </a:p>
-          <a:p>
-            <a:pPr marL="182880" lvl="1" indent="0">
-              <a:buNone/>
-            </a:pPr>
-            <a:endParaRPr lang="en-US" dirty="0"/>
-          </a:p>
-        </p:txBody>
-      </p:sp>
-      <p:sp>
-        <p:nvSpPr>
-          <p:cNvPr id="3" name="Title 2">
-            <a:extLst>
-              <a:ext uri="{FF2B5EF4-FFF2-40B4-BE49-F238E27FC236}">
-                <a16:creationId xmlns:a16="http://schemas.microsoft.com/office/drawing/2014/main" id="{477121B8-4AF3-49BB-9F77-9091F6DC8935}"/>
-              </a:ext>
-            </a:extLst>
-          </p:cNvPr>
-          <p:cNvSpPr>
-            <a:spLocks noGrp="1"/>
-          </p:cNvSpPr>
-          <p:nvPr>
-            <p:ph type="title"/>
-          </p:nvPr>
-        </p:nvSpPr>
-        <p:spPr/>
-        <p:txBody>
-          <a:bodyPr/>
-          <a:lstStyle/>
-          <a:p>
-            <a:r>
-              <a:rPr lang="en-US" altLang="zh-CN" b="1" dirty="0"/>
-              <a:t>The APIs to start </a:t>
-            </a:r>
-            <a:r>
-              <a:rPr lang="en-US" b="1" dirty="0"/>
-              <a:t>finding </a:t>
-            </a:r>
-            <a:r>
-              <a:rPr lang="en-US" altLang="zh-CN" b="1" dirty="0"/>
-              <a:t>&amp;</a:t>
-            </a:r>
-            <a:r>
-              <a:rPr lang="en-US" b="1" dirty="0"/>
-              <a:t> binding operations</a:t>
-            </a:r>
-          </a:p>
-        </p:txBody>
-      </p:sp>
-      <p:sp>
-        <p:nvSpPr>
-          <p:cNvPr id="4" name="Footer Placeholder 3">
-            <a:extLst>
-              <a:ext uri="{FF2B5EF4-FFF2-40B4-BE49-F238E27FC236}">
-                <a16:creationId xmlns:a16="http://schemas.microsoft.com/office/drawing/2014/main" id="{5AC5285A-C99D-4588-A377-C54563E60DDE}"/>
-              </a:ext>
-            </a:extLst>
-          </p:cNvPr>
-          <p:cNvSpPr>
-            <a:spLocks noGrp="1"/>
-          </p:cNvSpPr>
-          <p:nvPr>
-            <p:ph type="ftr" sz="quarter" idx="11"/>
-          </p:nvPr>
-        </p:nvSpPr>
-        <p:spPr/>
-        <p:txBody>
-          <a:bodyPr/>
-          <a:lstStyle/>
-          <a:p>
-            <a:r>
-              <a:rPr lang="en-US"/>
-              <a:t>Silicon Labs Confidential</a:t>
-            </a:r>
-            <a:endParaRPr lang="en-US" dirty="0"/>
-          </a:p>
-        </p:txBody>
-      </p:sp>
-      <p:sp>
-        <p:nvSpPr>
-          <p:cNvPr id="5" name="Slide Number Placeholder 4">
-            <a:extLst>
-              <a:ext uri="{FF2B5EF4-FFF2-40B4-BE49-F238E27FC236}">
-                <a16:creationId xmlns:a16="http://schemas.microsoft.com/office/drawing/2014/main" id="{DC996CB1-0E04-4795-BFD9-B18E90908025}"/>
-              </a:ext>
-            </a:extLst>
-          </p:cNvPr>
-          <p:cNvSpPr>
-            <a:spLocks noGrp="1"/>
-          </p:cNvSpPr>
-          <p:nvPr>
-            <p:ph type="sldNum" sz="quarter" idx="12"/>
-          </p:nvPr>
-        </p:nvSpPr>
-        <p:spPr/>
-        <p:txBody>
-          <a:bodyPr/>
-          <a:lstStyle/>
-          <a:p>
-            <a:fld id="{29A7BD92-6AE5-CF43-B276-274952F2BFB4}" type="slidenum">
-              <a:rPr lang="en-US" smtClean="0"/>
-              <a:pPr/>
-              <a:t>19</a:t>
-            </a:fld>
-            <a:endParaRPr lang="en-US" dirty="0"/>
-          </a:p>
-        </p:txBody>
-      </p:sp>
-    </p:spTree>
-    <p:extLst>
-      <p:ext uri="{BB962C8B-B14F-4D97-AF65-F5344CB8AC3E}">
-        <p14:creationId xmlns:p14="http://schemas.microsoft.com/office/powerpoint/2010/main" val="971049300"/>
-      </p:ext>
-    </p:extLst>
-  </p:cSld>
-  <p:clrMapOvr>
-    <a:masterClrMapping/>
-  </p:clrMapOvr>
-  <p:transition spd="med">
-    <p:wipe/>
-  </p:transition>
-</p:sld>
-</file>
-
-<file path=ppt/slides/slide2.xml><?xml version="1.0" encoding="utf-8"?>
-<p:sld xmlns:a="http://schemas.openxmlformats.org/drawingml/2006/main" xmlns:r="http://schemas.openxmlformats.org/officeDocument/2006/relationships" xmlns:p="http://schemas.openxmlformats.org/presentationml/2006/main">
-  <p:cSld>
-    <p:spTree>
-      <p:nvGrpSpPr>
-        <p:cNvPr id="1" name=""/>
-        <p:cNvGrpSpPr/>
-        <p:nvPr/>
-      </p:nvGrpSpPr>
-      <p:grpSpPr>
-        <a:xfrm>
-          <a:off x="0" y="0"/>
-          <a:ext cx="0" cy="0"/>
-          <a:chOff x="0" y="0"/>
-          <a:chExt cx="0" cy="0"/>
-        </a:xfrm>
-      </p:grpSpPr>
-      <p:sp>
-        <p:nvSpPr>
-          <p:cNvPr id="3" name="Title 2">
-            <a:extLst>
-              <a:ext uri="{FF2B5EF4-FFF2-40B4-BE49-F238E27FC236}">
-                <a16:creationId xmlns:a16="http://schemas.microsoft.com/office/drawing/2014/main" id="{854471DB-FCC6-4D53-A2A2-20DD3AD2BE9B}"/>
-              </a:ext>
-            </a:extLst>
-          </p:cNvPr>
-          <p:cNvSpPr>
-            <a:spLocks noGrp="1"/>
-          </p:cNvSpPr>
-          <p:nvPr>
-            <p:ph type="title"/>
-          </p:nvPr>
-        </p:nvSpPr>
-        <p:spPr/>
-        <p:txBody>
-          <a:bodyPr/>
-          <a:lstStyle/>
-          <a:p>
-            <a:r>
-              <a:rPr lang="en-US" dirty="0"/>
-              <a:t>Agenda</a:t>
-            </a:r>
-          </a:p>
-        </p:txBody>
-      </p:sp>
-      <p:sp>
-        <p:nvSpPr>
-          <p:cNvPr id="4" name="Footer Placeholder 3">
-            <a:extLst>
-              <a:ext uri="{FF2B5EF4-FFF2-40B4-BE49-F238E27FC236}">
-                <a16:creationId xmlns:a16="http://schemas.microsoft.com/office/drawing/2014/main" id="{3DD9E246-2A45-4FB6-8375-FE9AE23C4D06}"/>
-              </a:ext>
-            </a:extLst>
-          </p:cNvPr>
-          <p:cNvSpPr>
-            <a:spLocks noGrp="1"/>
-          </p:cNvSpPr>
-          <p:nvPr>
-            <p:ph type="ftr" sz="quarter" idx="11"/>
-          </p:nvPr>
-        </p:nvSpPr>
-        <p:spPr/>
-        <p:txBody>
-          <a:bodyPr/>
-          <a:lstStyle/>
-          <a:p>
-            <a:r>
-              <a:rPr lang="en-US" dirty="0"/>
-              <a:t>Silicon Labs Confidential</a:t>
-            </a:r>
-          </a:p>
-        </p:txBody>
-      </p:sp>
-      <p:sp>
-        <p:nvSpPr>
-          <p:cNvPr id="5" name="Slide Number Placeholder 4">
-            <a:extLst>
-              <a:ext uri="{FF2B5EF4-FFF2-40B4-BE49-F238E27FC236}">
-                <a16:creationId xmlns:a16="http://schemas.microsoft.com/office/drawing/2014/main" id="{6A6EF9B5-37BF-44E8-B690-87DA7E27F54E}"/>
-              </a:ext>
-            </a:extLst>
-          </p:cNvPr>
-          <p:cNvSpPr>
-            <a:spLocks noGrp="1"/>
-          </p:cNvSpPr>
-          <p:nvPr>
-            <p:ph type="sldNum" sz="quarter" idx="12"/>
-          </p:nvPr>
-        </p:nvSpPr>
-        <p:spPr/>
-        <p:txBody>
-          <a:bodyPr/>
-          <a:lstStyle/>
-          <a:p>
-            <a:fld id="{29A7BD92-6AE5-CF43-B276-274952F2BFB4}" type="slidenum">
-              <a:rPr lang="en-US" smtClean="0"/>
-              <a:pPr/>
-              <a:t>2</a:t>
-            </a:fld>
-            <a:endParaRPr lang="en-US" dirty="0"/>
-          </a:p>
-        </p:txBody>
-      </p:sp>
-      <p:sp>
-        <p:nvSpPr>
-          <p:cNvPr id="11" name="Content Placeholder 5">
-            <a:extLst>
-              <a:ext uri="{FF2B5EF4-FFF2-40B4-BE49-F238E27FC236}">
-                <a16:creationId xmlns:a16="http://schemas.microsoft.com/office/drawing/2014/main" id="{27D37558-7C87-47D5-8944-2BC485117283}"/>
-              </a:ext>
-            </a:extLst>
-          </p:cNvPr>
-          <p:cNvSpPr>
-            <a:spLocks noGrp="1"/>
-          </p:cNvSpPr>
-          <p:nvPr>
-            <p:ph idx="10"/>
-          </p:nvPr>
-        </p:nvSpPr>
-        <p:spPr>
-          <a:xfrm>
-            <a:off x="935182" y="1191489"/>
-            <a:ext cx="9136470" cy="4791867"/>
-          </a:xfrm>
-        </p:spPr>
-        <p:txBody>
-          <a:bodyPr>
-            <a:normAutofit/>
-          </a:bodyPr>
-          <a:lstStyle/>
-          <a:p>
-            <a:r>
-              <a:rPr lang="en-US" dirty="0"/>
-              <a:t>Basic concepts of sleepy end device</a:t>
-            </a:r>
-          </a:p>
-          <a:p>
-            <a:pPr lvl="1"/>
-            <a:r>
-              <a:rPr lang="en-US" dirty="0"/>
-              <a:t>End Device and Sleepy End Device</a:t>
-            </a:r>
-          </a:p>
-          <a:p>
-            <a:pPr lvl="1"/>
-            <a:r>
-              <a:rPr lang="en-US" dirty="0"/>
-              <a:t>Polling</a:t>
-            </a:r>
-          </a:p>
-          <a:p>
-            <a:pPr lvl="1"/>
-            <a:r>
-              <a:rPr lang="en-US" dirty="0"/>
-              <a:t>Timeout and Keepalive</a:t>
-            </a:r>
-          </a:p>
-          <a:p>
-            <a:pPr lvl="1"/>
-            <a:r>
-              <a:rPr lang="en-US" dirty="0"/>
-              <a:t>Finding and Binding</a:t>
-            </a:r>
-          </a:p>
-          <a:p>
-            <a:r>
-              <a:rPr lang="en-US" dirty="0"/>
-              <a:t>Step-by-Step hands-on: temperature sensor</a:t>
-            </a:r>
-          </a:p>
-          <a:p>
-            <a:pPr lvl="1"/>
-            <a:r>
-              <a:rPr lang="en-US" dirty="0"/>
-              <a:t>Hands-on overview</a:t>
-            </a:r>
-          </a:p>
-          <a:p>
-            <a:pPr lvl="1"/>
-            <a:r>
-              <a:rPr lang="en-US" dirty="0"/>
-              <a:t>Temperature sampling</a:t>
-            </a:r>
-          </a:p>
-          <a:p>
-            <a:pPr lvl="1"/>
-            <a:r>
-              <a:rPr lang="en-US" dirty="0"/>
-              <a:t>Reporting</a:t>
-            </a:r>
-          </a:p>
-          <a:p>
-            <a:pPr lvl="1"/>
-            <a:r>
-              <a:rPr lang="en-US" dirty="0"/>
-              <a:t>Finding and Binding</a:t>
-            </a:r>
-          </a:p>
-          <a:p>
-            <a:pPr lvl="1"/>
-            <a:r>
-              <a:rPr lang="en-US" dirty="0"/>
-              <a:t>Sleep</a:t>
-            </a:r>
-          </a:p>
-          <a:p>
-            <a:pPr lvl="1"/>
-            <a:r>
-              <a:rPr lang="en-US" dirty="0"/>
-              <a:t>Debug</a:t>
-            </a:r>
-          </a:p>
-          <a:p>
-            <a:r>
-              <a:rPr lang="en-US" dirty="0"/>
-              <a:t>Q &amp; A</a:t>
-            </a:r>
-          </a:p>
-        </p:txBody>
-      </p:sp>
-    </p:spTree>
-    <p:extLst>
-      <p:ext uri="{BB962C8B-B14F-4D97-AF65-F5344CB8AC3E}">
-        <p14:creationId xmlns:p14="http://schemas.microsoft.com/office/powerpoint/2010/main" val="1876723113"/>
-      </p:ext>
-    </p:extLst>
-  </p:cSld>
-  <p:clrMapOvr>
-    <a:masterClrMapping/>
-  </p:clrMapOvr>
-  <p:transition spd="med">
-    <p:wipe/>
-  </p:transition>
-</p:sld>
-</file>
-
-<file path=ppt/slides/slide20.xml><?xml version="1.0" encoding="utf-8"?>
-<p:sld xmlns:a="http://schemas.openxmlformats.org/drawingml/2006/main" xmlns:r="http://schemas.openxmlformats.org/officeDocument/2006/relationships" xmlns:p="http://schemas.openxmlformats.org/presentationml/2006/main">
-  <p:cSld>
-    <p:spTree>
-      <p:nvGrpSpPr>
-        <p:cNvPr id="1" name=""/>
-        <p:cNvGrpSpPr/>
-        <p:nvPr/>
-      </p:nvGrpSpPr>
-      <p:grpSpPr>
-        <a:xfrm>
-          <a:off x="0" y="0"/>
-          <a:ext cx="0" cy="0"/>
-          <a:chOff x="0" y="0"/>
-          <a:chExt cx="0" cy="0"/>
-        </a:xfrm>
-      </p:grpSpPr>
-      <p:sp>
-        <p:nvSpPr>
           <p:cNvPr id="3" name="Title 2">
             <a:extLst>
               <a:ext uri="{FF2B5EF4-FFF2-40B4-BE49-F238E27FC236}">
@@ -28046,34 +26043,6 @@
       </p:sp>
       <p:sp>
         <p:nvSpPr>
-          <p:cNvPr id="4" name="Footer Placeholder 3">
-            <a:extLst>
-              <a:ext uri="{FF2B5EF4-FFF2-40B4-BE49-F238E27FC236}">
-                <a16:creationId xmlns:a16="http://schemas.microsoft.com/office/drawing/2014/main" id="{53109B6A-DF91-44A9-AA55-C3D4E189447A}"/>
-              </a:ext>
-            </a:extLst>
-          </p:cNvPr>
-          <p:cNvSpPr>
-            <a:spLocks noGrp="1"/>
-          </p:cNvSpPr>
-          <p:nvPr>
-            <p:ph type="ftr" sz="quarter" idx="11"/>
-          </p:nvPr>
-        </p:nvSpPr>
-        <p:spPr/>
-        <p:txBody>
-          <a:bodyPr/>
-          <a:lstStyle/>
-          <a:p>
-            <a:r>
-              <a:rPr lang="en-US" dirty="0"/>
-              <a:t>Silicon Labs Confidential</a:t>
-            </a:r>
-          </a:p>
-        </p:txBody>
-      </p:sp>
-      <p:sp>
-        <p:nvSpPr>
           <p:cNvPr id="5" name="Slide Number Placeholder 4">
             <a:extLst>
               <a:ext uri="{FF2B5EF4-FFF2-40B4-BE49-F238E27FC236}">
@@ -28096,7 +26065,7 @@
             <a:fld id="{29A7BD92-6AE5-CF43-B276-274952F2BFB4}" type="slidenum">
               <a:rPr lang="en-US" smtClean="0"/>
               <a:pPr/>
-              <a:t>20</a:t>
+              <a:t>19</a:t>
             </a:fld>
             <a:endParaRPr lang="en-US" dirty="0"/>
           </a:p>
@@ -28419,7 +26388,7 @@
                 </a:solidFill>
                 <a:latin typeface="Lucida Console" panose="020B0609040504020204" pitchFamily="49" charset="0"/>
               </a:rPr>
-              <a:t>Z3SwitchSoc&gt;</a:t>
+              <a:t>ZSED&gt;</a:t>
             </a:r>
             <a:r>
               <a:rPr lang="en-US" sz="1000" b="1" dirty="0">
@@ -28753,7 +26722,7 @@
                 </a:solidFill>
                 <a:latin typeface="Lucida Console" panose="020B0609040504020204" pitchFamily="49" charset="0"/>
               </a:rPr>
-              <a:t>Z3LightSoc&gt;</a:t>
+              <a:t>ZCO&gt;</a:t>
             </a:r>
             <a:r>
               <a:rPr lang="en-US" sz="1000" b="1" dirty="0">
@@ -28985,7 +26954,7 @@
                 </a:solidFill>
                 <a:latin typeface="Lucida Console" panose="020B0609040504020204" pitchFamily="49" charset="0"/>
               </a:rPr>
-              <a:t>Z3SwitchSoc&gt;</a:t>
+              <a:t>ZSED&gt;</a:t>
             </a:r>
             <a:r>
               <a:rPr lang="en-US" altLang="zh-CN" sz="1000" b="1" dirty="0">
@@ -29239,7 +27208,7 @@
 </p:sld>
 </file>
 
-<file path=ppt/slides/slide21.xml><?xml version="1.0" encoding="utf-8"?>
+<file path=ppt/slides/slide2.xml><?xml version="1.0" encoding="utf-8"?>
 <p:sld xmlns:a="http://schemas.openxmlformats.org/drawingml/2006/main" xmlns:r="http://schemas.openxmlformats.org/officeDocument/2006/relationships" xmlns:p="http://schemas.openxmlformats.org/presentationml/2006/main">
   <p:cSld>
     <p:spTree>
@@ -29261,6 +27230,200 @@
           <p:cNvPr id="3" name="Title 2">
             <a:extLst>
               <a:ext uri="{FF2B5EF4-FFF2-40B4-BE49-F238E27FC236}">
+                <a16:creationId xmlns:a16="http://schemas.microsoft.com/office/drawing/2014/main" id="{854471DB-FCC6-4D53-A2A2-20DD3AD2BE9B}"/>
+              </a:ext>
+            </a:extLst>
+          </p:cNvPr>
+          <p:cNvSpPr>
+            <a:spLocks noGrp="1"/>
+          </p:cNvSpPr>
+          <p:nvPr>
+            <p:ph type="title"/>
+          </p:nvPr>
+        </p:nvSpPr>
+        <p:spPr/>
+        <p:txBody>
+          <a:bodyPr/>
+          <a:lstStyle/>
+          <a:p>
+            <a:r>
+              <a:rPr lang="en-US" dirty="0"/>
+              <a:t>Agenda</a:t>
+            </a:r>
+          </a:p>
+        </p:txBody>
+      </p:sp>
+      <p:sp>
+        <p:nvSpPr>
+          <p:cNvPr id="5" name="Slide Number Placeholder 4">
+            <a:extLst>
+              <a:ext uri="{FF2B5EF4-FFF2-40B4-BE49-F238E27FC236}">
+                <a16:creationId xmlns:a16="http://schemas.microsoft.com/office/drawing/2014/main" id="{6A6EF9B5-37BF-44E8-B690-87DA7E27F54E}"/>
+              </a:ext>
+            </a:extLst>
+          </p:cNvPr>
+          <p:cNvSpPr>
+            <a:spLocks noGrp="1"/>
+          </p:cNvSpPr>
+          <p:nvPr>
+            <p:ph type="sldNum" sz="quarter" idx="12"/>
+          </p:nvPr>
+        </p:nvSpPr>
+        <p:spPr/>
+        <p:txBody>
+          <a:bodyPr/>
+          <a:lstStyle/>
+          <a:p>
+            <a:fld id="{29A7BD92-6AE5-CF43-B276-274952F2BFB4}" type="slidenum">
+              <a:rPr lang="en-US" smtClean="0"/>
+              <a:pPr/>
+              <a:t>2</a:t>
+            </a:fld>
+            <a:endParaRPr lang="en-US" dirty="0"/>
+          </a:p>
+        </p:txBody>
+      </p:sp>
+      <p:sp>
+        <p:nvSpPr>
+          <p:cNvPr id="11" name="Content Placeholder 5">
+            <a:extLst>
+              <a:ext uri="{FF2B5EF4-FFF2-40B4-BE49-F238E27FC236}">
+                <a16:creationId xmlns:a16="http://schemas.microsoft.com/office/drawing/2014/main" id="{27D37558-7C87-47D5-8944-2BC485117283}"/>
+              </a:ext>
+            </a:extLst>
+          </p:cNvPr>
+          <p:cNvSpPr>
+            <a:spLocks noGrp="1"/>
+          </p:cNvSpPr>
+          <p:nvPr>
+            <p:ph idx="10"/>
+          </p:nvPr>
+        </p:nvSpPr>
+        <p:spPr>
+          <a:xfrm>
+            <a:off x="935182" y="1191489"/>
+            <a:ext cx="9136470" cy="4791867"/>
+          </a:xfrm>
+        </p:spPr>
+        <p:txBody>
+          <a:bodyPr>
+            <a:normAutofit/>
+          </a:bodyPr>
+          <a:lstStyle/>
+          <a:p>
+            <a:r>
+              <a:rPr lang="en-US" dirty="0"/>
+              <a:t>Basic concepts of sleepy end device</a:t>
+            </a:r>
+          </a:p>
+          <a:p>
+            <a:pPr lvl="1"/>
+            <a:r>
+              <a:rPr lang="en-US" dirty="0"/>
+              <a:t>End Device and Sleepy End Device</a:t>
+            </a:r>
+          </a:p>
+          <a:p>
+            <a:pPr lvl="1"/>
+            <a:r>
+              <a:rPr lang="en-US" dirty="0"/>
+              <a:t>Polling</a:t>
+            </a:r>
+          </a:p>
+          <a:p>
+            <a:pPr lvl="1"/>
+            <a:r>
+              <a:rPr lang="en-US" dirty="0"/>
+              <a:t>Timeout and Keepalive</a:t>
+            </a:r>
+          </a:p>
+          <a:p>
+            <a:r>
+              <a:rPr lang="en-US" dirty="0"/>
+              <a:t>Step-by-Step hands-on: temperature sensor</a:t>
+            </a:r>
+          </a:p>
+          <a:p>
+            <a:pPr lvl="1"/>
+            <a:r>
+              <a:rPr lang="en-US" dirty="0"/>
+              <a:t>Hands-on overview</a:t>
+            </a:r>
+          </a:p>
+          <a:p>
+            <a:pPr lvl="1"/>
+            <a:r>
+              <a:rPr lang="en-US" dirty="0"/>
+              <a:t>Temperature sampling</a:t>
+            </a:r>
+          </a:p>
+          <a:p>
+            <a:pPr lvl="1"/>
+            <a:r>
+              <a:rPr lang="en-US" dirty="0"/>
+              <a:t>Reporting</a:t>
+            </a:r>
+          </a:p>
+          <a:p>
+            <a:pPr lvl="1"/>
+            <a:r>
+              <a:rPr lang="en-US" dirty="0"/>
+              <a:t>Finding and Binding</a:t>
+            </a:r>
+          </a:p>
+          <a:p>
+            <a:pPr lvl="1"/>
+            <a:r>
+              <a:rPr lang="en-US" dirty="0"/>
+              <a:t>Sleep</a:t>
+            </a:r>
+          </a:p>
+          <a:p>
+            <a:r>
+              <a:rPr lang="en-US" dirty="0"/>
+              <a:t>Q &amp; A</a:t>
+            </a:r>
+          </a:p>
+        </p:txBody>
+      </p:sp>
+    </p:spTree>
+    <p:extLst>
+      <p:ext uri="{BB962C8B-B14F-4D97-AF65-F5344CB8AC3E}">
+        <p14:creationId xmlns:p14="http://schemas.microsoft.com/office/powerpoint/2010/main" val="1876723113"/>
+      </p:ext>
+    </p:extLst>
+  </p:cSld>
+  <p:clrMapOvr>
+    <a:masterClrMapping/>
+  </p:clrMapOvr>
+  <p:transition spd="med">
+    <p:wipe/>
+  </p:transition>
+</p:sld>
+</file>
+
+<file path=ppt/slides/slide20.xml><?xml version="1.0" encoding="utf-8"?>
+<p:sld xmlns:a="http://schemas.openxmlformats.org/drawingml/2006/main" xmlns:r="http://schemas.openxmlformats.org/officeDocument/2006/relationships" xmlns:p="http://schemas.openxmlformats.org/presentationml/2006/main">
+  <p:cSld>
+    <p:spTree>
+      <p:nvGrpSpPr>
+        <p:cNvPr id="1" name=""/>
+        <p:cNvGrpSpPr/>
+        <p:nvPr/>
+      </p:nvGrpSpPr>
+      <p:grpSpPr>
+        <a:xfrm>
+          <a:off x="0" y="0"/>
+          <a:ext cx="0" cy="0"/>
+          <a:chOff x="0" y="0"/>
+          <a:chExt cx="0" cy="0"/>
+        </a:xfrm>
+      </p:grpSpPr>
+      <p:sp>
+        <p:nvSpPr>
+          <p:cNvPr id="3" name="Title 2">
+            <a:extLst>
+              <a:ext uri="{FF2B5EF4-FFF2-40B4-BE49-F238E27FC236}">
                 <a16:creationId xmlns:a16="http://schemas.microsoft.com/office/drawing/2014/main" id="{477121B8-4AF3-49BB-9F77-9091F6DC8935}"/>
               </a:ext>
             </a:extLst>
@@ -29282,35 +27445,6 @@
               <a:t>Sleeping</a:t>
             </a:r>
             <a:endParaRPr lang="en-US" b="1" dirty="0"/>
-          </a:p>
-        </p:txBody>
-      </p:sp>
-      <p:sp>
-        <p:nvSpPr>
-          <p:cNvPr id="4" name="Footer Placeholder 3">
-            <a:extLst>
-              <a:ext uri="{FF2B5EF4-FFF2-40B4-BE49-F238E27FC236}">
-                <a16:creationId xmlns:a16="http://schemas.microsoft.com/office/drawing/2014/main" id="{5AC5285A-C99D-4588-A377-C54563E60DDE}"/>
-              </a:ext>
-            </a:extLst>
-          </p:cNvPr>
-          <p:cNvSpPr>
-            <a:spLocks noGrp="1"/>
-          </p:cNvSpPr>
-          <p:nvPr>
-            <p:ph type="ftr" sz="quarter" idx="11"/>
-          </p:nvPr>
-        </p:nvSpPr>
-        <p:spPr/>
-        <p:txBody>
-          <a:bodyPr/>
-          <a:lstStyle/>
-          <a:p>
-            <a:r>
-              <a:rPr lang="en-US"/>
-              <a:t>Silicon Labs Confidential</a:t>
-            </a:r>
-            <a:endParaRPr lang="en-US" dirty="0"/>
           </a:p>
         </p:txBody>
       </p:sp>
@@ -29338,7 +27472,7 @@
             <a:fld id="{29A7BD92-6AE5-CF43-B276-274952F2BFB4}" type="slidenum">
               <a:rPr lang="en-US" smtClean="0"/>
               <a:pPr/>
-              <a:t>21</a:t>
+              <a:t>20</a:t>
             </a:fld>
             <a:endParaRPr lang="en-US" dirty="0"/>
           </a:p>
@@ -29443,7 +27577,7 @@
 </p:sld>
 </file>
 
-<file path=ppt/slides/slide22.xml><?xml version="1.0" encoding="utf-8"?>
+<file path=ppt/slides/slide21.xml><?xml version="1.0" encoding="utf-8"?>
 <p:sld xmlns:a="http://schemas.openxmlformats.org/drawingml/2006/main" xmlns:r="http://schemas.openxmlformats.org/officeDocument/2006/relationships" xmlns:p="http://schemas.openxmlformats.org/presentationml/2006/main">
   <p:cSld>
     <p:spTree>
@@ -29547,7 +27681,7 @@
 </p:sld>
 </file>
 
-<file path=ppt/slides/slide23.xml><?xml version="1.0" encoding="utf-8"?>
+<file path=ppt/slides/slide22.xml><?xml version="1.0" encoding="utf-8"?>
 <p:sld xmlns:a="http://schemas.openxmlformats.org/drawingml/2006/main" xmlns:r="http://schemas.openxmlformats.org/officeDocument/2006/relationships" xmlns:p="http://schemas.openxmlformats.org/presentationml/2006/main">
   <p:cSld>
     <p:spTree>
@@ -29827,34 +27961,6 @@
               <a:t>What are End Devices ?</a:t>
             </a:r>
             <a:endParaRPr lang="en-US" dirty="0"/>
-          </a:p>
-        </p:txBody>
-      </p:sp>
-      <p:sp>
-        <p:nvSpPr>
-          <p:cNvPr id="4" name="页脚占位符 3">
-            <a:extLst>
-              <a:ext uri="{FF2B5EF4-FFF2-40B4-BE49-F238E27FC236}">
-                <a16:creationId xmlns:a16="http://schemas.microsoft.com/office/drawing/2014/main" id="{9C12AF24-2A03-46B5-86A1-6A4C2DD73488}"/>
-              </a:ext>
-            </a:extLst>
-          </p:cNvPr>
-          <p:cNvSpPr>
-            <a:spLocks noGrp="1"/>
-          </p:cNvSpPr>
-          <p:nvPr>
-            <p:ph type="ftr" sz="quarter" idx="11"/>
-          </p:nvPr>
-        </p:nvSpPr>
-        <p:spPr/>
-        <p:txBody>
-          <a:bodyPr/>
-          <a:lstStyle/>
-          <a:p>
-            <a:r>
-              <a:rPr lang="en-US" dirty="0"/>
-              <a:t>Silicon Labs Confidential</a:t>
-            </a:r>
           </a:p>
         </p:txBody>
       </p:sp>
@@ -30247,34 +28353,6 @@
               <a:t>What is Polling? </a:t>
             </a:r>
             <a:endParaRPr lang="en-US" dirty="0"/>
-          </a:p>
-        </p:txBody>
-      </p:sp>
-      <p:sp>
-        <p:nvSpPr>
-          <p:cNvPr id="4" name="页脚占位符 3">
-            <a:extLst>
-              <a:ext uri="{FF2B5EF4-FFF2-40B4-BE49-F238E27FC236}">
-                <a16:creationId xmlns:a16="http://schemas.microsoft.com/office/drawing/2014/main" id="{9C12AF24-2A03-46B5-86A1-6A4C2DD73488}"/>
-              </a:ext>
-            </a:extLst>
-          </p:cNvPr>
-          <p:cNvSpPr>
-            <a:spLocks noGrp="1"/>
-          </p:cNvSpPr>
-          <p:nvPr>
-            <p:ph type="ftr" sz="quarter" idx="11"/>
-          </p:nvPr>
-        </p:nvSpPr>
-        <p:spPr/>
-        <p:txBody>
-          <a:bodyPr/>
-          <a:lstStyle/>
-          <a:p>
-            <a:r>
-              <a:rPr lang="en-US" dirty="0"/>
-              <a:t>Silicon Labs Confidential</a:t>
-            </a:r>
           </a:p>
         </p:txBody>
       </p:sp>
@@ -30549,34 +28627,6 @@
               <a:t>Polling as a means to request data from the parent</a:t>
             </a:r>
             <a:endParaRPr lang="en-US" dirty="0"/>
-          </a:p>
-        </p:txBody>
-      </p:sp>
-      <p:sp>
-        <p:nvSpPr>
-          <p:cNvPr id="4" name="页脚占位符 3">
-            <a:extLst>
-              <a:ext uri="{FF2B5EF4-FFF2-40B4-BE49-F238E27FC236}">
-                <a16:creationId xmlns:a16="http://schemas.microsoft.com/office/drawing/2014/main" id="{9C12AF24-2A03-46B5-86A1-6A4C2DD73488}"/>
-              </a:ext>
-            </a:extLst>
-          </p:cNvPr>
-          <p:cNvSpPr>
-            <a:spLocks noGrp="1"/>
-          </p:cNvSpPr>
-          <p:nvPr>
-            <p:ph type="ftr" sz="quarter" idx="11"/>
-          </p:nvPr>
-        </p:nvSpPr>
-        <p:spPr/>
-        <p:txBody>
-          <a:bodyPr/>
-          <a:lstStyle/>
-          <a:p>
-            <a:r>
-              <a:rPr lang="en-US" dirty="0"/>
-              <a:t>Silicon Labs Confidential</a:t>
-            </a:r>
           </a:p>
         </p:txBody>
       </p:sp>
@@ -30851,9 +28901,9 @@
             <p:grpSpPr>
               <a:xfrm>
                 <a:off x="5320362" y="2481616"/>
-                <a:ext cx="3144344" cy="2962949"/>
+                <a:ext cx="3144344" cy="2963241"/>
                 <a:chOff x="5320362" y="2481616"/>
-                <a:chExt cx="3144344" cy="2962949"/>
+                <a:chExt cx="3144344" cy="2963241"/>
               </a:xfrm>
             </p:grpSpPr>
             <p:cxnSp>
@@ -31094,9 +29144,9 @@
               <p:grpSpPr>
                 <a:xfrm>
                   <a:off x="5654144" y="2481616"/>
-                  <a:ext cx="2810562" cy="2962949"/>
+                  <a:ext cx="2810562" cy="2963241"/>
                   <a:chOff x="5715104" y="2481616"/>
-                  <a:chExt cx="2810562" cy="2962949"/>
+                  <a:chExt cx="2810562" cy="2963241"/>
                 </a:xfrm>
               </p:grpSpPr>
               <p:sp>
@@ -31114,7 +29164,7 @@
                 <p:spPr>
                   <a:xfrm>
                     <a:off x="6203924" y="2481616"/>
-                    <a:ext cx="1062917" cy="304917"/>
+                    <a:ext cx="971291" cy="305209"/>
                   </a:xfrm>
                   <a:prstGeom prst="rect">
                     <a:avLst/>
@@ -31128,7 +29178,7 @@
                   <a:p>
                     <a:r>
                       <a:rPr lang="en-US" sz="1200" b="1" dirty="0"/>
-                      <a:t>Mac Data Poll</a:t>
+                      <a:t>MAC Data Poll</a:t>
                     </a:r>
                   </a:p>
                 </p:txBody>
@@ -31147,8 +29197,8 @@
                 </p:nvSpPr>
                 <p:spPr>
                   <a:xfrm>
-                    <a:off x="5715104" y="2840174"/>
-                    <a:ext cx="2185730" cy="304917"/>
+                    <a:off x="5715104" y="2840173"/>
+                    <a:ext cx="1966118" cy="305209"/>
                   </a:xfrm>
                   <a:prstGeom prst="rect">
                     <a:avLst/>
@@ -31162,7 +29212,7 @@
                   <a:p>
                     <a:r>
                       <a:rPr lang="en-US" sz="1200" b="1" dirty="0"/>
-                      <a:t>Mac Ack ( Pending data = False)</a:t>
+                      <a:t>MAC Ack ( Pending data = False)</a:t>
                     </a:r>
                   </a:p>
                 </p:txBody>
@@ -31196,7 +29246,7 @@
                   <a:p>
                     <a:r>
                       <a:rPr lang="en-US" sz="1200" b="1" dirty="0"/>
-                      <a:t>Mac Data Poll</a:t>
+                      <a:t>MAC Data Poll</a:t>
                     </a:r>
                   </a:p>
                 </p:txBody>
@@ -31216,7 +29266,7 @@
                 <p:spPr>
                   <a:xfrm>
                     <a:off x="5774249" y="4519481"/>
-                    <a:ext cx="2207504" cy="304917"/>
+                    <a:ext cx="1985411" cy="305209"/>
                   </a:xfrm>
                   <a:prstGeom prst="rect">
                     <a:avLst/>
@@ -31230,7 +29280,7 @@
                   <a:p>
                     <a:r>
                       <a:rPr lang="en-US" sz="1200" b="1" dirty="0"/>
-                      <a:t>Mac Ack ( Pending data = TRUE)</a:t>
+                      <a:t>MAC Ack ( Pending data = TRUE)</a:t>
                     </a:r>
                   </a:p>
                 </p:txBody>
@@ -31250,7 +29300,7 @@
                 <p:spPr>
                   <a:xfrm>
                     <a:off x="6060855" y="5139648"/>
-                    <a:ext cx="1213549" cy="304917"/>
+                    <a:ext cx="1104754" cy="305209"/>
                   </a:xfrm>
                   <a:prstGeom prst="rect">
                     <a:avLst/>
@@ -31264,7 +29314,7 @@
                   <a:p>
                     <a:r>
                       <a:rPr lang="en-US" sz="1200" b="1" dirty="0"/>
-                      <a:t>              Mac Ack</a:t>
+                      <a:t>              MAC Ack</a:t>
                     </a:r>
                   </a:p>
                 </p:txBody>
@@ -31723,35 +29773,6 @@
               <a:t>Keepalive and timeout</a:t>
             </a:r>
             <a:endParaRPr lang="en-US" b="1" dirty="0"/>
-          </a:p>
-        </p:txBody>
-      </p:sp>
-      <p:sp>
-        <p:nvSpPr>
-          <p:cNvPr id="4" name="页脚占位符 3">
-            <a:extLst>
-              <a:ext uri="{FF2B5EF4-FFF2-40B4-BE49-F238E27FC236}">
-                <a16:creationId xmlns:a16="http://schemas.microsoft.com/office/drawing/2014/main" id="{202AC9C5-8519-48CC-BC1A-C8A87A2A5679}"/>
-              </a:ext>
-            </a:extLst>
-          </p:cNvPr>
-          <p:cNvSpPr>
-            <a:spLocks noGrp="1"/>
-          </p:cNvSpPr>
-          <p:nvPr>
-            <p:ph type="ftr" sz="quarter" idx="11"/>
-          </p:nvPr>
-        </p:nvSpPr>
-        <p:spPr/>
-        <p:txBody>
-          <a:bodyPr/>
-          <a:lstStyle/>
-          <a:p>
-            <a:r>
-              <a:rPr lang="en-US"/>
-              <a:t>Silicon Labs Confidential</a:t>
-            </a:r>
-            <a:endParaRPr lang="en-US" dirty="0"/>
           </a:p>
         </p:txBody>
       </p:sp>
@@ -32211,9 +30232,9 @@
                 <p:grpSpPr>
                   <a:xfrm>
                     <a:off x="5678783" y="2349510"/>
-                    <a:ext cx="2529073" cy="1783217"/>
+                    <a:ext cx="2547535" cy="1783217"/>
                     <a:chOff x="5739743" y="2349510"/>
-                    <a:chExt cx="2529073" cy="1783217"/>
+                    <a:chExt cx="2547535" cy="1783217"/>
                   </a:xfrm>
                 </p:grpSpPr>
                 <p:sp>
@@ -32231,7 +30252,7 @@
                   <p:spPr>
                     <a:xfrm>
                       <a:off x="5739743" y="2349510"/>
-                      <a:ext cx="2513291" cy="325813"/>
+                      <a:ext cx="2547535" cy="325813"/>
                     </a:xfrm>
                     <a:prstGeom prst="rect">
                       <a:avLst/>
@@ -32245,7 +30266,7 @@
                     <a:p>
                       <a:r>
                         <a:rPr lang="en-US" sz="1200" b="1" dirty="0"/>
-                        <a:t>Mac Data Poll(from unknown child)</a:t>
+                        <a:t>MAC Data Poll(from unknown child)</a:t>
                       </a:r>
                     </a:p>
                   </p:txBody>
@@ -32264,8 +30285,8 @@
                   </p:nvSpPr>
                   <p:spPr>
                     <a:xfrm>
-                      <a:off x="6551601" y="2614227"/>
-                      <a:ext cx="777695" cy="325813"/>
+                      <a:off x="6551601" y="2614226"/>
+                      <a:ext cx="811939" cy="325813"/>
                     </a:xfrm>
                     <a:prstGeom prst="rect">
                       <a:avLst/>
@@ -32279,7 +30300,7 @@
                     <a:p>
                       <a:r>
                         <a:rPr lang="en-US" sz="1200" b="1" dirty="0"/>
-                        <a:t>Mac Ack </a:t>
+                        <a:t>MAC Ack </a:t>
                       </a:r>
                     </a:p>
                   </p:txBody>
@@ -32438,7 +30459,7 @@
           </p:nvCxnSpPr>
           <p:spPr>
             <a:xfrm>
-              <a:off x="6972130" y="3107201"/>
+              <a:off x="7522623" y="3107201"/>
               <a:ext cx="3045043" cy="1"/>
             </a:xfrm>
             <a:prstGeom prst="straightConnector1">
@@ -32496,7 +30517,7 @@
             <a:p>
               <a:r>
                 <a:rPr lang="en-US" sz="1200" b="1" dirty="0"/>
-                <a:t>Mac Ack </a:t>
+                <a:t>MAC Ack </a:t>
               </a:r>
             </a:p>
           </p:txBody>
@@ -33389,35 +31410,6 @@
       </p:sp>
       <p:sp>
         <p:nvSpPr>
-          <p:cNvPr id="4" name="页脚占位符 3">
-            <a:extLst>
-              <a:ext uri="{FF2B5EF4-FFF2-40B4-BE49-F238E27FC236}">
-                <a16:creationId xmlns:a16="http://schemas.microsoft.com/office/drawing/2014/main" id="{202AC9C5-8519-48CC-BC1A-C8A87A2A5679}"/>
-              </a:ext>
-            </a:extLst>
-          </p:cNvPr>
-          <p:cNvSpPr>
-            <a:spLocks noGrp="1"/>
-          </p:cNvSpPr>
-          <p:nvPr>
-            <p:ph type="ftr" sz="quarter" idx="11"/>
-          </p:nvPr>
-        </p:nvSpPr>
-        <p:spPr/>
-        <p:txBody>
-          <a:bodyPr/>
-          <a:lstStyle/>
-          <a:p>
-            <a:r>
-              <a:rPr lang="en-US"/>
-              <a:t>Silicon Labs Confidential</a:t>
-            </a:r>
-            <a:endParaRPr lang="en-US" dirty="0"/>
-          </a:p>
-        </p:txBody>
-      </p:sp>
-      <p:sp>
-        <p:nvSpPr>
           <p:cNvPr id="5" name="灯片编号占位符 4">
             <a:extLst>
               <a:ext uri="{FF2B5EF4-FFF2-40B4-BE49-F238E27FC236}">
@@ -33695,35 +31687,6 @@
               <a:rPr lang="en-US" b="1" dirty="0"/>
               <a:t>Application Design Considerations</a:t>
             </a:r>
-          </a:p>
-        </p:txBody>
-      </p:sp>
-      <p:sp>
-        <p:nvSpPr>
-          <p:cNvPr id="4" name="页脚占位符 3">
-            <a:extLst>
-              <a:ext uri="{FF2B5EF4-FFF2-40B4-BE49-F238E27FC236}">
-                <a16:creationId xmlns:a16="http://schemas.microsoft.com/office/drawing/2014/main" id="{202AC9C5-8519-48CC-BC1A-C8A87A2A5679}"/>
-              </a:ext>
-            </a:extLst>
-          </p:cNvPr>
-          <p:cNvSpPr>
-            <a:spLocks noGrp="1"/>
-          </p:cNvSpPr>
-          <p:nvPr>
-            <p:ph type="ftr" sz="quarter" idx="11"/>
-          </p:nvPr>
-        </p:nvSpPr>
-        <p:spPr/>
-        <p:txBody>
-          <a:bodyPr/>
-          <a:lstStyle/>
-          <a:p>
-            <a:r>
-              <a:rPr lang="en-US"/>
-              <a:t>Silicon Labs Confidential</a:t>
-            </a:r>
-            <a:endParaRPr lang="en-US" dirty="0"/>
           </a:p>
         </p:txBody>
       </p:sp>
@@ -34140,35 +32103,6 @@
               <a:rPr lang="en-US" b="1" dirty="0"/>
               <a:t>Hands-on: Overview</a:t>
             </a:r>
-          </a:p>
-        </p:txBody>
-      </p:sp>
-      <p:sp>
-        <p:nvSpPr>
-          <p:cNvPr id="4" name="页脚占位符 3">
-            <a:extLst>
-              <a:ext uri="{FF2B5EF4-FFF2-40B4-BE49-F238E27FC236}">
-                <a16:creationId xmlns:a16="http://schemas.microsoft.com/office/drawing/2014/main" id="{202AC9C5-8519-48CC-BC1A-C8A87A2A5679}"/>
-              </a:ext>
-            </a:extLst>
-          </p:cNvPr>
-          <p:cNvSpPr>
-            <a:spLocks noGrp="1"/>
-          </p:cNvSpPr>
-          <p:nvPr>
-            <p:ph type="ftr" sz="quarter" idx="11"/>
-          </p:nvPr>
-        </p:nvSpPr>
-        <p:spPr/>
-        <p:txBody>
-          <a:bodyPr/>
-          <a:lstStyle/>
-          <a:p>
-            <a:r>
-              <a:rPr lang="en-US"/>
-              <a:t>Silicon Labs Confidential</a:t>
-            </a:r>
-            <a:endParaRPr lang="en-US" dirty="0"/>
           </a:p>
         </p:txBody>
       </p:sp>
@@ -35821,12 +33755,9 @@
 </file>
 
 <file path=customXml/item1.xml><?xml version="1.0" encoding="utf-8"?>
-<?mso-contentType ?>
-<FormTemplates xmlns="http://schemas.microsoft.com/sharepoint/v3/contenttype/forms">
-  <Display>DocumentLibraryForm</Display>
-  <Edit>DocumentLibraryForm</Edit>
-  <New>DocumentLibraryForm</New>
-</FormTemplates>
+<p:properties xmlns:p="http://schemas.microsoft.com/office/2006/metadata/properties" xmlns:xsi="http://www.w3.org/2001/XMLSchema-instance" xmlns:pc="http://schemas.microsoft.com/office/infopath/2007/PartnerControls">
+  <documentManagement/>
+</p:properties>
 </file>
 
 <file path=customXml/item2.xml><?xml version="1.0" encoding="utf-8"?>
@@ -35944,15 +33875,25 @@
 </file>
 
 <file path=customXml/item3.xml><?xml version="1.0" encoding="utf-8"?>
-<p:properties xmlns:p="http://schemas.microsoft.com/office/2006/metadata/properties" xmlns:xsi="http://www.w3.org/2001/XMLSchema-instance" xmlns:pc="http://schemas.microsoft.com/office/infopath/2007/PartnerControls">
-  <documentManagement/>
-</p:properties>
+<?mso-contentType ?>
+<FormTemplates xmlns="http://schemas.microsoft.com/sharepoint/v3/contenttype/forms">
+  <Display>DocumentLibraryForm</Display>
+  <Edit>DocumentLibraryForm</Edit>
+  <New>DocumentLibraryForm</New>
+</FormTemplates>
 </file>
 
 <file path=customXml/itemProps1.xml><?xml version="1.0" encoding="utf-8"?>
-<ds:datastoreItem xmlns:ds="http://schemas.openxmlformats.org/officeDocument/2006/customXml" ds:itemID="{4DD62670-B0F9-4782-967B-54D0F2A11DD3}">
+<ds:datastoreItem xmlns:ds="http://schemas.openxmlformats.org/officeDocument/2006/customXml" ds:itemID="{88E5C257-99A9-40B2-A1DE-0EB62604DA9C}">
   <ds:schemaRefs>
-    <ds:schemaRef ds:uri="http://schemas.microsoft.com/sharepoint/v3/contenttype/forms"/>
+    <ds:schemaRef ds:uri="http://purl.org/dc/elements/1.1/"/>
+    <ds:schemaRef ds:uri="http://schemas.microsoft.com/office/2006/metadata/properties"/>
+    <ds:schemaRef ds:uri="http://schemas.microsoft.com/office/2006/documentManagement/types"/>
+    <ds:schemaRef ds:uri="http://purl.org/dc/terms/"/>
+    <ds:schemaRef ds:uri="http://schemas.openxmlformats.org/package/2006/metadata/core-properties"/>
+    <ds:schemaRef ds:uri="http://purl.org/dc/dcmitype/"/>
+    <ds:schemaRef ds:uri="http://schemas.microsoft.com/office/infopath/2007/PartnerControls"/>
+    <ds:schemaRef ds:uri="http://www.w3.org/XML/1998/namespace"/>
   </ds:schemaRefs>
 </ds:datastoreItem>
 </file>
@@ -35974,16 +33915,9 @@
 </file>
 
 <file path=customXml/itemProps3.xml><?xml version="1.0" encoding="utf-8"?>
-<ds:datastoreItem xmlns:ds="http://schemas.openxmlformats.org/officeDocument/2006/customXml" ds:itemID="{88E5C257-99A9-40B2-A1DE-0EB62604DA9C}">
+<ds:datastoreItem xmlns:ds="http://schemas.openxmlformats.org/officeDocument/2006/customXml" ds:itemID="{4DD62670-B0F9-4782-967B-54D0F2A11DD3}">
   <ds:schemaRefs>
-    <ds:schemaRef ds:uri="http://purl.org/dc/elements/1.1/"/>
-    <ds:schemaRef ds:uri="http://schemas.microsoft.com/office/2006/metadata/properties"/>
-    <ds:schemaRef ds:uri="http://schemas.microsoft.com/office/2006/documentManagement/types"/>
-    <ds:schemaRef ds:uri="http://purl.org/dc/terms/"/>
-    <ds:schemaRef ds:uri="http://schemas.openxmlformats.org/package/2006/metadata/core-properties"/>
-    <ds:schemaRef ds:uri="http://purl.org/dc/dcmitype/"/>
-    <ds:schemaRef ds:uri="http://schemas.microsoft.com/office/infopath/2007/PartnerControls"/>
-    <ds:schemaRef ds:uri="http://www.w3.org/XML/1998/namespace"/>
+    <ds:schemaRef ds:uri="http://schemas.microsoft.com/sharepoint/v3/contenttype/forms"/>
   </ds:schemaRefs>
 </ds:datastoreItem>
 </file>
</xml_diff>